<commit_message>
More detailed flow chart
</commit_message>
<xml_diff>
--- a/Outline.pptx
+++ b/Outline.pptx
@@ -6,11 +6,12 @@
   </p:sldMasterIdLst>
   <p:sldIdLst>
     <p:sldId id="256" r:id="rId2"/>
-    <p:sldId id="260" r:id="rId3"/>
-    <p:sldId id="258" r:id="rId4"/>
-    <p:sldId id="257" r:id="rId5"/>
-    <p:sldId id="261" r:id="rId6"/>
-    <p:sldId id="262" r:id="rId7"/>
+    <p:sldId id="263" r:id="rId3"/>
+    <p:sldId id="260" r:id="rId4"/>
+    <p:sldId id="258" r:id="rId5"/>
+    <p:sldId id="257" r:id="rId6"/>
+    <p:sldId id="261" r:id="rId7"/>
+    <p:sldId id="262" r:id="rId8"/>
   </p:sldIdLst>
   <p:sldSz cx="12192000" cy="6858000"/>
   <p:notesSz cx="6858000" cy="9144000"/>
@@ -117,6 +118,18 @@
 </p:presentation>
 </file>
 
+<file path=ppt/commentAuthors.xml><?xml version="1.0" encoding="utf-8"?>
+<p:cmAuthorLst xmlns:a="http://schemas.openxmlformats.org/drawingml/2006/main" xmlns:r="http://schemas.openxmlformats.org/officeDocument/2006/relationships" xmlns:p="http://schemas.openxmlformats.org/presentationml/2006/main">
+  <p:cmAuthor id="1" name="Scott Jensen" initials="SJ" lastIdx="1" clrIdx="0">
+    <p:extLst>
+      <p:ext uri="{19B8F6BF-5375-455C-9EA6-DF929625EA0E}">
+        <p15:presenceInfo xmlns:p15="http://schemas.microsoft.com/office/powerpoint/2012/main" userId="bc0cad54badd1e8b" providerId="Windows Live"/>
+      </p:ext>
+    </p:extLst>
+  </p:cmAuthor>
+</p:cmAuthorLst>
+</file>
+
 <file path=ppt/slideLayouts/slideLayout1.xml><?xml version="1.0" encoding="utf-8"?>
 <p:sldLayout xmlns:a="http://schemas.openxmlformats.org/drawingml/2006/main" xmlns:r="http://schemas.openxmlformats.org/officeDocument/2006/relationships" xmlns:p="http://schemas.openxmlformats.org/presentationml/2006/main" type="title" preserve="1">
   <p:cSld name="Title Slide">
@@ -264,7 +277,7 @@
           <a:p>
             <a:fld id="{3E17C7E1-582E-4AB2-85BF-A0FE62F38CDC}" type="datetimeFigureOut">
               <a:rPr lang="en-US" smtClean="0"/>
-              <a:t>7/10/2021</a:t>
+              <a:t>7/17/2021</a:t>
             </a:fld>
             <a:endParaRPr lang="en-US"/>
           </a:p>
@@ -462,7 +475,7 @@
           <a:p>
             <a:fld id="{3E17C7E1-582E-4AB2-85BF-A0FE62F38CDC}" type="datetimeFigureOut">
               <a:rPr lang="en-US" smtClean="0"/>
-              <a:t>7/10/2021</a:t>
+              <a:t>7/17/2021</a:t>
             </a:fld>
             <a:endParaRPr lang="en-US"/>
           </a:p>
@@ -670,7 +683,7 @@
           <a:p>
             <a:fld id="{3E17C7E1-582E-4AB2-85BF-A0FE62F38CDC}" type="datetimeFigureOut">
               <a:rPr lang="en-US" smtClean="0"/>
-              <a:t>7/10/2021</a:t>
+              <a:t>7/17/2021</a:t>
             </a:fld>
             <a:endParaRPr lang="en-US"/>
           </a:p>
@@ -868,7 +881,7 @@
           <a:p>
             <a:fld id="{3E17C7E1-582E-4AB2-85BF-A0FE62F38CDC}" type="datetimeFigureOut">
               <a:rPr lang="en-US" smtClean="0"/>
-              <a:t>7/10/2021</a:t>
+              <a:t>7/17/2021</a:t>
             </a:fld>
             <a:endParaRPr lang="en-US"/>
           </a:p>
@@ -1143,7 +1156,7 @@
           <a:p>
             <a:fld id="{3E17C7E1-582E-4AB2-85BF-A0FE62F38CDC}" type="datetimeFigureOut">
               <a:rPr lang="en-US" smtClean="0"/>
-              <a:t>7/10/2021</a:t>
+              <a:t>7/17/2021</a:t>
             </a:fld>
             <a:endParaRPr lang="en-US"/>
           </a:p>
@@ -1408,7 +1421,7 @@
           <a:p>
             <a:fld id="{3E17C7E1-582E-4AB2-85BF-A0FE62F38CDC}" type="datetimeFigureOut">
               <a:rPr lang="en-US" smtClean="0"/>
-              <a:t>7/10/2021</a:t>
+              <a:t>7/17/2021</a:t>
             </a:fld>
             <a:endParaRPr lang="en-US"/>
           </a:p>
@@ -1820,7 +1833,7 @@
           <a:p>
             <a:fld id="{3E17C7E1-582E-4AB2-85BF-A0FE62F38CDC}" type="datetimeFigureOut">
               <a:rPr lang="en-US" smtClean="0"/>
-              <a:t>7/10/2021</a:t>
+              <a:t>7/17/2021</a:t>
             </a:fld>
             <a:endParaRPr lang="en-US"/>
           </a:p>
@@ -1961,7 +1974,7 @@
           <a:p>
             <a:fld id="{3E17C7E1-582E-4AB2-85BF-A0FE62F38CDC}" type="datetimeFigureOut">
               <a:rPr lang="en-US" smtClean="0"/>
-              <a:t>7/10/2021</a:t>
+              <a:t>7/17/2021</a:t>
             </a:fld>
             <a:endParaRPr lang="en-US"/>
           </a:p>
@@ -2074,7 +2087,7 @@
           <a:p>
             <a:fld id="{3E17C7E1-582E-4AB2-85BF-A0FE62F38CDC}" type="datetimeFigureOut">
               <a:rPr lang="en-US" smtClean="0"/>
-              <a:t>7/10/2021</a:t>
+              <a:t>7/17/2021</a:t>
             </a:fld>
             <a:endParaRPr lang="en-US"/>
           </a:p>
@@ -2385,7 +2398,7 @@
           <a:p>
             <a:fld id="{3E17C7E1-582E-4AB2-85BF-A0FE62F38CDC}" type="datetimeFigureOut">
               <a:rPr lang="en-US" smtClean="0"/>
-              <a:t>7/10/2021</a:t>
+              <a:t>7/17/2021</a:t>
             </a:fld>
             <a:endParaRPr lang="en-US"/>
           </a:p>
@@ -2673,7 +2686,7 @@
           <a:p>
             <a:fld id="{3E17C7E1-582E-4AB2-85BF-A0FE62F38CDC}" type="datetimeFigureOut">
               <a:rPr lang="en-US" smtClean="0"/>
-              <a:t>7/10/2021</a:t>
+              <a:t>7/17/2021</a:t>
             </a:fld>
             <a:endParaRPr lang="en-US"/>
           </a:p>
@@ -2914,7 +2927,7 @@
           <a:p>
             <a:fld id="{3E17C7E1-582E-4AB2-85BF-A0FE62F38CDC}" type="datetimeFigureOut">
               <a:rPr lang="en-US" smtClean="0"/>
-              <a:t>7/10/2021</a:t>
+              <a:t>7/17/2021</a:t>
             </a:fld>
             <a:endParaRPr lang="en-US"/>
           </a:p>
@@ -3345,7 +3358,7 @@
         </p:nvSpPr>
         <p:spPr>
           <a:xfrm>
-            <a:off x="895350" y="600075"/>
+            <a:off x="923838" y="1307949"/>
             <a:ext cx="2085975" cy="1190625"/>
           </a:xfrm>
           <a:prstGeom prst="roundRect">
@@ -3394,7 +3407,7 @@
         </p:nvSpPr>
         <p:spPr>
           <a:xfrm>
-            <a:off x="4634995" y="600075"/>
+            <a:off x="4663483" y="1307949"/>
             <a:ext cx="2085975" cy="1190625"/>
           </a:xfrm>
           <a:prstGeom prst="roundRect">
@@ -3450,7 +3463,7 @@
         </p:nvSpPr>
         <p:spPr>
           <a:xfrm>
-            <a:off x="8504662" y="574442"/>
+            <a:off x="8533150" y="1282316"/>
             <a:ext cx="2085975" cy="1190625"/>
           </a:xfrm>
           <a:prstGeom prst="roundRect">
@@ -3506,7 +3519,7 @@
         </p:nvSpPr>
         <p:spPr>
           <a:xfrm>
-            <a:off x="4696851" y="4803686"/>
+            <a:off x="6132913" y="5280490"/>
             <a:ext cx="2085975" cy="1190625"/>
           </a:xfrm>
           <a:prstGeom prst="roundRect">
@@ -3555,7 +3568,7 @@
         </p:nvSpPr>
         <p:spPr>
           <a:xfrm>
-            <a:off x="3267864" y="950911"/>
+            <a:off x="3296352" y="1658785"/>
             <a:ext cx="1020933" cy="435006"/>
           </a:xfrm>
           <a:prstGeom prst="rightArrow">
@@ -3601,7 +3614,7 @@
         </p:nvSpPr>
         <p:spPr>
           <a:xfrm>
-            <a:off x="7137531" y="950911"/>
+            <a:off x="7166019" y="1658785"/>
             <a:ext cx="1020933" cy="435006"/>
           </a:xfrm>
           <a:prstGeom prst="rightArrow">
@@ -3647,7 +3660,7 @@
         </p:nvSpPr>
         <p:spPr>
           <a:xfrm>
-            <a:off x="4634995" y="2378662"/>
+            <a:off x="6060219" y="3526809"/>
             <a:ext cx="2085975" cy="1190625"/>
           </a:xfrm>
           <a:prstGeom prst="roundRect">
@@ -3695,9 +3708,9 @@
           <p:nvPr/>
         </p:nvSpPr>
         <p:spPr>
-          <a:xfrm rot="8609399">
-            <a:off x="7024964" y="2095367"/>
-            <a:ext cx="1253808" cy="435006"/>
+          <a:xfrm rot="5400000">
+            <a:off x="10374095" y="2809555"/>
+            <a:ext cx="490059" cy="435006"/>
           </a:xfrm>
           <a:prstGeom prst="rightArrow">
             <a:avLst/>
@@ -3741,9 +3754,9 @@
           <p:nvPr/>
         </p:nvSpPr>
         <p:spPr>
-          <a:xfrm rot="10800000">
-            <a:off x="3161676" y="2756471"/>
-            <a:ext cx="1175704" cy="435006"/>
+          <a:xfrm rot="10159127" flipV="1">
+            <a:off x="3442369" y="2888397"/>
+            <a:ext cx="4874545" cy="415723"/>
           </a:xfrm>
           <a:prstGeom prst="rightArrow">
             <a:avLst/>
@@ -3770,7 +3783,10 @@
           <a:lstStyle/>
           <a:p>
             <a:pPr algn="ctr"/>
-            <a:endParaRPr lang="en-US"/>
+            <a:r>
+              <a:rPr lang="en-US" dirty="0"/>
+              <a:t>Automated Control</a:t>
+            </a:r>
           </a:p>
         </p:txBody>
       </p:sp>
@@ -3788,7 +3804,7 @@
         </p:nvSpPr>
         <p:spPr>
           <a:xfrm>
-            <a:off x="8504661" y="4803686"/>
+            <a:off x="8825275" y="5280490"/>
             <a:ext cx="2085975" cy="1190625"/>
           </a:xfrm>
           <a:prstGeom prst="roundRect">
@@ -3837,8 +3853,8 @@
         </p:nvSpPr>
         <p:spPr>
           <a:xfrm rot="5400000">
-            <a:off x="5276108" y="3968983"/>
-            <a:ext cx="927460" cy="435006"/>
+            <a:off x="6994227" y="4817682"/>
+            <a:ext cx="363348" cy="435006"/>
           </a:xfrm>
           <a:prstGeom prst="rightArrow">
             <a:avLst/>
@@ -3883,8 +3899,8 @@
         </p:nvSpPr>
         <p:spPr>
           <a:xfrm rot="1800000">
-            <a:off x="7162292" y="3957771"/>
-            <a:ext cx="1253808" cy="435006"/>
+            <a:off x="8211413" y="4661241"/>
+            <a:ext cx="649870" cy="435006"/>
           </a:xfrm>
           <a:prstGeom prst="rightArrow">
             <a:avLst/>
@@ -3929,7 +3945,7 @@
         </p:nvSpPr>
         <p:spPr>
           <a:xfrm>
-            <a:off x="895350" y="2396790"/>
+            <a:off x="1112322" y="3551076"/>
             <a:ext cx="2085975" cy="1190625"/>
           </a:xfrm>
           <a:prstGeom prst="roundRect">
@@ -3959,13 +3975,6 @@
             <a:pPr algn="ctr"/>
             <a:r>
               <a:rPr lang="en-US" dirty="0"/>
-              <a:t>PID</a:t>
-            </a:r>
-          </a:p>
-          <a:p>
-            <a:pPr algn="ctr"/>
-            <a:r>
-              <a:rPr lang="en-US" dirty="0"/>
               <a:t>Controller</a:t>
             </a:r>
           </a:p>
@@ -3985,8 +3994,8 @@
         </p:nvSpPr>
         <p:spPr>
           <a:xfrm rot="5400000">
-            <a:off x="1468299" y="3957771"/>
-            <a:ext cx="927460" cy="435006"/>
+            <a:off x="1947893" y="4833486"/>
+            <a:ext cx="363348" cy="435006"/>
           </a:xfrm>
           <a:prstGeom prst="rightArrow">
             <a:avLst/>
@@ -4031,7 +4040,7 @@
         </p:nvSpPr>
         <p:spPr>
           <a:xfrm>
-            <a:off x="889042" y="4803686"/>
+            <a:off x="1086579" y="5283578"/>
             <a:ext cx="2085975" cy="1190625"/>
           </a:xfrm>
           <a:prstGeom prst="roundRect">
@@ -4062,6 +4071,447 @@
             <a:r>
               <a:rPr lang="en-US" dirty="0"/>
               <a:t>Equipment Commands</a:t>
+            </a:r>
+          </a:p>
+        </p:txBody>
+      </p:sp>
+      <p:sp>
+        <p:nvSpPr>
+          <p:cNvPr id="2" name="Rectangle: Rounded Corners 1">
+            <a:extLst>
+              <a:ext uri="{FF2B5EF4-FFF2-40B4-BE49-F238E27FC236}">
+                <a16:creationId xmlns:a16="http://schemas.microsoft.com/office/drawing/2014/main" id="{8AD4A0D2-AE9D-4D3B-AB92-D9D42060C8A3}"/>
+              </a:ext>
+            </a:extLst>
+          </p:cNvPr>
+          <p:cNvSpPr/>
+          <p:nvPr/>
+        </p:nvSpPr>
+        <p:spPr>
+          <a:xfrm>
+            <a:off x="4404249" y="1170853"/>
+            <a:ext cx="2553489" cy="1464815"/>
+          </a:xfrm>
+          <a:prstGeom prst="roundRect">
+            <a:avLst/>
+          </a:prstGeom>
+          <a:noFill/>
+          <a:ln w="44450">
+            <a:solidFill>
+              <a:schemeClr val="tx1"/>
+            </a:solidFill>
+          </a:ln>
+        </p:spPr>
+        <p:style>
+          <a:lnRef idx="2">
+            <a:schemeClr val="accent1">
+              <a:shade val="50000"/>
+            </a:schemeClr>
+          </a:lnRef>
+          <a:fillRef idx="1">
+            <a:schemeClr val="accent1"/>
+          </a:fillRef>
+          <a:effectRef idx="0">
+            <a:schemeClr val="accent1"/>
+          </a:effectRef>
+          <a:fontRef idx="minor">
+            <a:schemeClr val="lt1"/>
+          </a:fontRef>
+        </p:style>
+        <p:txBody>
+          <a:bodyPr rtlCol="0" anchor="ctr"/>
+          <a:lstStyle/>
+          <a:p>
+            <a:pPr algn="ctr"/>
+            <a:endParaRPr lang="en-US"/>
+          </a:p>
+        </p:txBody>
+      </p:sp>
+      <p:sp>
+        <p:nvSpPr>
+          <p:cNvPr id="5" name="TextBox 4">
+            <a:extLst>
+              <a:ext uri="{FF2B5EF4-FFF2-40B4-BE49-F238E27FC236}">
+                <a16:creationId xmlns:a16="http://schemas.microsoft.com/office/drawing/2014/main" id="{57602FAB-28E1-48FE-BCF7-B751F5396D69}"/>
+              </a:ext>
+            </a:extLst>
+          </p:cNvPr>
+          <p:cNvSpPr txBox="1"/>
+          <p:nvPr/>
+        </p:nvSpPr>
+        <p:spPr>
+          <a:xfrm>
+            <a:off x="4663483" y="87627"/>
+            <a:ext cx="2073645" cy="369332"/>
+          </a:xfrm>
+          <a:prstGeom prst="rect">
+            <a:avLst/>
+          </a:prstGeom>
+          <a:noFill/>
+        </p:spPr>
+        <p:txBody>
+          <a:bodyPr wrap="none" rtlCol="0">
+            <a:spAutoFit/>
+          </a:bodyPr>
+          <a:lstStyle/>
+          <a:p>
+            <a:r>
+              <a:rPr lang="en-US" dirty="0"/>
+              <a:t>Ver. 1 – No real data</a:t>
+            </a:r>
+          </a:p>
+        </p:txBody>
+      </p:sp>
+      <p:sp>
+        <p:nvSpPr>
+          <p:cNvPr id="20" name="TextBox 19">
+            <a:extLst>
+              <a:ext uri="{FF2B5EF4-FFF2-40B4-BE49-F238E27FC236}">
+                <a16:creationId xmlns:a16="http://schemas.microsoft.com/office/drawing/2014/main" id="{93BF0214-1E10-4F9C-A5F5-CCE902BFD4A8}"/>
+              </a:ext>
+            </a:extLst>
+          </p:cNvPr>
+          <p:cNvSpPr txBox="1"/>
+          <p:nvPr/>
+        </p:nvSpPr>
+        <p:spPr>
+          <a:xfrm>
+            <a:off x="5027357" y="760753"/>
+            <a:ext cx="1503617" cy="369332"/>
+          </a:xfrm>
+          <a:prstGeom prst="rect">
+            <a:avLst/>
+          </a:prstGeom>
+          <a:noFill/>
+        </p:spPr>
+        <p:txBody>
+          <a:bodyPr wrap="none" rtlCol="0">
+            <a:spAutoFit/>
+          </a:bodyPr>
+          <a:lstStyle/>
+          <a:p>
+            <a:r>
+              <a:rPr lang="en-US" dirty="0"/>
+              <a:t>DAQ Software</a:t>
+            </a:r>
+          </a:p>
+        </p:txBody>
+      </p:sp>
+      <p:sp>
+        <p:nvSpPr>
+          <p:cNvPr id="21" name="Rectangle: Rounded Corners 20">
+            <a:extLst>
+              <a:ext uri="{FF2B5EF4-FFF2-40B4-BE49-F238E27FC236}">
+                <a16:creationId xmlns:a16="http://schemas.microsoft.com/office/drawing/2014/main" id="{D7FDCB00-14A2-4B77-9822-972459B4ECEB}"/>
+              </a:ext>
+            </a:extLst>
+          </p:cNvPr>
+          <p:cNvSpPr/>
+          <p:nvPr/>
+        </p:nvSpPr>
+        <p:spPr>
+          <a:xfrm>
+            <a:off x="8299392" y="1143880"/>
+            <a:ext cx="2553489" cy="1464815"/>
+          </a:xfrm>
+          <a:prstGeom prst="roundRect">
+            <a:avLst/>
+          </a:prstGeom>
+          <a:noFill/>
+          <a:ln w="44450">
+            <a:solidFill>
+              <a:schemeClr val="tx1"/>
+            </a:solidFill>
+          </a:ln>
+        </p:spPr>
+        <p:style>
+          <a:lnRef idx="2">
+            <a:schemeClr val="accent1">
+              <a:shade val="50000"/>
+            </a:schemeClr>
+          </a:lnRef>
+          <a:fillRef idx="1">
+            <a:schemeClr val="accent1"/>
+          </a:fillRef>
+          <a:effectRef idx="0">
+            <a:schemeClr val="accent1"/>
+          </a:effectRef>
+          <a:fontRef idx="minor">
+            <a:schemeClr val="lt1"/>
+          </a:fontRef>
+        </p:style>
+        <p:txBody>
+          <a:bodyPr rtlCol="0" anchor="ctr"/>
+          <a:lstStyle/>
+          <a:p>
+            <a:pPr algn="ctr"/>
+            <a:endParaRPr lang="en-US"/>
+          </a:p>
+        </p:txBody>
+      </p:sp>
+      <p:sp>
+        <p:nvSpPr>
+          <p:cNvPr id="22" name="TextBox 21">
+            <a:extLst>
+              <a:ext uri="{FF2B5EF4-FFF2-40B4-BE49-F238E27FC236}">
+                <a16:creationId xmlns:a16="http://schemas.microsoft.com/office/drawing/2014/main" id="{DBB7D7DA-1E48-4FE5-98FB-189390A2C1CA}"/>
+              </a:ext>
+            </a:extLst>
+          </p:cNvPr>
+          <p:cNvSpPr txBox="1"/>
+          <p:nvPr/>
+        </p:nvSpPr>
+        <p:spPr>
+          <a:xfrm>
+            <a:off x="9047050" y="760753"/>
+            <a:ext cx="1058175" cy="369332"/>
+          </a:xfrm>
+          <a:prstGeom prst="rect">
+            <a:avLst/>
+          </a:prstGeom>
+          <a:noFill/>
+        </p:spPr>
+        <p:txBody>
+          <a:bodyPr wrap="none" rtlCol="0">
+            <a:spAutoFit/>
+          </a:bodyPr>
+          <a:lstStyle/>
+          <a:p>
+            <a:pPr algn="ctr"/>
+            <a:r>
+              <a:rPr lang="en-US" dirty="0"/>
+              <a:t>Database</a:t>
+            </a:r>
+          </a:p>
+        </p:txBody>
+      </p:sp>
+      <p:sp>
+        <p:nvSpPr>
+          <p:cNvPr id="23" name="Rectangle: Rounded Corners 22">
+            <a:extLst>
+              <a:ext uri="{FF2B5EF4-FFF2-40B4-BE49-F238E27FC236}">
+                <a16:creationId xmlns:a16="http://schemas.microsoft.com/office/drawing/2014/main" id="{115F3080-98DF-4A22-86F5-73AFAEF3FD1C}"/>
+              </a:ext>
+            </a:extLst>
+          </p:cNvPr>
+          <p:cNvSpPr/>
+          <p:nvPr/>
+        </p:nvSpPr>
+        <p:spPr>
+          <a:xfrm>
+            <a:off x="5869189" y="3407841"/>
+            <a:ext cx="5327922" cy="3240937"/>
+          </a:xfrm>
+          <a:prstGeom prst="roundRect">
+            <a:avLst/>
+          </a:prstGeom>
+          <a:noFill/>
+          <a:ln w="44450">
+            <a:solidFill>
+              <a:schemeClr val="tx1"/>
+            </a:solidFill>
+          </a:ln>
+        </p:spPr>
+        <p:style>
+          <a:lnRef idx="2">
+            <a:schemeClr val="accent1">
+              <a:shade val="50000"/>
+            </a:schemeClr>
+          </a:lnRef>
+          <a:fillRef idx="1">
+            <a:schemeClr val="accent1"/>
+          </a:fillRef>
+          <a:effectRef idx="0">
+            <a:schemeClr val="accent1"/>
+          </a:effectRef>
+          <a:fontRef idx="minor">
+            <a:schemeClr val="lt1"/>
+          </a:fontRef>
+        </p:style>
+        <p:txBody>
+          <a:bodyPr rtlCol="0" anchor="ctr"/>
+          <a:lstStyle/>
+          <a:p>
+            <a:pPr algn="ctr"/>
+            <a:endParaRPr lang="en-US"/>
+          </a:p>
+        </p:txBody>
+      </p:sp>
+      <p:sp>
+        <p:nvSpPr>
+          <p:cNvPr id="24" name="TextBox 23">
+            <a:extLst>
+              <a:ext uri="{FF2B5EF4-FFF2-40B4-BE49-F238E27FC236}">
+                <a16:creationId xmlns:a16="http://schemas.microsoft.com/office/drawing/2014/main" id="{1CBB8180-A26F-4684-9E99-2448555FDD80}"/>
+              </a:ext>
+            </a:extLst>
+          </p:cNvPr>
+          <p:cNvSpPr txBox="1"/>
+          <p:nvPr/>
+        </p:nvSpPr>
+        <p:spPr>
+          <a:xfrm>
+            <a:off x="6749458" y="3045512"/>
+            <a:ext cx="3677417" cy="369332"/>
+          </a:xfrm>
+          <a:prstGeom prst="rect">
+            <a:avLst/>
+          </a:prstGeom>
+          <a:noFill/>
+        </p:spPr>
+        <p:txBody>
+          <a:bodyPr wrap="none" rtlCol="0">
+            <a:spAutoFit/>
+          </a:bodyPr>
+          <a:lstStyle/>
+          <a:p>
+            <a:r>
+              <a:rPr lang="en-US" dirty="0"/>
+              <a:t>Online/Offline Data (User Controlled)</a:t>
+            </a:r>
+          </a:p>
+        </p:txBody>
+      </p:sp>
+      <p:sp>
+        <p:nvSpPr>
+          <p:cNvPr id="25" name="Rectangle: Rounded Corners 24">
+            <a:extLst>
+              <a:ext uri="{FF2B5EF4-FFF2-40B4-BE49-F238E27FC236}">
+                <a16:creationId xmlns:a16="http://schemas.microsoft.com/office/drawing/2014/main" id="{A9B862EB-614D-473F-A87F-40E3A0759C43}"/>
+              </a:ext>
+            </a:extLst>
+          </p:cNvPr>
+          <p:cNvSpPr/>
+          <p:nvPr/>
+        </p:nvSpPr>
+        <p:spPr>
+          <a:xfrm>
+            <a:off x="941084" y="3457857"/>
+            <a:ext cx="2446709" cy="3240937"/>
+          </a:xfrm>
+          <a:prstGeom prst="roundRect">
+            <a:avLst/>
+          </a:prstGeom>
+          <a:noFill/>
+          <a:ln w="44450">
+            <a:solidFill>
+              <a:schemeClr val="tx1"/>
+            </a:solidFill>
+          </a:ln>
+        </p:spPr>
+        <p:style>
+          <a:lnRef idx="2">
+            <a:schemeClr val="accent1">
+              <a:shade val="50000"/>
+            </a:schemeClr>
+          </a:lnRef>
+          <a:fillRef idx="1">
+            <a:schemeClr val="accent1"/>
+          </a:fillRef>
+          <a:effectRef idx="0">
+            <a:schemeClr val="accent1"/>
+          </a:effectRef>
+          <a:fontRef idx="minor">
+            <a:schemeClr val="lt1"/>
+          </a:fontRef>
+        </p:style>
+        <p:txBody>
+          <a:bodyPr rtlCol="0" anchor="ctr"/>
+          <a:lstStyle/>
+          <a:p>
+            <a:pPr algn="ctr"/>
+            <a:endParaRPr lang="en-US"/>
+          </a:p>
+        </p:txBody>
+      </p:sp>
+      <p:sp>
+        <p:nvSpPr>
+          <p:cNvPr id="26" name="Arrow: Right 25">
+            <a:extLst>
+              <a:ext uri="{FF2B5EF4-FFF2-40B4-BE49-F238E27FC236}">
+                <a16:creationId xmlns:a16="http://schemas.microsoft.com/office/drawing/2014/main" id="{C4F32022-F11E-47B7-B31B-0ED65B484CCA}"/>
+              </a:ext>
+            </a:extLst>
+          </p:cNvPr>
+          <p:cNvSpPr/>
+          <p:nvPr/>
+        </p:nvSpPr>
+        <p:spPr>
+          <a:xfrm rot="10800000" flipV="1">
+            <a:off x="3446072" y="3794957"/>
+            <a:ext cx="2316747" cy="1107683"/>
+          </a:xfrm>
+          <a:prstGeom prst="rightArrow">
+            <a:avLst/>
+          </a:prstGeom>
+        </p:spPr>
+        <p:style>
+          <a:lnRef idx="2">
+            <a:schemeClr val="accent1">
+              <a:shade val="50000"/>
+            </a:schemeClr>
+          </a:lnRef>
+          <a:fillRef idx="1">
+            <a:schemeClr val="accent1"/>
+          </a:fillRef>
+          <a:effectRef idx="0">
+            <a:schemeClr val="accent1"/>
+          </a:effectRef>
+          <a:fontRef idx="minor">
+            <a:schemeClr val="lt1"/>
+          </a:fontRef>
+        </p:style>
+        <p:txBody>
+          <a:bodyPr rtlCol="0" anchor="ctr"/>
+          <a:lstStyle/>
+          <a:p>
+            <a:pPr algn="ctr"/>
+            <a:r>
+              <a:rPr lang="en-US" dirty="0"/>
+              <a:t>Manual Control </a:t>
+            </a:r>
+          </a:p>
+          <a:p>
+            <a:pPr algn="ctr"/>
+            <a:r>
+              <a:rPr lang="en-US" dirty="0"/>
+              <a:t>Controller Updates</a:t>
+            </a:r>
+          </a:p>
+        </p:txBody>
+      </p:sp>
+      <p:sp>
+        <p:nvSpPr>
+          <p:cNvPr id="27" name="TextBox 26">
+            <a:extLst>
+              <a:ext uri="{FF2B5EF4-FFF2-40B4-BE49-F238E27FC236}">
+                <a16:creationId xmlns:a16="http://schemas.microsoft.com/office/drawing/2014/main" id="{5671786D-206F-4DDA-87B4-DA2718112434}"/>
+              </a:ext>
+            </a:extLst>
+          </p:cNvPr>
+          <p:cNvSpPr txBox="1"/>
+          <p:nvPr/>
+        </p:nvSpPr>
+        <p:spPr>
+          <a:xfrm>
+            <a:off x="1269588" y="3038509"/>
+            <a:ext cx="1771447" cy="369332"/>
+          </a:xfrm>
+          <a:prstGeom prst="rect">
+            <a:avLst/>
+          </a:prstGeom>
+          <a:noFill/>
+        </p:spPr>
+        <p:txBody>
+          <a:bodyPr wrap="none" rtlCol="0">
+            <a:spAutoFit/>
+          </a:bodyPr>
+          <a:lstStyle/>
+          <a:p>
+            <a:pPr algn="ctr"/>
+            <a:r>
+              <a:rPr lang="en-US" dirty="0"/>
+              <a:t>Control Software</a:t>
             </a:r>
           </a:p>
         </p:txBody>
@@ -4098,68 +4548,830 @@
       </p:grpSpPr>
       <p:sp>
         <p:nvSpPr>
-          <p:cNvPr id="2" name="Title 1">
-            <a:extLst>
-              <a:ext uri="{FF2B5EF4-FFF2-40B4-BE49-F238E27FC236}">
-                <a16:creationId xmlns:a16="http://schemas.microsoft.com/office/drawing/2014/main" id="{6C151666-22D0-41B0-9E54-8DC46A427CED}"/>
-              </a:ext>
-            </a:extLst>
-          </p:cNvPr>
-          <p:cNvSpPr>
-            <a:spLocks noGrp="1"/>
-          </p:cNvSpPr>
-          <p:nvPr>
-            <p:ph type="title"/>
-          </p:nvPr>
-        </p:nvSpPr>
-        <p:spPr/>
-        <p:txBody>
-          <a:bodyPr/>
+          <p:cNvPr id="4" name="Rectangle: Rounded Corners 3">
+            <a:extLst>
+              <a:ext uri="{FF2B5EF4-FFF2-40B4-BE49-F238E27FC236}">
+                <a16:creationId xmlns:a16="http://schemas.microsoft.com/office/drawing/2014/main" id="{F9ADBDAF-A007-45F0-A7CE-14D3A52B2BA1}"/>
+              </a:ext>
+            </a:extLst>
+          </p:cNvPr>
+          <p:cNvSpPr/>
+          <p:nvPr/>
+        </p:nvSpPr>
+        <p:spPr>
+          <a:xfrm>
+            <a:off x="895350" y="600075"/>
+            <a:ext cx="2085975" cy="1190625"/>
+          </a:xfrm>
+          <a:prstGeom prst="roundRect">
+            <a:avLst/>
+          </a:prstGeom>
+        </p:spPr>
+        <p:style>
+          <a:lnRef idx="2">
+            <a:schemeClr val="accent1">
+              <a:shade val="50000"/>
+            </a:schemeClr>
+          </a:lnRef>
+          <a:fillRef idx="1">
+            <a:schemeClr val="accent1"/>
+          </a:fillRef>
+          <a:effectRef idx="0">
+            <a:schemeClr val="accent1"/>
+          </a:effectRef>
+          <a:fontRef idx="minor">
+            <a:schemeClr val="lt1"/>
+          </a:fontRef>
+        </p:style>
+        <p:txBody>
+          <a:bodyPr rtlCol="0" anchor="ctr"/>
           <a:lstStyle/>
           <a:p>
             <a:pPr algn="ctr"/>
             <a:r>
               <a:rPr lang="en-US" dirty="0"/>
-              <a:t>Outstanding Questions</a:t>
-            </a:r>
-          </a:p>
-        </p:txBody>
-      </p:sp>
-      <p:sp>
-        <p:nvSpPr>
-          <p:cNvPr id="3" name="Content Placeholder 2">
-            <a:extLst>
-              <a:ext uri="{FF2B5EF4-FFF2-40B4-BE49-F238E27FC236}">
-                <a16:creationId xmlns:a16="http://schemas.microsoft.com/office/drawing/2014/main" id="{C6749A8F-FF72-4782-B31C-E07B20F9F037}"/>
-              </a:ext>
-            </a:extLst>
-          </p:cNvPr>
-          <p:cNvSpPr>
-            <a:spLocks noGrp="1"/>
-          </p:cNvSpPr>
-          <p:nvPr>
-            <p:ph idx="1"/>
-          </p:nvPr>
-        </p:nvSpPr>
-        <p:spPr/>
-        <p:txBody>
-          <a:bodyPr/>
-          <a:lstStyle/>
-          <a:p>
+              <a:t>Make Fake Data</a:t>
+            </a:r>
+          </a:p>
+        </p:txBody>
+      </p:sp>
+      <p:sp>
+        <p:nvSpPr>
+          <p:cNvPr id="6" name="Rectangle: Rounded Corners 5">
+            <a:extLst>
+              <a:ext uri="{FF2B5EF4-FFF2-40B4-BE49-F238E27FC236}">
+                <a16:creationId xmlns:a16="http://schemas.microsoft.com/office/drawing/2014/main" id="{8C351E35-E26B-4971-9A99-1E3FFD30A663}"/>
+              </a:ext>
+            </a:extLst>
+          </p:cNvPr>
+          <p:cNvSpPr/>
+          <p:nvPr/>
+        </p:nvSpPr>
+        <p:spPr>
+          <a:xfrm>
+            <a:off x="4634995" y="600075"/>
+            <a:ext cx="2085975" cy="1190625"/>
+          </a:xfrm>
+          <a:prstGeom prst="roundRect">
+            <a:avLst/>
+          </a:prstGeom>
+        </p:spPr>
+        <p:style>
+          <a:lnRef idx="2">
+            <a:schemeClr val="accent1">
+              <a:shade val="50000"/>
+            </a:schemeClr>
+          </a:lnRef>
+          <a:fillRef idx="1">
+            <a:schemeClr val="accent1"/>
+          </a:fillRef>
+          <a:effectRef idx="0">
+            <a:schemeClr val="accent1"/>
+          </a:effectRef>
+          <a:fontRef idx="minor">
+            <a:schemeClr val="lt1"/>
+          </a:fontRef>
+        </p:style>
+        <p:txBody>
+          <a:bodyPr rtlCol="0" anchor="ctr"/>
+          <a:lstStyle/>
+          <a:p>
+            <a:pPr algn="ctr"/>
             <a:r>
               <a:rPr lang="en-US" dirty="0"/>
-              <a:t>GUI – Best/Easiest</a:t>
-            </a:r>
-          </a:p>
-          <a:p>
-            <a:endParaRPr lang="en-US" dirty="0"/>
+              <a:t>Read Data</a:t>
+            </a:r>
+          </a:p>
+          <a:p>
+            <a:pPr algn="ctr"/>
+            <a:r>
+              <a:rPr lang="en-US" dirty="0"/>
+              <a:t>Transfer to SQL</a:t>
+            </a:r>
+          </a:p>
+        </p:txBody>
+      </p:sp>
+      <p:sp>
+        <p:nvSpPr>
+          <p:cNvPr id="7" name="Rectangle: Rounded Corners 6">
+            <a:extLst>
+              <a:ext uri="{FF2B5EF4-FFF2-40B4-BE49-F238E27FC236}">
+                <a16:creationId xmlns:a16="http://schemas.microsoft.com/office/drawing/2014/main" id="{07612215-AD8E-4BCD-A428-AE2E99DEE9FF}"/>
+              </a:ext>
+            </a:extLst>
+          </p:cNvPr>
+          <p:cNvSpPr/>
+          <p:nvPr/>
+        </p:nvSpPr>
+        <p:spPr>
+          <a:xfrm>
+            <a:off x="8504662" y="574442"/>
+            <a:ext cx="2085975" cy="1190625"/>
+          </a:xfrm>
+          <a:prstGeom prst="roundRect">
+            <a:avLst/>
+          </a:prstGeom>
+        </p:spPr>
+        <p:style>
+          <a:lnRef idx="2">
+            <a:schemeClr val="accent1">
+              <a:shade val="50000"/>
+            </a:schemeClr>
+          </a:lnRef>
+          <a:fillRef idx="1">
+            <a:schemeClr val="accent1"/>
+          </a:fillRef>
+          <a:effectRef idx="0">
+            <a:schemeClr val="accent1"/>
+          </a:effectRef>
+          <a:fontRef idx="minor">
+            <a:schemeClr val="lt1"/>
+          </a:fontRef>
+        </p:style>
+        <p:txBody>
+          <a:bodyPr rtlCol="0" anchor="ctr"/>
+          <a:lstStyle/>
+          <a:p>
+            <a:pPr algn="ctr"/>
+            <a:r>
+              <a:rPr lang="en-US" dirty="0"/>
+              <a:t>SQL</a:t>
+            </a:r>
+          </a:p>
+          <a:p>
+            <a:pPr algn="ctr"/>
+            <a:r>
+              <a:rPr lang="en-US" dirty="0"/>
+              <a:t>Database</a:t>
+            </a:r>
+          </a:p>
+        </p:txBody>
+      </p:sp>
+      <p:sp>
+        <p:nvSpPr>
+          <p:cNvPr id="8" name="Rectangle: Rounded Corners 7">
+            <a:extLst>
+              <a:ext uri="{FF2B5EF4-FFF2-40B4-BE49-F238E27FC236}">
+                <a16:creationId xmlns:a16="http://schemas.microsoft.com/office/drawing/2014/main" id="{0F1F6176-AB61-425D-A73C-8B7909198646}"/>
+              </a:ext>
+            </a:extLst>
+          </p:cNvPr>
+          <p:cNvSpPr/>
+          <p:nvPr/>
+        </p:nvSpPr>
+        <p:spPr>
+          <a:xfrm>
+            <a:off x="4696851" y="4803686"/>
+            <a:ext cx="2085975" cy="1190625"/>
+          </a:xfrm>
+          <a:prstGeom prst="roundRect">
+            <a:avLst/>
+          </a:prstGeom>
+        </p:spPr>
+        <p:style>
+          <a:lnRef idx="2">
+            <a:schemeClr val="accent1">
+              <a:shade val="50000"/>
+            </a:schemeClr>
+          </a:lnRef>
+          <a:fillRef idx="1">
+            <a:schemeClr val="accent1"/>
+          </a:fillRef>
+          <a:effectRef idx="0">
+            <a:schemeClr val="accent1"/>
+          </a:effectRef>
+          <a:fontRef idx="minor">
+            <a:schemeClr val="lt1"/>
+          </a:fontRef>
+        </p:style>
+        <p:txBody>
+          <a:bodyPr rtlCol="0" anchor="ctr"/>
+          <a:lstStyle/>
+          <a:p>
+            <a:pPr algn="ctr"/>
+            <a:r>
+              <a:rPr lang="en-US" dirty="0"/>
+              <a:t>Live Plotting</a:t>
+            </a:r>
+          </a:p>
+        </p:txBody>
+      </p:sp>
+      <p:sp>
+        <p:nvSpPr>
+          <p:cNvPr id="9" name="Arrow: Right 8">
+            <a:extLst>
+              <a:ext uri="{FF2B5EF4-FFF2-40B4-BE49-F238E27FC236}">
+                <a16:creationId xmlns:a16="http://schemas.microsoft.com/office/drawing/2014/main" id="{69FA73FA-44F4-48A7-B8CD-9EBCEBADBAE3}"/>
+              </a:ext>
+            </a:extLst>
+          </p:cNvPr>
+          <p:cNvSpPr/>
+          <p:nvPr/>
+        </p:nvSpPr>
+        <p:spPr>
+          <a:xfrm>
+            <a:off x="3267864" y="950911"/>
+            <a:ext cx="1020933" cy="435006"/>
+          </a:xfrm>
+          <a:prstGeom prst="rightArrow">
+            <a:avLst/>
+          </a:prstGeom>
+        </p:spPr>
+        <p:style>
+          <a:lnRef idx="2">
+            <a:schemeClr val="accent1">
+              <a:shade val="50000"/>
+            </a:schemeClr>
+          </a:lnRef>
+          <a:fillRef idx="1">
+            <a:schemeClr val="accent1"/>
+          </a:fillRef>
+          <a:effectRef idx="0">
+            <a:schemeClr val="accent1"/>
+          </a:effectRef>
+          <a:fontRef idx="minor">
+            <a:schemeClr val="lt1"/>
+          </a:fontRef>
+        </p:style>
+        <p:txBody>
+          <a:bodyPr rtlCol="0" anchor="ctr"/>
+          <a:lstStyle/>
+          <a:p>
+            <a:pPr algn="ctr"/>
+            <a:endParaRPr lang="en-US"/>
+          </a:p>
+        </p:txBody>
+      </p:sp>
+      <p:sp>
+        <p:nvSpPr>
+          <p:cNvPr id="10" name="Arrow: Right 9">
+            <a:extLst>
+              <a:ext uri="{FF2B5EF4-FFF2-40B4-BE49-F238E27FC236}">
+                <a16:creationId xmlns:a16="http://schemas.microsoft.com/office/drawing/2014/main" id="{8F41B184-BACA-4444-B9B9-44039A072774}"/>
+              </a:ext>
+            </a:extLst>
+          </p:cNvPr>
+          <p:cNvSpPr/>
+          <p:nvPr/>
+        </p:nvSpPr>
+        <p:spPr>
+          <a:xfrm>
+            <a:off x="7137531" y="950911"/>
+            <a:ext cx="1020933" cy="435006"/>
+          </a:xfrm>
+          <a:prstGeom prst="rightArrow">
+            <a:avLst/>
+          </a:prstGeom>
+        </p:spPr>
+        <p:style>
+          <a:lnRef idx="2">
+            <a:schemeClr val="accent1">
+              <a:shade val="50000"/>
+            </a:schemeClr>
+          </a:lnRef>
+          <a:fillRef idx="1">
+            <a:schemeClr val="accent1"/>
+          </a:fillRef>
+          <a:effectRef idx="0">
+            <a:schemeClr val="accent1"/>
+          </a:effectRef>
+          <a:fontRef idx="minor">
+            <a:schemeClr val="lt1"/>
+          </a:fontRef>
+        </p:style>
+        <p:txBody>
+          <a:bodyPr rtlCol="0" anchor="ctr"/>
+          <a:lstStyle/>
+          <a:p>
+            <a:pPr algn="ctr"/>
+            <a:endParaRPr lang="en-US"/>
+          </a:p>
+        </p:txBody>
+      </p:sp>
+      <p:sp>
+        <p:nvSpPr>
+          <p:cNvPr id="11" name="Rectangle: Rounded Corners 10">
+            <a:extLst>
+              <a:ext uri="{FF2B5EF4-FFF2-40B4-BE49-F238E27FC236}">
+                <a16:creationId xmlns:a16="http://schemas.microsoft.com/office/drawing/2014/main" id="{D5D15D07-BF9B-4BE6-BE5D-E1A1B0357C9A}"/>
+              </a:ext>
+            </a:extLst>
+          </p:cNvPr>
+          <p:cNvSpPr/>
+          <p:nvPr/>
+        </p:nvSpPr>
+        <p:spPr>
+          <a:xfrm>
+            <a:off x="4634995" y="2378662"/>
+            <a:ext cx="2085975" cy="1190625"/>
+          </a:xfrm>
+          <a:prstGeom prst="roundRect">
+            <a:avLst/>
+          </a:prstGeom>
+        </p:spPr>
+        <p:style>
+          <a:lnRef idx="2">
+            <a:schemeClr val="accent1">
+              <a:shade val="50000"/>
+            </a:schemeClr>
+          </a:lnRef>
+          <a:fillRef idx="1">
+            <a:schemeClr val="accent1"/>
+          </a:fillRef>
+          <a:effectRef idx="0">
+            <a:schemeClr val="accent1"/>
+          </a:effectRef>
+          <a:fontRef idx="minor">
+            <a:schemeClr val="lt1"/>
+          </a:fontRef>
+        </p:style>
+        <p:txBody>
+          <a:bodyPr rtlCol="0" anchor="ctr"/>
+          <a:lstStyle/>
+          <a:p>
+            <a:pPr algn="ctr"/>
+            <a:r>
+              <a:rPr lang="en-US" dirty="0"/>
+              <a:t>Read In Data</a:t>
+            </a:r>
+          </a:p>
+        </p:txBody>
+      </p:sp>
+      <p:sp>
+        <p:nvSpPr>
+          <p:cNvPr id="12" name="Arrow: Right 11">
+            <a:extLst>
+              <a:ext uri="{FF2B5EF4-FFF2-40B4-BE49-F238E27FC236}">
+                <a16:creationId xmlns:a16="http://schemas.microsoft.com/office/drawing/2014/main" id="{E2452017-3BAC-4941-952B-99BFBBE344F7}"/>
+              </a:ext>
+            </a:extLst>
+          </p:cNvPr>
+          <p:cNvSpPr/>
+          <p:nvPr/>
+        </p:nvSpPr>
+        <p:spPr>
+          <a:xfrm rot="8609399">
+            <a:off x="7024964" y="2095367"/>
+            <a:ext cx="1253808" cy="435006"/>
+          </a:xfrm>
+          <a:prstGeom prst="rightArrow">
+            <a:avLst/>
+          </a:prstGeom>
+        </p:spPr>
+        <p:style>
+          <a:lnRef idx="2">
+            <a:schemeClr val="accent1">
+              <a:shade val="50000"/>
+            </a:schemeClr>
+          </a:lnRef>
+          <a:fillRef idx="1">
+            <a:schemeClr val="accent1"/>
+          </a:fillRef>
+          <a:effectRef idx="0">
+            <a:schemeClr val="accent1"/>
+          </a:effectRef>
+          <a:fontRef idx="minor">
+            <a:schemeClr val="lt1"/>
+          </a:fontRef>
+        </p:style>
+        <p:txBody>
+          <a:bodyPr rtlCol="0" anchor="ctr"/>
+          <a:lstStyle/>
+          <a:p>
+            <a:pPr algn="ctr"/>
+            <a:endParaRPr lang="en-US"/>
+          </a:p>
+        </p:txBody>
+      </p:sp>
+      <p:sp>
+        <p:nvSpPr>
+          <p:cNvPr id="13" name="Arrow: Right 12">
+            <a:extLst>
+              <a:ext uri="{FF2B5EF4-FFF2-40B4-BE49-F238E27FC236}">
+                <a16:creationId xmlns:a16="http://schemas.microsoft.com/office/drawing/2014/main" id="{B4D32617-76A4-4EA0-9D03-57CA9FC50593}"/>
+              </a:ext>
+            </a:extLst>
+          </p:cNvPr>
+          <p:cNvSpPr/>
+          <p:nvPr/>
+        </p:nvSpPr>
+        <p:spPr>
+          <a:xfrm rot="10800000">
+            <a:off x="3161676" y="2756471"/>
+            <a:ext cx="1175704" cy="435006"/>
+          </a:xfrm>
+          <a:prstGeom prst="rightArrow">
+            <a:avLst/>
+          </a:prstGeom>
+        </p:spPr>
+        <p:style>
+          <a:lnRef idx="2">
+            <a:schemeClr val="accent1">
+              <a:shade val="50000"/>
+            </a:schemeClr>
+          </a:lnRef>
+          <a:fillRef idx="1">
+            <a:schemeClr val="accent1"/>
+          </a:fillRef>
+          <a:effectRef idx="0">
+            <a:schemeClr val="accent1"/>
+          </a:effectRef>
+          <a:fontRef idx="minor">
+            <a:schemeClr val="lt1"/>
+          </a:fontRef>
+        </p:style>
+        <p:txBody>
+          <a:bodyPr rtlCol="0" anchor="ctr"/>
+          <a:lstStyle/>
+          <a:p>
+            <a:pPr algn="ctr"/>
+            <a:endParaRPr lang="en-US"/>
+          </a:p>
+        </p:txBody>
+      </p:sp>
+      <p:sp>
+        <p:nvSpPr>
+          <p:cNvPr id="14" name="Rectangle: Rounded Corners 13">
+            <a:extLst>
+              <a:ext uri="{FF2B5EF4-FFF2-40B4-BE49-F238E27FC236}">
+                <a16:creationId xmlns:a16="http://schemas.microsoft.com/office/drawing/2014/main" id="{39AAFBC4-A421-4E55-BEF9-46824FA3B37F}"/>
+              </a:ext>
+            </a:extLst>
+          </p:cNvPr>
+          <p:cNvSpPr/>
+          <p:nvPr/>
+        </p:nvSpPr>
+        <p:spPr>
+          <a:xfrm>
+            <a:off x="8504661" y="4803686"/>
+            <a:ext cx="2085975" cy="1190625"/>
+          </a:xfrm>
+          <a:prstGeom prst="roundRect">
+            <a:avLst/>
+          </a:prstGeom>
+        </p:spPr>
+        <p:style>
+          <a:lnRef idx="2">
+            <a:schemeClr val="accent1">
+              <a:shade val="50000"/>
+            </a:schemeClr>
+          </a:lnRef>
+          <a:fillRef idx="1">
+            <a:schemeClr val="accent1"/>
+          </a:fillRef>
+          <a:effectRef idx="0">
+            <a:schemeClr val="accent1"/>
+          </a:effectRef>
+          <a:fontRef idx="minor">
+            <a:schemeClr val="lt1"/>
+          </a:fontRef>
+        </p:style>
+        <p:txBody>
+          <a:bodyPr rtlCol="0" anchor="ctr"/>
+          <a:lstStyle/>
+          <a:p>
+            <a:pPr algn="ctr"/>
+            <a:r>
+              <a:rPr lang="en-US" dirty="0"/>
+              <a:t>Accessing Historical Data</a:t>
+            </a:r>
+          </a:p>
+        </p:txBody>
+      </p:sp>
+      <p:sp>
+        <p:nvSpPr>
+          <p:cNvPr id="15" name="Arrow: Right 14">
+            <a:extLst>
+              <a:ext uri="{FF2B5EF4-FFF2-40B4-BE49-F238E27FC236}">
+                <a16:creationId xmlns:a16="http://schemas.microsoft.com/office/drawing/2014/main" id="{342C7AEB-9ED4-468B-A434-C63CB67F1E6A}"/>
+              </a:ext>
+            </a:extLst>
+          </p:cNvPr>
+          <p:cNvSpPr/>
+          <p:nvPr/>
+        </p:nvSpPr>
+        <p:spPr>
+          <a:xfrm rot="5400000">
+            <a:off x="5276108" y="3968983"/>
+            <a:ext cx="927460" cy="435006"/>
+          </a:xfrm>
+          <a:prstGeom prst="rightArrow">
+            <a:avLst/>
+          </a:prstGeom>
+        </p:spPr>
+        <p:style>
+          <a:lnRef idx="2">
+            <a:schemeClr val="accent1">
+              <a:shade val="50000"/>
+            </a:schemeClr>
+          </a:lnRef>
+          <a:fillRef idx="1">
+            <a:schemeClr val="accent1"/>
+          </a:fillRef>
+          <a:effectRef idx="0">
+            <a:schemeClr val="accent1"/>
+          </a:effectRef>
+          <a:fontRef idx="minor">
+            <a:schemeClr val="lt1"/>
+          </a:fontRef>
+        </p:style>
+        <p:txBody>
+          <a:bodyPr rtlCol="0" anchor="ctr"/>
+          <a:lstStyle/>
+          <a:p>
+            <a:pPr algn="ctr"/>
+            <a:endParaRPr lang="en-US"/>
+          </a:p>
+        </p:txBody>
+      </p:sp>
+      <p:sp>
+        <p:nvSpPr>
+          <p:cNvPr id="16" name="Arrow: Right 15">
+            <a:extLst>
+              <a:ext uri="{FF2B5EF4-FFF2-40B4-BE49-F238E27FC236}">
+                <a16:creationId xmlns:a16="http://schemas.microsoft.com/office/drawing/2014/main" id="{B5101366-C389-4F79-9AF0-D56E36243E65}"/>
+              </a:ext>
+            </a:extLst>
+          </p:cNvPr>
+          <p:cNvSpPr/>
+          <p:nvPr/>
+        </p:nvSpPr>
+        <p:spPr>
+          <a:xfrm rot="1800000">
+            <a:off x="7162292" y="3957771"/>
+            <a:ext cx="1253808" cy="435006"/>
+          </a:xfrm>
+          <a:prstGeom prst="rightArrow">
+            <a:avLst/>
+          </a:prstGeom>
+        </p:spPr>
+        <p:style>
+          <a:lnRef idx="2">
+            <a:schemeClr val="accent1">
+              <a:shade val="50000"/>
+            </a:schemeClr>
+          </a:lnRef>
+          <a:fillRef idx="1">
+            <a:schemeClr val="accent1"/>
+          </a:fillRef>
+          <a:effectRef idx="0">
+            <a:schemeClr val="accent1"/>
+          </a:effectRef>
+          <a:fontRef idx="minor">
+            <a:schemeClr val="lt1"/>
+          </a:fontRef>
+        </p:style>
+        <p:txBody>
+          <a:bodyPr rtlCol="0" anchor="ctr"/>
+          <a:lstStyle/>
+          <a:p>
+            <a:pPr algn="ctr"/>
+            <a:endParaRPr lang="en-US"/>
+          </a:p>
+        </p:txBody>
+      </p:sp>
+      <p:sp>
+        <p:nvSpPr>
+          <p:cNvPr id="17" name="Rectangle: Rounded Corners 16">
+            <a:extLst>
+              <a:ext uri="{FF2B5EF4-FFF2-40B4-BE49-F238E27FC236}">
+                <a16:creationId xmlns:a16="http://schemas.microsoft.com/office/drawing/2014/main" id="{4BD5FFC8-D20A-44D8-9E5E-29566977448D}"/>
+              </a:ext>
+            </a:extLst>
+          </p:cNvPr>
+          <p:cNvSpPr/>
+          <p:nvPr/>
+        </p:nvSpPr>
+        <p:spPr>
+          <a:xfrm>
+            <a:off x="895350" y="2396790"/>
+            <a:ext cx="2085975" cy="1190625"/>
+          </a:xfrm>
+          <a:prstGeom prst="roundRect">
+            <a:avLst/>
+          </a:prstGeom>
+        </p:spPr>
+        <p:style>
+          <a:lnRef idx="2">
+            <a:schemeClr val="accent1">
+              <a:shade val="50000"/>
+            </a:schemeClr>
+          </a:lnRef>
+          <a:fillRef idx="1">
+            <a:schemeClr val="accent1"/>
+          </a:fillRef>
+          <a:effectRef idx="0">
+            <a:schemeClr val="accent1"/>
+          </a:effectRef>
+          <a:fontRef idx="minor">
+            <a:schemeClr val="lt1"/>
+          </a:fontRef>
+        </p:style>
+        <p:txBody>
+          <a:bodyPr rtlCol="0" anchor="ctr"/>
+          <a:lstStyle/>
+          <a:p>
+            <a:pPr algn="ctr"/>
+            <a:r>
+              <a:rPr lang="en-US" dirty="0"/>
+              <a:t>PID</a:t>
+            </a:r>
+          </a:p>
+          <a:p>
+            <a:pPr algn="ctr"/>
+            <a:r>
+              <a:rPr lang="en-US" dirty="0"/>
+              <a:t>Controller</a:t>
+            </a:r>
+          </a:p>
+        </p:txBody>
+      </p:sp>
+      <p:sp>
+        <p:nvSpPr>
+          <p:cNvPr id="18" name="Arrow: Right 17">
+            <a:extLst>
+              <a:ext uri="{FF2B5EF4-FFF2-40B4-BE49-F238E27FC236}">
+                <a16:creationId xmlns:a16="http://schemas.microsoft.com/office/drawing/2014/main" id="{45A5547B-9956-4567-BFCE-6C6151AE9C1D}"/>
+              </a:ext>
+            </a:extLst>
+          </p:cNvPr>
+          <p:cNvSpPr/>
+          <p:nvPr/>
+        </p:nvSpPr>
+        <p:spPr>
+          <a:xfrm rot="5400000">
+            <a:off x="1468299" y="3957771"/>
+            <a:ext cx="927460" cy="435006"/>
+          </a:xfrm>
+          <a:prstGeom prst="rightArrow">
+            <a:avLst/>
+          </a:prstGeom>
+        </p:spPr>
+        <p:style>
+          <a:lnRef idx="2">
+            <a:schemeClr val="accent1">
+              <a:shade val="50000"/>
+            </a:schemeClr>
+          </a:lnRef>
+          <a:fillRef idx="1">
+            <a:schemeClr val="accent1"/>
+          </a:fillRef>
+          <a:effectRef idx="0">
+            <a:schemeClr val="accent1"/>
+          </a:effectRef>
+          <a:fontRef idx="minor">
+            <a:schemeClr val="lt1"/>
+          </a:fontRef>
+        </p:style>
+        <p:txBody>
+          <a:bodyPr rtlCol="0" anchor="ctr"/>
+          <a:lstStyle/>
+          <a:p>
+            <a:pPr algn="ctr"/>
+            <a:endParaRPr lang="en-US"/>
+          </a:p>
+        </p:txBody>
+      </p:sp>
+      <p:sp>
+        <p:nvSpPr>
+          <p:cNvPr id="19" name="Rectangle: Rounded Corners 18">
+            <a:extLst>
+              <a:ext uri="{FF2B5EF4-FFF2-40B4-BE49-F238E27FC236}">
+                <a16:creationId xmlns:a16="http://schemas.microsoft.com/office/drawing/2014/main" id="{2F505633-A7D8-41F2-92E1-861C207F0028}"/>
+              </a:ext>
+            </a:extLst>
+          </p:cNvPr>
+          <p:cNvSpPr/>
+          <p:nvPr/>
+        </p:nvSpPr>
+        <p:spPr>
+          <a:xfrm>
+            <a:off x="889042" y="4803686"/>
+            <a:ext cx="2085975" cy="1190625"/>
+          </a:xfrm>
+          <a:prstGeom prst="roundRect">
+            <a:avLst/>
+          </a:prstGeom>
+        </p:spPr>
+        <p:style>
+          <a:lnRef idx="2">
+            <a:schemeClr val="accent1">
+              <a:shade val="50000"/>
+            </a:schemeClr>
+          </a:lnRef>
+          <a:fillRef idx="1">
+            <a:schemeClr val="accent1"/>
+          </a:fillRef>
+          <a:effectRef idx="0">
+            <a:schemeClr val="accent1"/>
+          </a:effectRef>
+          <a:fontRef idx="minor">
+            <a:schemeClr val="lt1"/>
+          </a:fontRef>
+        </p:style>
+        <p:txBody>
+          <a:bodyPr rtlCol="0" anchor="ctr"/>
+          <a:lstStyle/>
+          <a:p>
+            <a:pPr algn="ctr"/>
+            <a:r>
+              <a:rPr lang="en-US" dirty="0"/>
+              <a:t>Equipment Commands</a:t>
+            </a:r>
+          </a:p>
+        </p:txBody>
+      </p:sp>
+      <p:sp>
+        <p:nvSpPr>
+          <p:cNvPr id="2" name="Rectangle: Rounded Corners 1">
+            <a:extLst>
+              <a:ext uri="{FF2B5EF4-FFF2-40B4-BE49-F238E27FC236}">
+                <a16:creationId xmlns:a16="http://schemas.microsoft.com/office/drawing/2014/main" id="{8AD4A0D2-AE9D-4D3B-AB92-D9D42060C8A3}"/>
+              </a:ext>
+            </a:extLst>
+          </p:cNvPr>
+          <p:cNvSpPr/>
+          <p:nvPr/>
+        </p:nvSpPr>
+        <p:spPr>
+          <a:xfrm>
+            <a:off x="4375761" y="462979"/>
+            <a:ext cx="2553489" cy="1464815"/>
+          </a:xfrm>
+          <a:prstGeom prst="roundRect">
+            <a:avLst/>
+          </a:prstGeom>
+          <a:noFill/>
+          <a:ln w="44450">
+            <a:solidFill>
+              <a:schemeClr val="tx1"/>
+            </a:solidFill>
+          </a:ln>
+        </p:spPr>
+        <p:style>
+          <a:lnRef idx="2">
+            <a:schemeClr val="accent1">
+              <a:shade val="50000"/>
+            </a:schemeClr>
+          </a:lnRef>
+          <a:fillRef idx="1">
+            <a:schemeClr val="accent1"/>
+          </a:fillRef>
+          <a:effectRef idx="0">
+            <a:schemeClr val="accent1"/>
+          </a:effectRef>
+          <a:fontRef idx="minor">
+            <a:schemeClr val="lt1"/>
+          </a:fontRef>
+        </p:style>
+        <p:txBody>
+          <a:bodyPr rtlCol="0" anchor="ctr"/>
+          <a:lstStyle/>
+          <a:p>
+            <a:pPr algn="ctr"/>
+            <a:endParaRPr lang="en-US"/>
+          </a:p>
+        </p:txBody>
+      </p:sp>
+      <p:sp>
+        <p:nvSpPr>
+          <p:cNvPr id="5" name="TextBox 4">
+            <a:extLst>
+              <a:ext uri="{FF2B5EF4-FFF2-40B4-BE49-F238E27FC236}">
+                <a16:creationId xmlns:a16="http://schemas.microsoft.com/office/drawing/2014/main" id="{57602FAB-28E1-48FE-BCF7-B751F5396D69}"/>
+              </a:ext>
+            </a:extLst>
+          </p:cNvPr>
+          <p:cNvSpPr txBox="1"/>
+          <p:nvPr/>
+        </p:nvSpPr>
+        <p:spPr>
+          <a:xfrm>
+            <a:off x="4814508" y="118021"/>
+            <a:ext cx="1916102" cy="369332"/>
+          </a:xfrm>
+          <a:prstGeom prst="rect">
+            <a:avLst/>
+          </a:prstGeom>
+          <a:noFill/>
+        </p:spPr>
+        <p:txBody>
+          <a:bodyPr wrap="none" rtlCol="0">
+            <a:spAutoFit/>
+          </a:bodyPr>
+          <a:lstStyle/>
+          <a:p>
+            <a:r>
+              <a:rPr lang="en-US" dirty="0"/>
+              <a:t>“Read”/Store Data</a:t>
+            </a:r>
           </a:p>
         </p:txBody>
       </p:sp>
     </p:spTree>
     <p:extLst>
       <p:ext uri="{BB962C8B-B14F-4D97-AF65-F5344CB8AC3E}">
-        <p14:creationId xmlns:p14="http://schemas.microsoft.com/office/powerpoint/2010/main" val="1324135825"/>
+        <p14:creationId xmlns:p14="http://schemas.microsoft.com/office/powerpoint/2010/main" val="4185254947"/>
       </p:ext>
     </p:extLst>
   </p:cSld>
@@ -4191,7 +5403,7 @@
           <p:cNvPr id="2" name="Title 1">
             <a:extLst>
               <a:ext uri="{FF2B5EF4-FFF2-40B4-BE49-F238E27FC236}">
-                <a16:creationId xmlns:a16="http://schemas.microsoft.com/office/drawing/2014/main" id="{8B803CA7-3DB4-4B4D-BA16-89F3FA690238}"/>
+                <a16:creationId xmlns:a16="http://schemas.microsoft.com/office/drawing/2014/main" id="{6C151666-22D0-41B0-9E54-8DC46A427CED}"/>
               </a:ext>
             </a:extLst>
           </p:cNvPr>
@@ -4210,7 +5422,7 @@
             <a:pPr algn="ctr"/>
             <a:r>
               <a:rPr lang="en-US" dirty="0"/>
-              <a:t>Testing Methods</a:t>
+              <a:t>Outstanding Questions</a:t>
             </a:r>
           </a:p>
         </p:txBody>
@@ -4220,7 +5432,7 @@
           <p:cNvPr id="3" name="Content Placeholder 2">
             <a:extLst>
               <a:ext uri="{FF2B5EF4-FFF2-40B4-BE49-F238E27FC236}">
-                <a16:creationId xmlns:a16="http://schemas.microsoft.com/office/drawing/2014/main" id="{AF82CA6D-0B14-491F-BBBA-986677496322}"/>
+                <a16:creationId xmlns:a16="http://schemas.microsoft.com/office/drawing/2014/main" id="{C6749A8F-FF72-4782-B31C-E07B20F9F037}"/>
               </a:ext>
             </a:extLst>
           </p:cNvPr>
@@ -4238,15 +5450,18 @@
           <a:p>
             <a:r>
               <a:rPr lang="en-US" dirty="0"/>
-              <a:t>http://www.fao.org/3/ca2796en/CA2796EN.pdf</a:t>
-            </a:r>
+              <a:t>GUI – Best/Easiest</a:t>
+            </a:r>
+          </a:p>
+          <a:p>
+            <a:endParaRPr lang="en-US" dirty="0"/>
           </a:p>
         </p:txBody>
       </p:sp>
     </p:spTree>
     <p:extLst>
       <p:ext uri="{BB962C8B-B14F-4D97-AF65-F5344CB8AC3E}">
-        <p14:creationId xmlns:p14="http://schemas.microsoft.com/office/powerpoint/2010/main" val="1432040007"/>
+        <p14:creationId xmlns:p14="http://schemas.microsoft.com/office/powerpoint/2010/main" val="1324135825"/>
       </p:ext>
     </p:extLst>
   </p:cSld>
@@ -4278,7 +5493,7 @@
           <p:cNvPr id="2" name="Title 1">
             <a:extLst>
               <a:ext uri="{FF2B5EF4-FFF2-40B4-BE49-F238E27FC236}">
-                <a16:creationId xmlns:a16="http://schemas.microsoft.com/office/drawing/2014/main" id="{9EC0DD40-5C84-4AC5-A77E-DE389659DA3B}"/>
+                <a16:creationId xmlns:a16="http://schemas.microsoft.com/office/drawing/2014/main" id="{8B803CA7-3DB4-4B4D-BA16-89F3FA690238}"/>
               </a:ext>
             </a:extLst>
           </p:cNvPr>
@@ -4297,7 +5512,7 @@
             <a:pPr algn="ctr"/>
             <a:r>
               <a:rPr lang="en-US" dirty="0"/>
-              <a:t>Make Fake Data</a:t>
+              <a:t>Testing Methods</a:t>
             </a:r>
           </a:p>
         </p:txBody>
@@ -4307,7 +5522,7 @@
           <p:cNvPr id="3" name="Content Placeholder 2">
             <a:extLst>
               <a:ext uri="{FF2B5EF4-FFF2-40B4-BE49-F238E27FC236}">
-                <a16:creationId xmlns:a16="http://schemas.microsoft.com/office/drawing/2014/main" id="{5397ADCB-A991-4363-A2C6-C23983382340}"/>
+                <a16:creationId xmlns:a16="http://schemas.microsoft.com/office/drawing/2014/main" id="{AF82CA6D-0B14-491F-BBBA-986677496322}"/>
               </a:ext>
             </a:extLst>
           </p:cNvPr>
@@ -4325,61 +5540,15 @@
           <a:p>
             <a:r>
               <a:rPr lang="en-US" dirty="0"/>
-              <a:t>Sensor Class</a:t>
-            </a:r>
-          </a:p>
-          <a:p>
-            <a:pPr lvl="1"/>
-            <a:r>
-              <a:rPr lang="en-US" dirty="0"/>
-              <a:t>Temperature</a:t>
-            </a:r>
-          </a:p>
-          <a:p>
-            <a:pPr lvl="1"/>
-            <a:r>
-              <a:rPr lang="en-US" dirty="0"/>
-              <a:t>Soil Moisture</a:t>
-            </a:r>
-          </a:p>
-          <a:p>
-            <a:pPr lvl="1"/>
-            <a:r>
-              <a:rPr lang="en-US" dirty="0"/>
-              <a:t>Acidity</a:t>
-            </a:r>
-          </a:p>
-          <a:p>
-            <a:pPr lvl="1"/>
-            <a:r>
-              <a:rPr lang="en-US" dirty="0"/>
-              <a:t>Light</a:t>
-            </a:r>
-          </a:p>
-          <a:p>
-            <a:pPr lvl="1"/>
-            <a:r>
-              <a:rPr lang="en-US" dirty="0"/>
-              <a:t>Salinity</a:t>
-            </a:r>
-          </a:p>
-          <a:p>
-            <a:pPr lvl="1"/>
-            <a:r>
-              <a:rPr lang="en-US"/>
-              <a:t>Visual Data</a:t>
-            </a:r>
-          </a:p>
-          <a:p>
-            <a:pPr lvl="1"/>
-            <a:endParaRPr lang="en-US" dirty="0"/>
+              <a:t>http://www.fao.org/3/ca2796en/CA2796EN.pdf</a:t>
+            </a:r>
           </a:p>
         </p:txBody>
       </p:sp>
     </p:spTree>
     <p:extLst>
       <p:ext uri="{BB962C8B-B14F-4D97-AF65-F5344CB8AC3E}">
-        <p14:creationId xmlns:p14="http://schemas.microsoft.com/office/powerpoint/2010/main" val="2630466151"/>
+        <p14:creationId xmlns:p14="http://schemas.microsoft.com/office/powerpoint/2010/main" val="1432040007"/>
       </p:ext>
     </p:extLst>
   </p:cSld>
@@ -4411,6 +5580,139 @@
           <p:cNvPr id="2" name="Title 1">
             <a:extLst>
               <a:ext uri="{FF2B5EF4-FFF2-40B4-BE49-F238E27FC236}">
+                <a16:creationId xmlns:a16="http://schemas.microsoft.com/office/drawing/2014/main" id="{9EC0DD40-5C84-4AC5-A77E-DE389659DA3B}"/>
+              </a:ext>
+            </a:extLst>
+          </p:cNvPr>
+          <p:cNvSpPr>
+            <a:spLocks noGrp="1"/>
+          </p:cNvSpPr>
+          <p:nvPr>
+            <p:ph type="title"/>
+          </p:nvPr>
+        </p:nvSpPr>
+        <p:spPr/>
+        <p:txBody>
+          <a:bodyPr/>
+          <a:lstStyle/>
+          <a:p>
+            <a:pPr algn="ctr"/>
+            <a:r>
+              <a:rPr lang="en-US" dirty="0"/>
+              <a:t>Make Fake Data</a:t>
+            </a:r>
+          </a:p>
+        </p:txBody>
+      </p:sp>
+      <p:sp>
+        <p:nvSpPr>
+          <p:cNvPr id="3" name="Content Placeholder 2">
+            <a:extLst>
+              <a:ext uri="{FF2B5EF4-FFF2-40B4-BE49-F238E27FC236}">
+                <a16:creationId xmlns:a16="http://schemas.microsoft.com/office/drawing/2014/main" id="{5397ADCB-A991-4363-A2C6-C23983382340}"/>
+              </a:ext>
+            </a:extLst>
+          </p:cNvPr>
+          <p:cNvSpPr>
+            <a:spLocks noGrp="1"/>
+          </p:cNvSpPr>
+          <p:nvPr>
+            <p:ph idx="1"/>
+          </p:nvPr>
+        </p:nvSpPr>
+        <p:spPr/>
+        <p:txBody>
+          <a:bodyPr/>
+          <a:lstStyle/>
+          <a:p>
+            <a:r>
+              <a:rPr lang="en-US" dirty="0"/>
+              <a:t>Sensor Class</a:t>
+            </a:r>
+          </a:p>
+          <a:p>
+            <a:pPr lvl="1"/>
+            <a:r>
+              <a:rPr lang="en-US" dirty="0"/>
+              <a:t>Temperature</a:t>
+            </a:r>
+          </a:p>
+          <a:p>
+            <a:pPr lvl="1"/>
+            <a:r>
+              <a:rPr lang="en-US" dirty="0"/>
+              <a:t>Soil Moisture</a:t>
+            </a:r>
+          </a:p>
+          <a:p>
+            <a:pPr lvl="1"/>
+            <a:r>
+              <a:rPr lang="en-US" dirty="0"/>
+              <a:t>Acidity</a:t>
+            </a:r>
+          </a:p>
+          <a:p>
+            <a:pPr lvl="1"/>
+            <a:r>
+              <a:rPr lang="en-US" dirty="0"/>
+              <a:t>Light</a:t>
+            </a:r>
+          </a:p>
+          <a:p>
+            <a:pPr lvl="1"/>
+            <a:r>
+              <a:rPr lang="en-US" dirty="0"/>
+              <a:t>Salinity</a:t>
+            </a:r>
+          </a:p>
+          <a:p>
+            <a:pPr lvl="1"/>
+            <a:r>
+              <a:rPr lang="en-US"/>
+              <a:t>Visual Data</a:t>
+            </a:r>
+          </a:p>
+          <a:p>
+            <a:pPr lvl="1"/>
+            <a:endParaRPr lang="en-US" dirty="0"/>
+          </a:p>
+        </p:txBody>
+      </p:sp>
+    </p:spTree>
+    <p:extLst>
+      <p:ext uri="{BB962C8B-B14F-4D97-AF65-F5344CB8AC3E}">
+        <p14:creationId xmlns:p14="http://schemas.microsoft.com/office/powerpoint/2010/main" val="2630466151"/>
+      </p:ext>
+    </p:extLst>
+  </p:cSld>
+  <p:clrMapOvr>
+    <a:masterClrMapping/>
+  </p:clrMapOvr>
+</p:sld>
+</file>
+
+<file path=ppt/slides/slide6.xml><?xml version="1.0" encoding="utf-8"?>
+<p:sld xmlns:a="http://schemas.openxmlformats.org/drawingml/2006/main" xmlns:r="http://schemas.openxmlformats.org/officeDocument/2006/relationships" xmlns:p="http://schemas.openxmlformats.org/presentationml/2006/main">
+  <p:cSld>
+    <p:spTree>
+      <p:nvGrpSpPr>
+        <p:cNvPr id="1" name=""/>
+        <p:cNvGrpSpPr/>
+        <p:nvPr/>
+      </p:nvGrpSpPr>
+      <p:grpSpPr>
+        <a:xfrm>
+          <a:off x="0" y="0"/>
+          <a:ext cx="0" cy="0"/>
+          <a:chOff x="0" y="0"/>
+          <a:chExt cx="0" cy="0"/>
+        </a:xfrm>
+      </p:grpSpPr>
+      <p:sp>
+        <p:nvSpPr>
+          <p:cNvPr id="2" name="Title 1">
+            <a:extLst>
+              <a:ext uri="{FF2B5EF4-FFF2-40B4-BE49-F238E27FC236}">
                 <a16:creationId xmlns:a16="http://schemas.microsoft.com/office/drawing/2014/main" id="{47E8B3F7-CBC4-4486-9D48-667EB37F18F3}"/>
               </a:ext>
             </a:extLst>
@@ -4522,7 +5824,7 @@
 </p:sld>
 </file>
 
-<file path=ppt/slides/slide6.xml><?xml version="1.0" encoding="utf-8"?>
+<file path=ppt/slides/slide7.xml><?xml version="1.0" encoding="utf-8"?>
 <p:sld xmlns:a="http://schemas.openxmlformats.org/drawingml/2006/main" xmlns:r="http://schemas.openxmlformats.org/officeDocument/2006/relationships" xmlns:p="http://schemas.openxmlformats.org/presentationml/2006/main">
   <p:cSld>
     <p:spTree>

</xml_diff>

<commit_message>
HTTP Server Started, Outline updated, and DB Outline
</commit_message>
<xml_diff>
--- a/Outline.pptx
+++ b/Outline.pptx
@@ -7,11 +7,12 @@
   <p:sldIdLst>
     <p:sldId id="256" r:id="rId2"/>
     <p:sldId id="263" r:id="rId3"/>
-    <p:sldId id="260" r:id="rId4"/>
-    <p:sldId id="258" r:id="rId5"/>
-    <p:sldId id="257" r:id="rId6"/>
-    <p:sldId id="261" r:id="rId7"/>
-    <p:sldId id="262" r:id="rId8"/>
+    <p:sldId id="264" r:id="rId4"/>
+    <p:sldId id="260" r:id="rId5"/>
+    <p:sldId id="258" r:id="rId6"/>
+    <p:sldId id="257" r:id="rId7"/>
+    <p:sldId id="261" r:id="rId8"/>
+    <p:sldId id="262" r:id="rId9"/>
   </p:sldIdLst>
   <p:sldSz cx="12192000" cy="6858000"/>
   <p:notesSz cx="6858000" cy="9144000"/>
@@ -3407,7 +3408,7 @@
         </p:nvSpPr>
         <p:spPr>
           <a:xfrm>
-            <a:off x="4663483" y="1307949"/>
+            <a:off x="4663483" y="1337130"/>
             <a:ext cx="2085975" cy="1190625"/>
           </a:xfrm>
           <a:prstGeom prst="roundRect">
@@ -3709,7 +3710,7 @@
         </p:nvSpPr>
         <p:spPr>
           <a:xfrm rot="5400000">
-            <a:off x="10374095" y="2809555"/>
+            <a:off x="10511637" y="2739597"/>
             <a:ext cx="490059" cy="435006"/>
           </a:xfrm>
           <a:prstGeom prst="rightArrow">
@@ -3755,7 +3756,7 @@
         </p:nvSpPr>
         <p:spPr>
           <a:xfrm rot="10159127" flipV="1">
-            <a:off x="3442369" y="2888397"/>
+            <a:off x="3372331" y="2841555"/>
             <a:ext cx="4874545" cy="415723"/>
           </a:xfrm>
           <a:prstGeom prst="rightArrow">
@@ -4089,8 +4090,8 @@
         </p:nvSpPr>
         <p:spPr>
           <a:xfrm>
-            <a:off x="4404249" y="1170853"/>
-            <a:ext cx="2553489" cy="1464815"/>
+            <a:off x="802641" y="995217"/>
+            <a:ext cx="6155098" cy="1640451"/>
           </a:xfrm>
           <a:prstGeom prst="roundRect">
             <a:avLst/>
@@ -4142,7 +4143,7 @@
         <p:spPr>
           <a:xfrm>
             <a:off x="4663483" y="87627"/>
-            <a:ext cx="2073645" cy="369332"/>
+            <a:ext cx="3657411" cy="369332"/>
           </a:xfrm>
           <a:prstGeom prst="rect">
             <a:avLst/>
@@ -4157,7 +4158,7 @@
           <a:p>
             <a:r>
               <a:rPr lang="en-US" dirty="0"/>
-              <a:t>Ver. 1 – No real data</a:t>
+              <a:t>Ver. 1 – Data artificially made/read in</a:t>
             </a:r>
           </a:p>
         </p:txBody>
@@ -4176,7 +4177,7 @@
         </p:nvSpPr>
         <p:spPr>
           <a:xfrm>
-            <a:off x="5027357" y="760753"/>
+            <a:off x="3055009" y="608112"/>
             <a:ext cx="1503617" cy="369332"/>
           </a:xfrm>
           <a:prstGeom prst="rect">
@@ -4211,8 +4212,8 @@
         </p:nvSpPr>
         <p:spPr>
           <a:xfrm>
-            <a:off x="8299392" y="1143880"/>
-            <a:ext cx="2553489" cy="1464815"/>
+            <a:off x="8299392" y="1002902"/>
+            <a:ext cx="2553489" cy="1605794"/>
           </a:xfrm>
           <a:prstGeom prst="roundRect">
             <a:avLst/>
@@ -4263,7 +4264,7 @@
         </p:nvSpPr>
         <p:spPr>
           <a:xfrm>
-            <a:off x="9047050" y="760753"/>
+            <a:off x="9047048" y="546280"/>
             <a:ext cx="1058175" cy="369332"/>
           </a:xfrm>
           <a:prstGeom prst="rect">
@@ -4299,8 +4300,8 @@
         </p:nvSpPr>
         <p:spPr>
           <a:xfrm>
-            <a:off x="5869189" y="3407841"/>
-            <a:ext cx="5327922" cy="3240937"/>
+            <a:off x="5869189" y="3244129"/>
+            <a:ext cx="5327922" cy="3404649"/>
           </a:xfrm>
           <a:prstGeom prst="roundRect">
             <a:avLst/>
@@ -4351,7 +4352,7 @@
         </p:nvSpPr>
         <p:spPr>
           <a:xfrm>
-            <a:off x="6749458" y="3045512"/>
+            <a:off x="6957739" y="2874797"/>
             <a:ext cx="3677417" cy="369332"/>
           </a:xfrm>
           <a:prstGeom prst="rect">
@@ -4386,8 +4387,8 @@
         </p:nvSpPr>
         <p:spPr>
           <a:xfrm>
-            <a:off x="941084" y="3457857"/>
-            <a:ext cx="2446709" cy="3240937"/>
+            <a:off x="941084" y="3173927"/>
+            <a:ext cx="2398617" cy="3398324"/>
           </a:xfrm>
           <a:prstGeom prst="roundRect">
             <a:avLst/>
@@ -4494,7 +4495,7 @@
         </p:nvSpPr>
         <p:spPr>
           <a:xfrm>
-            <a:off x="1269588" y="3038509"/>
+            <a:off x="1269585" y="2804594"/>
             <a:ext cx="1771447" cy="369332"/>
           </a:xfrm>
           <a:prstGeom prst="rect">
@@ -4512,6 +4513,162 @@
             <a:r>
               <a:rPr lang="en-US" dirty="0"/>
               <a:t>Control Software</a:t>
+            </a:r>
+          </a:p>
+        </p:txBody>
+      </p:sp>
+      <p:sp>
+        <p:nvSpPr>
+          <p:cNvPr id="29" name="TextBox 28">
+            <a:extLst>
+              <a:ext uri="{FF2B5EF4-FFF2-40B4-BE49-F238E27FC236}">
+                <a16:creationId xmlns:a16="http://schemas.microsoft.com/office/drawing/2014/main" id="{8C16B9CD-94F4-4F16-8CB7-FBA96AC76269}"/>
+              </a:ext>
+            </a:extLst>
+          </p:cNvPr>
+          <p:cNvSpPr txBox="1"/>
+          <p:nvPr/>
+        </p:nvSpPr>
+        <p:spPr>
+          <a:xfrm>
+            <a:off x="2970036" y="1002901"/>
+            <a:ext cx="1820307" cy="369332"/>
+          </a:xfrm>
+          <a:prstGeom prst="rect">
+            <a:avLst/>
+          </a:prstGeom>
+          <a:noFill/>
+        </p:spPr>
+        <p:txBody>
+          <a:bodyPr wrap="none" rtlCol="0">
+            <a:spAutoFit/>
+          </a:bodyPr>
+          <a:lstStyle/>
+          <a:p>
+            <a:r>
+              <a:rPr lang="en-US" dirty="0">
+                <a:solidFill>
+                  <a:srgbClr val="C00000"/>
+                </a:solidFill>
+              </a:rPr>
+              <a:t>Army of Arduinos</a:t>
+            </a:r>
+          </a:p>
+        </p:txBody>
+      </p:sp>
+      <p:sp>
+        <p:nvSpPr>
+          <p:cNvPr id="30" name="TextBox 29">
+            <a:extLst>
+              <a:ext uri="{FF2B5EF4-FFF2-40B4-BE49-F238E27FC236}">
+                <a16:creationId xmlns:a16="http://schemas.microsoft.com/office/drawing/2014/main" id="{0C5C9EA4-292A-4250-97B3-CD30B3C9D8C7}"/>
+              </a:ext>
+            </a:extLst>
+          </p:cNvPr>
+          <p:cNvSpPr txBox="1"/>
+          <p:nvPr/>
+        </p:nvSpPr>
+        <p:spPr>
+          <a:xfrm>
+            <a:off x="8930932" y="948803"/>
+            <a:ext cx="1359218" cy="369332"/>
+          </a:xfrm>
+          <a:prstGeom prst="rect">
+            <a:avLst/>
+          </a:prstGeom>
+          <a:noFill/>
+        </p:spPr>
+        <p:txBody>
+          <a:bodyPr wrap="none" rtlCol="0">
+            <a:spAutoFit/>
+          </a:bodyPr>
+          <a:lstStyle/>
+          <a:p>
+            <a:r>
+              <a:rPr lang="en-US" dirty="0">
+                <a:solidFill>
+                  <a:srgbClr val="C00000"/>
+                </a:solidFill>
+              </a:rPr>
+              <a:t>Raspberry Pi</a:t>
+            </a:r>
+          </a:p>
+        </p:txBody>
+      </p:sp>
+      <p:sp>
+        <p:nvSpPr>
+          <p:cNvPr id="31" name="TextBox 30">
+            <a:extLst>
+              <a:ext uri="{FF2B5EF4-FFF2-40B4-BE49-F238E27FC236}">
+                <a16:creationId xmlns:a16="http://schemas.microsoft.com/office/drawing/2014/main" id="{E926519F-0B66-42D4-AD2F-4B6D44BD17B1}"/>
+              </a:ext>
+            </a:extLst>
+          </p:cNvPr>
+          <p:cNvSpPr txBox="1"/>
+          <p:nvPr/>
+        </p:nvSpPr>
+        <p:spPr>
+          <a:xfrm>
+            <a:off x="1304233" y="3173926"/>
+            <a:ext cx="1820307" cy="369332"/>
+          </a:xfrm>
+          <a:prstGeom prst="rect">
+            <a:avLst/>
+          </a:prstGeom>
+          <a:noFill/>
+        </p:spPr>
+        <p:txBody>
+          <a:bodyPr wrap="none" rtlCol="0">
+            <a:spAutoFit/>
+          </a:bodyPr>
+          <a:lstStyle/>
+          <a:p>
+            <a:r>
+              <a:rPr lang="en-US" dirty="0">
+                <a:solidFill>
+                  <a:srgbClr val="C00000"/>
+                </a:solidFill>
+              </a:rPr>
+              <a:t>Army of Arduinos</a:t>
+            </a:r>
+          </a:p>
+        </p:txBody>
+      </p:sp>
+      <p:sp>
+        <p:nvSpPr>
+          <p:cNvPr id="32" name="TextBox 31">
+            <a:extLst>
+              <a:ext uri="{FF2B5EF4-FFF2-40B4-BE49-F238E27FC236}">
+                <a16:creationId xmlns:a16="http://schemas.microsoft.com/office/drawing/2014/main" id="{205FECD7-EB82-4FA8-9FA4-77F975DCDA04}"/>
+              </a:ext>
+            </a:extLst>
+          </p:cNvPr>
+          <p:cNvSpPr txBox="1"/>
+          <p:nvPr/>
+        </p:nvSpPr>
+        <p:spPr>
+          <a:xfrm>
+            <a:off x="8186756" y="3244334"/>
+            <a:ext cx="785664" cy="369332"/>
+          </a:xfrm>
+          <a:prstGeom prst="rect">
+            <a:avLst/>
+          </a:prstGeom>
+          <a:noFill/>
+        </p:spPr>
+        <p:txBody>
+          <a:bodyPr wrap="none" rtlCol="0">
+            <a:spAutoFit/>
+          </a:bodyPr>
+          <a:lstStyle/>
+          <a:p>
+            <a:r>
+              <a:rPr lang="en-US" dirty="0">
+                <a:solidFill>
+                  <a:srgbClr val="C00000"/>
+                </a:solidFill>
+              </a:rPr>
+              <a:t>Server</a:t>
             </a:r>
           </a:p>
         </p:txBody>
@@ -4548,822 +4705,140 @@
       </p:grpSpPr>
       <p:sp>
         <p:nvSpPr>
-          <p:cNvPr id="4" name="Rectangle: Rounded Corners 3">
-            <a:extLst>
-              <a:ext uri="{FF2B5EF4-FFF2-40B4-BE49-F238E27FC236}">
-                <a16:creationId xmlns:a16="http://schemas.microsoft.com/office/drawing/2014/main" id="{F9ADBDAF-A007-45F0-A7CE-14D3A52B2BA1}"/>
-              </a:ext>
-            </a:extLst>
-          </p:cNvPr>
-          <p:cNvSpPr/>
-          <p:nvPr/>
-        </p:nvSpPr>
-        <p:spPr>
-          <a:xfrm>
-            <a:off x="895350" y="600075"/>
-            <a:ext cx="2085975" cy="1190625"/>
-          </a:xfrm>
-          <a:prstGeom prst="roundRect">
-            <a:avLst/>
-          </a:prstGeom>
-        </p:spPr>
-        <p:style>
-          <a:lnRef idx="2">
-            <a:schemeClr val="accent1">
-              <a:shade val="50000"/>
-            </a:schemeClr>
-          </a:lnRef>
-          <a:fillRef idx="1">
-            <a:schemeClr val="accent1"/>
-          </a:fillRef>
-          <a:effectRef idx="0">
-            <a:schemeClr val="accent1"/>
-          </a:effectRef>
-          <a:fontRef idx="minor">
-            <a:schemeClr val="lt1"/>
-          </a:fontRef>
-        </p:style>
-        <p:txBody>
-          <a:bodyPr rtlCol="0" anchor="ctr"/>
+          <p:cNvPr id="2" name="Title 1">
+            <a:extLst>
+              <a:ext uri="{FF2B5EF4-FFF2-40B4-BE49-F238E27FC236}">
+                <a16:creationId xmlns:a16="http://schemas.microsoft.com/office/drawing/2014/main" id="{220D089C-7F86-431A-94C0-19F86C0D0C61}"/>
+              </a:ext>
+            </a:extLst>
+          </p:cNvPr>
+          <p:cNvSpPr>
+            <a:spLocks noGrp="1"/>
+          </p:cNvSpPr>
+          <p:nvPr>
+            <p:ph type="title"/>
+          </p:nvPr>
+        </p:nvSpPr>
+        <p:spPr/>
+        <p:txBody>
+          <a:bodyPr/>
           <a:lstStyle/>
           <a:p>
             <a:pPr algn="ctr"/>
             <a:r>
               <a:rPr lang="en-US" dirty="0"/>
-              <a:t>Make Fake Data</a:t>
-            </a:r>
-          </a:p>
-        </p:txBody>
-      </p:sp>
-      <p:sp>
-        <p:nvSpPr>
-          <p:cNvPr id="6" name="Rectangle: Rounded Corners 5">
-            <a:extLst>
-              <a:ext uri="{FF2B5EF4-FFF2-40B4-BE49-F238E27FC236}">
-                <a16:creationId xmlns:a16="http://schemas.microsoft.com/office/drawing/2014/main" id="{8C351E35-E26B-4971-9A99-1E3FFD30A663}"/>
-              </a:ext>
-            </a:extLst>
-          </p:cNvPr>
-          <p:cNvSpPr/>
-          <p:nvPr/>
-        </p:nvSpPr>
-        <p:spPr>
-          <a:xfrm>
-            <a:off x="4634995" y="600075"/>
-            <a:ext cx="2085975" cy="1190625"/>
-          </a:xfrm>
-          <a:prstGeom prst="roundRect">
-            <a:avLst/>
-          </a:prstGeom>
-        </p:spPr>
-        <p:style>
-          <a:lnRef idx="2">
-            <a:schemeClr val="accent1">
-              <a:shade val="50000"/>
-            </a:schemeClr>
-          </a:lnRef>
-          <a:fillRef idx="1">
-            <a:schemeClr val="accent1"/>
-          </a:fillRef>
-          <a:effectRef idx="0">
-            <a:schemeClr val="accent1"/>
-          </a:effectRef>
-          <a:fontRef idx="minor">
-            <a:schemeClr val="lt1"/>
-          </a:fontRef>
-        </p:style>
-        <p:txBody>
-          <a:bodyPr rtlCol="0" anchor="ctr"/>
-          <a:lstStyle/>
-          <a:p>
-            <a:pPr algn="ctr"/>
-            <a:r>
-              <a:rPr lang="en-US" dirty="0"/>
-              <a:t>Read Data</a:t>
-            </a:r>
-          </a:p>
-          <a:p>
-            <a:pPr algn="ctr"/>
-            <a:r>
-              <a:rPr lang="en-US" dirty="0"/>
-              <a:t>Transfer to SQL</a:t>
-            </a:r>
-          </a:p>
-        </p:txBody>
-      </p:sp>
-      <p:sp>
-        <p:nvSpPr>
-          <p:cNvPr id="7" name="Rectangle: Rounded Corners 6">
-            <a:extLst>
-              <a:ext uri="{FF2B5EF4-FFF2-40B4-BE49-F238E27FC236}">
-                <a16:creationId xmlns:a16="http://schemas.microsoft.com/office/drawing/2014/main" id="{07612215-AD8E-4BCD-A428-AE2E99DEE9FF}"/>
-              </a:ext>
-            </a:extLst>
-          </p:cNvPr>
-          <p:cNvSpPr/>
-          <p:nvPr/>
-        </p:nvSpPr>
-        <p:spPr>
-          <a:xfrm>
-            <a:off x="8504662" y="574442"/>
-            <a:ext cx="2085975" cy="1190625"/>
-          </a:xfrm>
-          <a:prstGeom prst="roundRect">
-            <a:avLst/>
-          </a:prstGeom>
-        </p:spPr>
-        <p:style>
-          <a:lnRef idx="2">
-            <a:schemeClr val="accent1">
-              <a:shade val="50000"/>
-            </a:schemeClr>
-          </a:lnRef>
-          <a:fillRef idx="1">
-            <a:schemeClr val="accent1"/>
-          </a:fillRef>
-          <a:effectRef idx="0">
-            <a:schemeClr val="accent1"/>
-          </a:effectRef>
-          <a:fontRef idx="minor">
-            <a:schemeClr val="lt1"/>
-          </a:fontRef>
-        </p:style>
-        <p:txBody>
-          <a:bodyPr rtlCol="0" anchor="ctr"/>
-          <a:lstStyle/>
-          <a:p>
-            <a:pPr algn="ctr"/>
+              <a:t>HTTP Server</a:t>
+            </a:r>
+          </a:p>
+        </p:txBody>
+      </p:sp>
+      <p:sp>
+        <p:nvSpPr>
+          <p:cNvPr id="3" name="Content Placeholder 2">
+            <a:extLst>
+              <a:ext uri="{FF2B5EF4-FFF2-40B4-BE49-F238E27FC236}">
+                <a16:creationId xmlns:a16="http://schemas.microsoft.com/office/drawing/2014/main" id="{453FB404-65B3-4DD7-9F43-9F70B75F6BAE}"/>
+              </a:ext>
+            </a:extLst>
+          </p:cNvPr>
+          <p:cNvSpPr>
+            <a:spLocks noGrp="1"/>
+          </p:cNvSpPr>
+          <p:nvPr>
+            <p:ph idx="1"/>
+          </p:nvPr>
+        </p:nvSpPr>
+        <p:spPr/>
+        <p:txBody>
+          <a:bodyPr/>
+          <a:lstStyle/>
+          <a:p>
             <a:r>
               <a:rPr lang="en-US" dirty="0"/>
               <a:t>SQL</a:t>
             </a:r>
           </a:p>
           <a:p>
-            <a:pPr algn="ctr"/>
+            <a:pPr lvl="1"/>
             <a:r>
               <a:rPr lang="en-US" dirty="0"/>
-              <a:t>Database</a:t>
-            </a:r>
-          </a:p>
-        </p:txBody>
-      </p:sp>
-      <p:sp>
-        <p:nvSpPr>
-          <p:cNvPr id="8" name="Rectangle: Rounded Corners 7">
-            <a:extLst>
-              <a:ext uri="{FF2B5EF4-FFF2-40B4-BE49-F238E27FC236}">
-                <a16:creationId xmlns:a16="http://schemas.microsoft.com/office/drawing/2014/main" id="{0F1F6176-AB61-425D-A73C-8B7909198646}"/>
-              </a:ext>
-            </a:extLst>
-          </p:cNvPr>
-          <p:cNvSpPr/>
-          <p:nvPr/>
-        </p:nvSpPr>
-        <p:spPr>
-          <a:xfrm>
-            <a:off x="4696851" y="4803686"/>
-            <a:ext cx="2085975" cy="1190625"/>
-          </a:xfrm>
-          <a:prstGeom prst="roundRect">
-            <a:avLst/>
-          </a:prstGeom>
-        </p:spPr>
-        <p:style>
-          <a:lnRef idx="2">
-            <a:schemeClr val="accent1">
-              <a:shade val="50000"/>
-            </a:schemeClr>
-          </a:lnRef>
-          <a:fillRef idx="1">
-            <a:schemeClr val="accent1"/>
-          </a:fillRef>
-          <a:effectRef idx="0">
-            <a:schemeClr val="accent1"/>
-          </a:effectRef>
-          <a:fontRef idx="minor">
-            <a:schemeClr val="lt1"/>
-          </a:fontRef>
-        </p:style>
-        <p:txBody>
-          <a:bodyPr rtlCol="0" anchor="ctr"/>
-          <a:lstStyle/>
-          <a:p>
-            <a:pPr algn="ctr"/>
+              <a:t>Watch video on SQL</a:t>
+            </a:r>
+          </a:p>
+          <a:p>
+            <a:pPr lvl="2"/>
             <a:r>
               <a:rPr lang="en-US" dirty="0"/>
-              <a:t>Live Plotting</a:t>
-            </a:r>
-          </a:p>
-        </p:txBody>
-      </p:sp>
-      <p:sp>
-        <p:nvSpPr>
-          <p:cNvPr id="9" name="Arrow: Right 8">
-            <a:extLst>
-              <a:ext uri="{FF2B5EF4-FFF2-40B4-BE49-F238E27FC236}">
-                <a16:creationId xmlns:a16="http://schemas.microsoft.com/office/drawing/2014/main" id="{69FA73FA-44F4-48A7-B8CD-9EBCEBADBAE3}"/>
-              </a:ext>
-            </a:extLst>
-          </p:cNvPr>
-          <p:cNvSpPr/>
-          <p:nvPr/>
-        </p:nvSpPr>
-        <p:spPr>
-          <a:xfrm>
-            <a:off x="3267864" y="950911"/>
-            <a:ext cx="1020933" cy="435006"/>
-          </a:xfrm>
-          <a:prstGeom prst="rightArrow">
-            <a:avLst/>
-          </a:prstGeom>
-        </p:spPr>
-        <p:style>
-          <a:lnRef idx="2">
-            <a:schemeClr val="accent1">
-              <a:shade val="50000"/>
-            </a:schemeClr>
-          </a:lnRef>
-          <a:fillRef idx="1">
-            <a:schemeClr val="accent1"/>
-          </a:fillRef>
-          <a:effectRef idx="0">
-            <a:schemeClr val="accent1"/>
-          </a:effectRef>
-          <a:fontRef idx="minor">
-            <a:schemeClr val="lt1"/>
-          </a:fontRef>
-        </p:style>
-        <p:txBody>
-          <a:bodyPr rtlCol="0" anchor="ctr"/>
-          <a:lstStyle/>
-          <a:p>
-            <a:pPr algn="ctr"/>
-            <a:endParaRPr lang="en-US"/>
-          </a:p>
-        </p:txBody>
-      </p:sp>
-      <p:sp>
-        <p:nvSpPr>
-          <p:cNvPr id="10" name="Arrow: Right 9">
-            <a:extLst>
-              <a:ext uri="{FF2B5EF4-FFF2-40B4-BE49-F238E27FC236}">
-                <a16:creationId xmlns:a16="http://schemas.microsoft.com/office/drawing/2014/main" id="{8F41B184-BACA-4444-B9B9-44039A072774}"/>
-              </a:ext>
-            </a:extLst>
-          </p:cNvPr>
-          <p:cNvSpPr/>
-          <p:nvPr/>
-        </p:nvSpPr>
-        <p:spPr>
-          <a:xfrm>
-            <a:off x="7137531" y="950911"/>
-            <a:ext cx="1020933" cy="435006"/>
-          </a:xfrm>
-          <a:prstGeom prst="rightArrow">
-            <a:avLst/>
-          </a:prstGeom>
-        </p:spPr>
-        <p:style>
-          <a:lnRef idx="2">
-            <a:schemeClr val="accent1">
-              <a:shade val="50000"/>
-            </a:schemeClr>
-          </a:lnRef>
-          <a:fillRef idx="1">
-            <a:schemeClr val="accent1"/>
-          </a:fillRef>
-          <a:effectRef idx="0">
-            <a:schemeClr val="accent1"/>
-          </a:effectRef>
-          <a:fontRef idx="minor">
-            <a:schemeClr val="lt1"/>
-          </a:fontRef>
-        </p:style>
-        <p:txBody>
-          <a:bodyPr rtlCol="0" anchor="ctr"/>
-          <a:lstStyle/>
-          <a:p>
-            <a:pPr algn="ctr"/>
-            <a:endParaRPr lang="en-US"/>
-          </a:p>
-        </p:txBody>
-      </p:sp>
-      <p:sp>
-        <p:nvSpPr>
-          <p:cNvPr id="11" name="Rectangle: Rounded Corners 10">
-            <a:extLst>
-              <a:ext uri="{FF2B5EF4-FFF2-40B4-BE49-F238E27FC236}">
-                <a16:creationId xmlns:a16="http://schemas.microsoft.com/office/drawing/2014/main" id="{D5D15D07-BF9B-4BE6-BE5D-E1A1B0357C9A}"/>
-              </a:ext>
-            </a:extLst>
-          </p:cNvPr>
-          <p:cNvSpPr/>
-          <p:nvPr/>
-        </p:nvSpPr>
-        <p:spPr>
-          <a:xfrm>
-            <a:off x="4634995" y="2378662"/>
-            <a:ext cx="2085975" cy="1190625"/>
-          </a:xfrm>
-          <a:prstGeom prst="roundRect">
-            <a:avLst/>
-          </a:prstGeom>
-        </p:spPr>
-        <p:style>
-          <a:lnRef idx="2">
-            <a:schemeClr val="accent1">
-              <a:shade val="50000"/>
-            </a:schemeClr>
-          </a:lnRef>
-          <a:fillRef idx="1">
-            <a:schemeClr val="accent1"/>
-          </a:fillRef>
-          <a:effectRef idx="0">
-            <a:schemeClr val="accent1"/>
-          </a:effectRef>
-          <a:fontRef idx="minor">
-            <a:schemeClr val="lt1"/>
-          </a:fontRef>
-        </p:style>
-        <p:txBody>
-          <a:bodyPr rtlCol="0" anchor="ctr"/>
-          <a:lstStyle/>
-          <a:p>
-            <a:pPr algn="ctr"/>
+              <a:t>Watch video “Database normalization” 3</a:t>
+            </a:r>
+            <a:r>
+              <a:rPr lang="en-US" baseline="30000" dirty="0"/>
+              <a:t>rd</a:t>
+            </a:r>
             <a:r>
               <a:rPr lang="en-US" dirty="0"/>
-              <a:t>Read In Data</a:t>
-            </a:r>
-          </a:p>
-        </p:txBody>
-      </p:sp>
-      <p:sp>
-        <p:nvSpPr>
-          <p:cNvPr id="12" name="Arrow: Right 11">
-            <a:extLst>
-              <a:ext uri="{FF2B5EF4-FFF2-40B4-BE49-F238E27FC236}">
-                <a16:creationId xmlns:a16="http://schemas.microsoft.com/office/drawing/2014/main" id="{E2452017-3BAC-4941-952B-99BFBBE344F7}"/>
-              </a:ext>
-            </a:extLst>
-          </p:cNvPr>
-          <p:cNvSpPr/>
-          <p:nvPr/>
-        </p:nvSpPr>
-        <p:spPr>
-          <a:xfrm rot="8609399">
-            <a:off x="7024964" y="2095367"/>
-            <a:ext cx="1253808" cy="435006"/>
-          </a:xfrm>
-          <a:prstGeom prst="rightArrow">
-            <a:avLst/>
-          </a:prstGeom>
-        </p:spPr>
-        <p:style>
-          <a:lnRef idx="2">
-            <a:schemeClr val="accent1">
-              <a:shade val="50000"/>
-            </a:schemeClr>
-          </a:lnRef>
-          <a:fillRef idx="1">
-            <a:schemeClr val="accent1"/>
-          </a:fillRef>
-          <a:effectRef idx="0">
-            <a:schemeClr val="accent1"/>
-          </a:effectRef>
-          <a:fontRef idx="minor">
-            <a:schemeClr val="lt1"/>
-          </a:fontRef>
-        </p:style>
-        <p:txBody>
-          <a:bodyPr rtlCol="0" anchor="ctr"/>
-          <a:lstStyle/>
-          <a:p>
-            <a:pPr algn="ctr"/>
-            <a:endParaRPr lang="en-US"/>
-          </a:p>
-        </p:txBody>
-      </p:sp>
-      <p:sp>
-        <p:nvSpPr>
-          <p:cNvPr id="13" name="Arrow: Right 12">
-            <a:extLst>
-              <a:ext uri="{FF2B5EF4-FFF2-40B4-BE49-F238E27FC236}">
-                <a16:creationId xmlns:a16="http://schemas.microsoft.com/office/drawing/2014/main" id="{B4D32617-76A4-4EA0-9D03-57CA9FC50593}"/>
-              </a:ext>
-            </a:extLst>
-          </p:cNvPr>
-          <p:cNvSpPr/>
-          <p:nvPr/>
-        </p:nvSpPr>
-        <p:spPr>
-          <a:xfrm rot="10800000">
-            <a:off x="3161676" y="2756471"/>
-            <a:ext cx="1175704" cy="435006"/>
-          </a:xfrm>
-          <a:prstGeom prst="rightArrow">
-            <a:avLst/>
-          </a:prstGeom>
-        </p:spPr>
-        <p:style>
-          <a:lnRef idx="2">
-            <a:schemeClr val="accent1">
-              <a:shade val="50000"/>
-            </a:schemeClr>
-          </a:lnRef>
-          <a:fillRef idx="1">
-            <a:schemeClr val="accent1"/>
-          </a:fillRef>
-          <a:effectRef idx="0">
-            <a:schemeClr val="accent1"/>
-          </a:effectRef>
-          <a:fontRef idx="minor">
-            <a:schemeClr val="lt1"/>
-          </a:fontRef>
-        </p:style>
-        <p:txBody>
-          <a:bodyPr rtlCol="0" anchor="ctr"/>
-          <a:lstStyle/>
-          <a:p>
-            <a:pPr algn="ctr"/>
-            <a:endParaRPr lang="en-US"/>
-          </a:p>
-        </p:txBody>
-      </p:sp>
-      <p:sp>
-        <p:nvSpPr>
-          <p:cNvPr id="14" name="Rectangle: Rounded Corners 13">
-            <a:extLst>
-              <a:ext uri="{FF2B5EF4-FFF2-40B4-BE49-F238E27FC236}">
-                <a16:creationId xmlns:a16="http://schemas.microsoft.com/office/drawing/2014/main" id="{39AAFBC4-A421-4E55-BEF9-46824FA3B37F}"/>
-              </a:ext>
-            </a:extLst>
-          </p:cNvPr>
-          <p:cNvSpPr/>
-          <p:nvPr/>
-        </p:nvSpPr>
-        <p:spPr>
-          <a:xfrm>
-            <a:off x="8504661" y="4803686"/>
-            <a:ext cx="2085975" cy="1190625"/>
-          </a:xfrm>
-          <a:prstGeom prst="roundRect">
-            <a:avLst/>
-          </a:prstGeom>
-        </p:spPr>
-        <p:style>
-          <a:lnRef idx="2">
-            <a:schemeClr val="accent1">
-              <a:shade val="50000"/>
-            </a:schemeClr>
-          </a:lnRef>
-          <a:fillRef idx="1">
-            <a:schemeClr val="accent1"/>
-          </a:fillRef>
-          <a:effectRef idx="0">
-            <a:schemeClr val="accent1"/>
-          </a:effectRef>
-          <a:fontRef idx="minor">
-            <a:schemeClr val="lt1"/>
-          </a:fontRef>
-        </p:style>
-        <p:txBody>
-          <a:bodyPr rtlCol="0" anchor="ctr"/>
-          <a:lstStyle/>
-          <a:p>
-            <a:pPr algn="ctr"/>
+              <a:t> normalized form</a:t>
+            </a:r>
+          </a:p>
+          <a:p>
+            <a:pPr lvl="1"/>
             <a:r>
               <a:rPr lang="en-US" dirty="0"/>
-              <a:t>Accessing Historical Data</a:t>
-            </a:r>
-          </a:p>
-        </p:txBody>
-      </p:sp>
-      <p:sp>
-        <p:nvSpPr>
-          <p:cNvPr id="15" name="Arrow: Right 14">
-            <a:extLst>
-              <a:ext uri="{FF2B5EF4-FFF2-40B4-BE49-F238E27FC236}">
-                <a16:creationId xmlns:a16="http://schemas.microsoft.com/office/drawing/2014/main" id="{342C7AEB-9ED4-468B-A434-C63CB67F1E6A}"/>
-              </a:ext>
-            </a:extLst>
-          </p:cNvPr>
-          <p:cNvSpPr/>
-          <p:nvPr/>
-        </p:nvSpPr>
-        <p:spPr>
-          <a:xfrm rot="5400000">
-            <a:off x="5276108" y="3968983"/>
-            <a:ext cx="927460" cy="435006"/>
-          </a:xfrm>
-          <a:prstGeom prst="rightArrow">
-            <a:avLst/>
-          </a:prstGeom>
-        </p:spPr>
-        <p:style>
-          <a:lnRef idx="2">
-            <a:schemeClr val="accent1">
-              <a:shade val="50000"/>
-            </a:schemeClr>
-          </a:lnRef>
-          <a:fillRef idx="1">
-            <a:schemeClr val="accent1"/>
-          </a:fillRef>
-          <a:effectRef idx="0">
-            <a:schemeClr val="accent1"/>
-          </a:effectRef>
-          <a:fontRef idx="minor">
-            <a:schemeClr val="lt1"/>
-          </a:fontRef>
-        </p:style>
-        <p:txBody>
-          <a:bodyPr rtlCol="0" anchor="ctr"/>
-          <a:lstStyle/>
-          <a:p>
-            <a:pPr algn="ctr"/>
-            <a:endParaRPr lang="en-US"/>
-          </a:p>
-        </p:txBody>
-      </p:sp>
-      <p:sp>
-        <p:nvSpPr>
-          <p:cNvPr id="16" name="Arrow: Right 15">
-            <a:extLst>
-              <a:ext uri="{FF2B5EF4-FFF2-40B4-BE49-F238E27FC236}">
-                <a16:creationId xmlns:a16="http://schemas.microsoft.com/office/drawing/2014/main" id="{B5101366-C389-4F79-9AF0-D56E36243E65}"/>
-              </a:ext>
-            </a:extLst>
-          </p:cNvPr>
-          <p:cNvSpPr/>
-          <p:nvPr/>
-        </p:nvSpPr>
-        <p:spPr>
-          <a:xfrm rot="1800000">
-            <a:off x="7162292" y="3957771"/>
-            <a:ext cx="1253808" cy="435006"/>
-          </a:xfrm>
-          <a:prstGeom prst="rightArrow">
-            <a:avLst/>
-          </a:prstGeom>
-        </p:spPr>
-        <p:style>
-          <a:lnRef idx="2">
-            <a:schemeClr val="accent1">
-              <a:shade val="50000"/>
-            </a:schemeClr>
-          </a:lnRef>
-          <a:fillRef idx="1">
-            <a:schemeClr val="accent1"/>
-          </a:fillRef>
-          <a:effectRef idx="0">
-            <a:schemeClr val="accent1"/>
-          </a:effectRef>
-          <a:fontRef idx="minor">
-            <a:schemeClr val="lt1"/>
-          </a:fontRef>
-        </p:style>
-        <p:txBody>
-          <a:bodyPr rtlCol="0" anchor="ctr"/>
-          <a:lstStyle/>
-          <a:p>
-            <a:pPr algn="ctr"/>
-            <a:endParaRPr lang="en-US"/>
-          </a:p>
-        </p:txBody>
-      </p:sp>
-      <p:sp>
-        <p:nvSpPr>
-          <p:cNvPr id="17" name="Rectangle: Rounded Corners 16">
-            <a:extLst>
-              <a:ext uri="{FF2B5EF4-FFF2-40B4-BE49-F238E27FC236}">
-                <a16:creationId xmlns:a16="http://schemas.microsoft.com/office/drawing/2014/main" id="{4BD5FFC8-D20A-44D8-9E5E-29566977448D}"/>
-              </a:ext>
-            </a:extLst>
-          </p:cNvPr>
-          <p:cNvSpPr/>
-          <p:nvPr/>
-        </p:nvSpPr>
-        <p:spPr>
-          <a:xfrm>
-            <a:off x="895350" y="2396790"/>
-            <a:ext cx="2085975" cy="1190625"/>
-          </a:xfrm>
-          <a:prstGeom prst="roundRect">
-            <a:avLst/>
-          </a:prstGeom>
-        </p:spPr>
-        <p:style>
-          <a:lnRef idx="2">
-            <a:schemeClr val="accent1">
-              <a:shade val="50000"/>
-            </a:schemeClr>
-          </a:lnRef>
-          <a:fillRef idx="1">
-            <a:schemeClr val="accent1"/>
-          </a:fillRef>
-          <a:effectRef idx="0">
-            <a:schemeClr val="accent1"/>
-          </a:effectRef>
-          <a:fontRef idx="minor">
-            <a:schemeClr val="lt1"/>
-          </a:fontRef>
-        </p:style>
-        <p:txBody>
-          <a:bodyPr rtlCol="0" anchor="ctr"/>
-          <a:lstStyle/>
-          <a:p>
-            <a:pPr algn="ctr"/>
+              <a:t>Make </a:t>
+            </a:r>
+            <a:r>
+              <a:rPr lang="en-US" dirty="0" err="1"/>
+              <a:t>automato</a:t>
+            </a:r>
             <a:r>
               <a:rPr lang="en-US" dirty="0"/>
-              <a:t>PID</a:t>
-            </a:r>
-          </a:p>
-          <a:p>
-            <a:pPr algn="ctr"/>
+              <a:t> database</a:t>
+            </a:r>
+          </a:p>
+          <a:p>
+            <a:pPr lvl="1"/>
             <a:r>
               <a:rPr lang="en-US" dirty="0"/>
-              <a:t>Controller</a:t>
-            </a:r>
-          </a:p>
-        </p:txBody>
-      </p:sp>
-      <p:sp>
-        <p:nvSpPr>
-          <p:cNvPr id="18" name="Arrow: Right 17">
-            <a:extLst>
-              <a:ext uri="{FF2B5EF4-FFF2-40B4-BE49-F238E27FC236}">
-                <a16:creationId xmlns:a16="http://schemas.microsoft.com/office/drawing/2014/main" id="{45A5547B-9956-4567-BFCE-6C6151AE9C1D}"/>
-              </a:ext>
-            </a:extLst>
-          </p:cNvPr>
-          <p:cNvSpPr/>
-          <p:nvPr/>
-        </p:nvSpPr>
-        <p:spPr>
-          <a:xfrm rot="5400000">
-            <a:off x="1468299" y="3957771"/>
-            <a:ext cx="927460" cy="435006"/>
-          </a:xfrm>
-          <a:prstGeom prst="rightArrow">
-            <a:avLst/>
-          </a:prstGeom>
-        </p:spPr>
-        <p:style>
-          <a:lnRef idx="2">
-            <a:schemeClr val="accent1">
-              <a:shade val="50000"/>
-            </a:schemeClr>
-          </a:lnRef>
-          <a:fillRef idx="1">
-            <a:schemeClr val="accent1"/>
-          </a:fillRef>
-          <a:effectRef idx="0">
-            <a:schemeClr val="accent1"/>
-          </a:effectRef>
-          <a:fontRef idx="minor">
-            <a:schemeClr val="lt1"/>
-          </a:fontRef>
-        </p:style>
-        <p:txBody>
-          <a:bodyPr rtlCol="0" anchor="ctr"/>
-          <a:lstStyle/>
-          <a:p>
-            <a:pPr algn="ctr"/>
-            <a:endParaRPr lang="en-US"/>
-          </a:p>
-        </p:txBody>
-      </p:sp>
-      <p:sp>
-        <p:nvSpPr>
-          <p:cNvPr id="19" name="Rectangle: Rounded Corners 18">
-            <a:extLst>
-              <a:ext uri="{FF2B5EF4-FFF2-40B4-BE49-F238E27FC236}">
-                <a16:creationId xmlns:a16="http://schemas.microsoft.com/office/drawing/2014/main" id="{2F505633-A7D8-41F2-92E1-861C207F0028}"/>
-              </a:ext>
-            </a:extLst>
-          </p:cNvPr>
-          <p:cNvSpPr/>
-          <p:nvPr/>
-        </p:nvSpPr>
-        <p:spPr>
-          <a:xfrm>
-            <a:off x="889042" y="4803686"/>
-            <a:ext cx="2085975" cy="1190625"/>
-          </a:xfrm>
-          <a:prstGeom prst="roundRect">
-            <a:avLst/>
-          </a:prstGeom>
-        </p:spPr>
-        <p:style>
-          <a:lnRef idx="2">
-            <a:schemeClr val="accent1">
-              <a:shade val="50000"/>
-            </a:schemeClr>
-          </a:lnRef>
-          <a:fillRef idx="1">
-            <a:schemeClr val="accent1"/>
-          </a:fillRef>
-          <a:effectRef idx="0">
-            <a:schemeClr val="accent1"/>
-          </a:effectRef>
-          <a:fontRef idx="minor">
-            <a:schemeClr val="lt1"/>
-          </a:fontRef>
-        </p:style>
-        <p:txBody>
-          <a:bodyPr rtlCol="0" anchor="ctr"/>
-          <a:lstStyle/>
-          <a:p>
-            <a:pPr algn="ctr"/>
+              <a:t>Make 2 tables in SQL</a:t>
+            </a:r>
+          </a:p>
+          <a:p>
+            <a:pPr lvl="2"/>
             <a:r>
               <a:rPr lang="en-US" dirty="0"/>
-              <a:t>Equipment Commands</a:t>
-            </a:r>
-          </a:p>
-        </p:txBody>
-      </p:sp>
-      <p:sp>
-        <p:nvSpPr>
-          <p:cNvPr id="2" name="Rectangle: Rounded Corners 1">
-            <a:extLst>
-              <a:ext uri="{FF2B5EF4-FFF2-40B4-BE49-F238E27FC236}">
-                <a16:creationId xmlns:a16="http://schemas.microsoft.com/office/drawing/2014/main" id="{8AD4A0D2-AE9D-4D3B-AB92-D9D42060C8A3}"/>
-              </a:ext>
-            </a:extLst>
-          </p:cNvPr>
-          <p:cNvSpPr/>
-          <p:nvPr/>
-        </p:nvSpPr>
-        <p:spPr>
-          <a:xfrm>
-            <a:off x="4375761" y="462979"/>
-            <a:ext cx="2553489" cy="1464815"/>
-          </a:xfrm>
-          <a:prstGeom prst="roundRect">
-            <a:avLst/>
-          </a:prstGeom>
-          <a:noFill/>
-          <a:ln w="44450">
-            <a:solidFill>
-              <a:schemeClr val="tx1"/>
-            </a:solidFill>
-          </a:ln>
-        </p:spPr>
-        <p:style>
-          <a:lnRef idx="2">
-            <a:schemeClr val="accent1">
-              <a:shade val="50000"/>
-            </a:schemeClr>
-          </a:lnRef>
-          <a:fillRef idx="1">
-            <a:schemeClr val="accent1"/>
-          </a:fillRef>
-          <a:effectRef idx="0">
-            <a:schemeClr val="accent1"/>
-          </a:effectRef>
-          <a:fontRef idx="minor">
-            <a:schemeClr val="lt1"/>
-          </a:fontRef>
-        </p:style>
-        <p:txBody>
-          <a:bodyPr rtlCol="0" anchor="ctr"/>
-          <a:lstStyle/>
-          <a:p>
-            <a:pPr algn="ctr"/>
-            <a:endParaRPr lang="en-US"/>
-          </a:p>
-        </p:txBody>
-      </p:sp>
-      <p:sp>
-        <p:nvSpPr>
-          <p:cNvPr id="5" name="TextBox 4">
-            <a:extLst>
-              <a:ext uri="{FF2B5EF4-FFF2-40B4-BE49-F238E27FC236}">
-                <a16:creationId xmlns:a16="http://schemas.microsoft.com/office/drawing/2014/main" id="{57602FAB-28E1-48FE-BCF7-B751F5396D69}"/>
-              </a:ext>
-            </a:extLst>
-          </p:cNvPr>
-          <p:cNvSpPr txBox="1"/>
-          <p:nvPr/>
-        </p:nvSpPr>
-        <p:spPr>
-          <a:xfrm>
-            <a:off x="4814508" y="118021"/>
-            <a:ext cx="1916102" cy="369332"/>
-          </a:xfrm>
-          <a:prstGeom prst="rect">
-            <a:avLst/>
-          </a:prstGeom>
-          <a:noFill/>
-        </p:spPr>
-        <p:txBody>
-          <a:bodyPr wrap="none" rtlCol="0">
-            <a:spAutoFit/>
-          </a:bodyPr>
-          <a:lstStyle/>
-          <a:p>
+              <a:t>Temp</a:t>
+            </a:r>
+          </a:p>
+          <a:p>
+            <a:pPr lvl="1"/>
             <a:r>
               <a:rPr lang="en-US" dirty="0"/>
-              <a:t>“Read”/Store Data</a:t>
+              <a:t>Write/Read Data</a:t>
+            </a:r>
+          </a:p>
+          <a:p>
+            <a:pPr lvl="1"/>
+            <a:endParaRPr lang="en-US" dirty="0"/>
+          </a:p>
+          <a:p>
+            <a:pPr lvl="1"/>
+            <a:r>
+              <a:rPr lang="en-US" dirty="0"/>
+              <a:t>X</a:t>
+            </a:r>
+          </a:p>
+          <a:p>
+            <a:pPr lvl="2"/>
+            <a:r>
+              <a:rPr lang="en-US" dirty="0"/>
+              <a:t>Y</a:t>
+            </a:r>
+          </a:p>
+          <a:p>
+            <a:pPr lvl="2"/>
+            <a:r>
+              <a:rPr lang="en-US" dirty="0"/>
+              <a:t>z</a:t>
             </a:r>
           </a:p>
         </p:txBody>
@@ -5371,7 +4846,7 @@
     </p:spTree>
     <p:extLst>
       <p:ext uri="{BB962C8B-B14F-4D97-AF65-F5344CB8AC3E}">
-        <p14:creationId xmlns:p14="http://schemas.microsoft.com/office/powerpoint/2010/main" val="4185254947"/>
+        <p14:creationId xmlns:p14="http://schemas.microsoft.com/office/powerpoint/2010/main" val="1205470836"/>
       </p:ext>
     </p:extLst>
   </p:cSld>
@@ -5403,7 +4878,7 @@
           <p:cNvPr id="2" name="Title 1">
             <a:extLst>
               <a:ext uri="{FF2B5EF4-FFF2-40B4-BE49-F238E27FC236}">
-                <a16:creationId xmlns:a16="http://schemas.microsoft.com/office/drawing/2014/main" id="{6C151666-22D0-41B0-9E54-8DC46A427CED}"/>
+                <a16:creationId xmlns:a16="http://schemas.microsoft.com/office/drawing/2014/main" id="{12F03CD1-AA87-4829-B5A9-225CACAEAB08}"/>
               </a:ext>
             </a:extLst>
           </p:cNvPr>
@@ -5422,7 +4897,7 @@
             <a:pPr algn="ctr"/>
             <a:r>
               <a:rPr lang="en-US" dirty="0"/>
-              <a:t>Outstanding Questions</a:t>
+              <a:t>SQL</a:t>
             </a:r>
           </a:p>
         </p:txBody>
@@ -5432,7 +4907,7 @@
           <p:cNvPr id="3" name="Content Placeholder 2">
             <a:extLst>
               <a:ext uri="{FF2B5EF4-FFF2-40B4-BE49-F238E27FC236}">
-                <a16:creationId xmlns:a16="http://schemas.microsoft.com/office/drawing/2014/main" id="{C6749A8F-FF72-4782-B31C-E07B20F9F037}"/>
+                <a16:creationId xmlns:a16="http://schemas.microsoft.com/office/drawing/2014/main" id="{4091D791-BE91-47FA-B2F0-CE71D12E1ED4}"/>
               </a:ext>
             </a:extLst>
           </p:cNvPr>
@@ -5447,12 +4922,6 @@
         <p:txBody>
           <a:bodyPr/>
           <a:lstStyle/>
-          <a:p>
-            <a:r>
-              <a:rPr lang="en-US" dirty="0"/>
-              <a:t>GUI – Best/Easiest</a:t>
-            </a:r>
-          </a:p>
           <a:p>
             <a:endParaRPr lang="en-US" dirty="0"/>
           </a:p>
@@ -5461,7 +4930,7 @@
     </p:spTree>
     <p:extLst>
       <p:ext uri="{BB962C8B-B14F-4D97-AF65-F5344CB8AC3E}">
-        <p14:creationId xmlns:p14="http://schemas.microsoft.com/office/powerpoint/2010/main" val="1324135825"/>
+        <p14:creationId xmlns:p14="http://schemas.microsoft.com/office/powerpoint/2010/main" val="629993587"/>
       </p:ext>
     </p:extLst>
   </p:cSld>
@@ -5493,7 +4962,7 @@
           <p:cNvPr id="2" name="Title 1">
             <a:extLst>
               <a:ext uri="{FF2B5EF4-FFF2-40B4-BE49-F238E27FC236}">
-                <a16:creationId xmlns:a16="http://schemas.microsoft.com/office/drawing/2014/main" id="{8B803CA7-3DB4-4B4D-BA16-89F3FA690238}"/>
+                <a16:creationId xmlns:a16="http://schemas.microsoft.com/office/drawing/2014/main" id="{6C151666-22D0-41B0-9E54-8DC46A427CED}"/>
               </a:ext>
             </a:extLst>
           </p:cNvPr>
@@ -5512,7 +4981,7 @@
             <a:pPr algn="ctr"/>
             <a:r>
               <a:rPr lang="en-US" dirty="0"/>
-              <a:t>Testing Methods</a:t>
+              <a:t>Outstanding Questions</a:t>
             </a:r>
           </a:p>
         </p:txBody>
@@ -5522,7 +4991,7 @@
           <p:cNvPr id="3" name="Content Placeholder 2">
             <a:extLst>
               <a:ext uri="{FF2B5EF4-FFF2-40B4-BE49-F238E27FC236}">
-                <a16:creationId xmlns:a16="http://schemas.microsoft.com/office/drawing/2014/main" id="{AF82CA6D-0B14-491F-BBBA-986677496322}"/>
+                <a16:creationId xmlns:a16="http://schemas.microsoft.com/office/drawing/2014/main" id="{C6749A8F-FF72-4782-B31C-E07B20F9F037}"/>
               </a:ext>
             </a:extLst>
           </p:cNvPr>
@@ -5540,15 +5009,18 @@
           <a:p>
             <a:r>
               <a:rPr lang="en-US" dirty="0"/>
-              <a:t>http://www.fao.org/3/ca2796en/CA2796EN.pdf</a:t>
-            </a:r>
+              <a:t>GUI – Best/Easiest</a:t>
+            </a:r>
+          </a:p>
+          <a:p>
+            <a:endParaRPr lang="en-US" dirty="0"/>
           </a:p>
         </p:txBody>
       </p:sp>
     </p:spTree>
     <p:extLst>
       <p:ext uri="{BB962C8B-B14F-4D97-AF65-F5344CB8AC3E}">
-        <p14:creationId xmlns:p14="http://schemas.microsoft.com/office/powerpoint/2010/main" val="1432040007"/>
+        <p14:creationId xmlns:p14="http://schemas.microsoft.com/office/powerpoint/2010/main" val="1324135825"/>
       </p:ext>
     </p:extLst>
   </p:cSld>
@@ -5580,7 +5052,7 @@
           <p:cNvPr id="2" name="Title 1">
             <a:extLst>
               <a:ext uri="{FF2B5EF4-FFF2-40B4-BE49-F238E27FC236}">
-                <a16:creationId xmlns:a16="http://schemas.microsoft.com/office/drawing/2014/main" id="{9EC0DD40-5C84-4AC5-A77E-DE389659DA3B}"/>
+                <a16:creationId xmlns:a16="http://schemas.microsoft.com/office/drawing/2014/main" id="{8B803CA7-3DB4-4B4D-BA16-89F3FA690238}"/>
               </a:ext>
             </a:extLst>
           </p:cNvPr>
@@ -5599,7 +5071,7 @@
             <a:pPr algn="ctr"/>
             <a:r>
               <a:rPr lang="en-US" dirty="0"/>
-              <a:t>Make Fake Data</a:t>
+              <a:t>Testing Methods</a:t>
             </a:r>
           </a:p>
         </p:txBody>
@@ -5609,7 +5081,7 @@
           <p:cNvPr id="3" name="Content Placeholder 2">
             <a:extLst>
               <a:ext uri="{FF2B5EF4-FFF2-40B4-BE49-F238E27FC236}">
-                <a16:creationId xmlns:a16="http://schemas.microsoft.com/office/drawing/2014/main" id="{5397ADCB-A991-4363-A2C6-C23983382340}"/>
+                <a16:creationId xmlns:a16="http://schemas.microsoft.com/office/drawing/2014/main" id="{AF82CA6D-0B14-491F-BBBA-986677496322}"/>
               </a:ext>
             </a:extLst>
           </p:cNvPr>
@@ -5627,61 +5099,15 @@
           <a:p>
             <a:r>
               <a:rPr lang="en-US" dirty="0"/>
-              <a:t>Sensor Class</a:t>
-            </a:r>
-          </a:p>
-          <a:p>
-            <a:pPr lvl="1"/>
-            <a:r>
-              <a:rPr lang="en-US" dirty="0"/>
-              <a:t>Temperature</a:t>
-            </a:r>
-          </a:p>
-          <a:p>
-            <a:pPr lvl="1"/>
-            <a:r>
-              <a:rPr lang="en-US" dirty="0"/>
-              <a:t>Soil Moisture</a:t>
-            </a:r>
-          </a:p>
-          <a:p>
-            <a:pPr lvl="1"/>
-            <a:r>
-              <a:rPr lang="en-US" dirty="0"/>
-              <a:t>Acidity</a:t>
-            </a:r>
-          </a:p>
-          <a:p>
-            <a:pPr lvl="1"/>
-            <a:r>
-              <a:rPr lang="en-US" dirty="0"/>
-              <a:t>Light</a:t>
-            </a:r>
-          </a:p>
-          <a:p>
-            <a:pPr lvl="1"/>
-            <a:r>
-              <a:rPr lang="en-US" dirty="0"/>
-              <a:t>Salinity</a:t>
-            </a:r>
-          </a:p>
-          <a:p>
-            <a:pPr lvl="1"/>
-            <a:r>
-              <a:rPr lang="en-US"/>
-              <a:t>Visual Data</a:t>
-            </a:r>
-          </a:p>
-          <a:p>
-            <a:pPr lvl="1"/>
-            <a:endParaRPr lang="en-US" dirty="0"/>
+              <a:t>http://www.fao.org/3/ca2796en/CA2796EN.pdf</a:t>
+            </a:r>
           </a:p>
         </p:txBody>
       </p:sp>
     </p:spTree>
     <p:extLst>
       <p:ext uri="{BB962C8B-B14F-4D97-AF65-F5344CB8AC3E}">
-        <p14:creationId xmlns:p14="http://schemas.microsoft.com/office/powerpoint/2010/main" val="2630466151"/>
+        <p14:creationId xmlns:p14="http://schemas.microsoft.com/office/powerpoint/2010/main" val="1432040007"/>
       </p:ext>
     </p:extLst>
   </p:cSld>
@@ -5713,6 +5139,139 @@
           <p:cNvPr id="2" name="Title 1">
             <a:extLst>
               <a:ext uri="{FF2B5EF4-FFF2-40B4-BE49-F238E27FC236}">
+                <a16:creationId xmlns:a16="http://schemas.microsoft.com/office/drawing/2014/main" id="{9EC0DD40-5C84-4AC5-A77E-DE389659DA3B}"/>
+              </a:ext>
+            </a:extLst>
+          </p:cNvPr>
+          <p:cNvSpPr>
+            <a:spLocks noGrp="1"/>
+          </p:cNvSpPr>
+          <p:nvPr>
+            <p:ph type="title"/>
+          </p:nvPr>
+        </p:nvSpPr>
+        <p:spPr/>
+        <p:txBody>
+          <a:bodyPr/>
+          <a:lstStyle/>
+          <a:p>
+            <a:pPr algn="ctr"/>
+            <a:r>
+              <a:rPr lang="en-US" dirty="0"/>
+              <a:t>Make Fake Data</a:t>
+            </a:r>
+          </a:p>
+        </p:txBody>
+      </p:sp>
+      <p:sp>
+        <p:nvSpPr>
+          <p:cNvPr id="3" name="Content Placeholder 2">
+            <a:extLst>
+              <a:ext uri="{FF2B5EF4-FFF2-40B4-BE49-F238E27FC236}">
+                <a16:creationId xmlns:a16="http://schemas.microsoft.com/office/drawing/2014/main" id="{5397ADCB-A991-4363-A2C6-C23983382340}"/>
+              </a:ext>
+            </a:extLst>
+          </p:cNvPr>
+          <p:cNvSpPr>
+            <a:spLocks noGrp="1"/>
+          </p:cNvSpPr>
+          <p:nvPr>
+            <p:ph idx="1"/>
+          </p:nvPr>
+        </p:nvSpPr>
+        <p:spPr/>
+        <p:txBody>
+          <a:bodyPr/>
+          <a:lstStyle/>
+          <a:p>
+            <a:r>
+              <a:rPr lang="en-US" dirty="0"/>
+              <a:t>Sensor Class</a:t>
+            </a:r>
+          </a:p>
+          <a:p>
+            <a:pPr lvl="1"/>
+            <a:r>
+              <a:rPr lang="en-US" dirty="0"/>
+              <a:t>Temperature</a:t>
+            </a:r>
+          </a:p>
+          <a:p>
+            <a:pPr lvl="1"/>
+            <a:r>
+              <a:rPr lang="en-US" dirty="0"/>
+              <a:t>Soil Moisture</a:t>
+            </a:r>
+          </a:p>
+          <a:p>
+            <a:pPr lvl="1"/>
+            <a:r>
+              <a:rPr lang="en-US" dirty="0"/>
+              <a:t>Acidity</a:t>
+            </a:r>
+          </a:p>
+          <a:p>
+            <a:pPr lvl="1"/>
+            <a:r>
+              <a:rPr lang="en-US" dirty="0"/>
+              <a:t>Light</a:t>
+            </a:r>
+          </a:p>
+          <a:p>
+            <a:pPr lvl="1"/>
+            <a:r>
+              <a:rPr lang="en-US" dirty="0"/>
+              <a:t>Salinity</a:t>
+            </a:r>
+          </a:p>
+          <a:p>
+            <a:pPr lvl="1"/>
+            <a:r>
+              <a:rPr lang="en-US"/>
+              <a:t>Visual Data</a:t>
+            </a:r>
+          </a:p>
+          <a:p>
+            <a:pPr lvl="1"/>
+            <a:endParaRPr lang="en-US" dirty="0"/>
+          </a:p>
+        </p:txBody>
+      </p:sp>
+    </p:spTree>
+    <p:extLst>
+      <p:ext uri="{BB962C8B-B14F-4D97-AF65-F5344CB8AC3E}">
+        <p14:creationId xmlns:p14="http://schemas.microsoft.com/office/powerpoint/2010/main" val="2630466151"/>
+      </p:ext>
+    </p:extLst>
+  </p:cSld>
+  <p:clrMapOvr>
+    <a:masterClrMapping/>
+  </p:clrMapOvr>
+</p:sld>
+</file>
+
+<file path=ppt/slides/slide7.xml><?xml version="1.0" encoding="utf-8"?>
+<p:sld xmlns:a="http://schemas.openxmlformats.org/drawingml/2006/main" xmlns:r="http://schemas.openxmlformats.org/officeDocument/2006/relationships" xmlns:p="http://schemas.openxmlformats.org/presentationml/2006/main">
+  <p:cSld>
+    <p:spTree>
+      <p:nvGrpSpPr>
+        <p:cNvPr id="1" name=""/>
+        <p:cNvGrpSpPr/>
+        <p:nvPr/>
+      </p:nvGrpSpPr>
+      <p:grpSpPr>
+        <a:xfrm>
+          <a:off x="0" y="0"/>
+          <a:ext cx="0" cy="0"/>
+          <a:chOff x="0" y="0"/>
+          <a:chExt cx="0" cy="0"/>
+        </a:xfrm>
+      </p:grpSpPr>
+      <p:sp>
+        <p:nvSpPr>
+          <p:cNvPr id="2" name="Title 1">
+            <a:extLst>
+              <a:ext uri="{FF2B5EF4-FFF2-40B4-BE49-F238E27FC236}">
                 <a16:creationId xmlns:a16="http://schemas.microsoft.com/office/drawing/2014/main" id="{47E8B3F7-CBC4-4486-9D48-667EB37F18F3}"/>
               </a:ext>
             </a:extLst>
@@ -5824,7 +5383,7 @@
 </p:sld>
 </file>
 
-<file path=ppt/slides/slide7.xml><?xml version="1.0" encoding="utf-8"?>
+<file path=ppt/slides/slide8.xml><?xml version="1.0" encoding="utf-8"?>
 <p:sld xmlns:a="http://schemas.openxmlformats.org/drawingml/2006/main" xmlns:r="http://schemas.openxmlformats.org/officeDocument/2006/relationships" xmlns:p="http://schemas.openxmlformats.org/presentationml/2006/main">
   <p:cSld>
     <p:spTree>

</xml_diff>

<commit_message>
Updated PPT outline architecture
</commit_message>
<xml_diff>
--- a/Outline.pptx
+++ b/Outline.pptx
@@ -8,11 +8,12 @@
     <p:sldId id="256" r:id="rId2"/>
     <p:sldId id="263" r:id="rId3"/>
     <p:sldId id="264" r:id="rId4"/>
-    <p:sldId id="260" r:id="rId5"/>
-    <p:sldId id="258" r:id="rId6"/>
-    <p:sldId id="257" r:id="rId7"/>
-    <p:sldId id="261" r:id="rId8"/>
-    <p:sldId id="262" r:id="rId9"/>
+    <p:sldId id="265" r:id="rId5"/>
+    <p:sldId id="260" r:id="rId6"/>
+    <p:sldId id="258" r:id="rId7"/>
+    <p:sldId id="257" r:id="rId8"/>
+    <p:sldId id="261" r:id="rId9"/>
+    <p:sldId id="262" r:id="rId10"/>
   </p:sldIdLst>
   <p:sldSz cx="12192000" cy="6858000"/>
   <p:notesSz cx="6858000" cy="9144000"/>
@@ -278,7 +279,7 @@
           <a:p>
             <a:fld id="{3E17C7E1-582E-4AB2-85BF-A0FE62F38CDC}" type="datetimeFigureOut">
               <a:rPr lang="en-US" smtClean="0"/>
-              <a:t>7/17/2021</a:t>
+              <a:t>7/19/2021</a:t>
             </a:fld>
             <a:endParaRPr lang="en-US"/>
           </a:p>
@@ -476,7 +477,7 @@
           <a:p>
             <a:fld id="{3E17C7E1-582E-4AB2-85BF-A0FE62F38CDC}" type="datetimeFigureOut">
               <a:rPr lang="en-US" smtClean="0"/>
-              <a:t>7/17/2021</a:t>
+              <a:t>7/19/2021</a:t>
             </a:fld>
             <a:endParaRPr lang="en-US"/>
           </a:p>
@@ -684,7 +685,7 @@
           <a:p>
             <a:fld id="{3E17C7E1-582E-4AB2-85BF-A0FE62F38CDC}" type="datetimeFigureOut">
               <a:rPr lang="en-US" smtClean="0"/>
-              <a:t>7/17/2021</a:t>
+              <a:t>7/19/2021</a:t>
             </a:fld>
             <a:endParaRPr lang="en-US"/>
           </a:p>
@@ -882,7 +883,7 @@
           <a:p>
             <a:fld id="{3E17C7E1-582E-4AB2-85BF-A0FE62F38CDC}" type="datetimeFigureOut">
               <a:rPr lang="en-US" smtClean="0"/>
-              <a:t>7/17/2021</a:t>
+              <a:t>7/19/2021</a:t>
             </a:fld>
             <a:endParaRPr lang="en-US"/>
           </a:p>
@@ -1157,7 +1158,7 @@
           <a:p>
             <a:fld id="{3E17C7E1-582E-4AB2-85BF-A0FE62F38CDC}" type="datetimeFigureOut">
               <a:rPr lang="en-US" smtClean="0"/>
-              <a:t>7/17/2021</a:t>
+              <a:t>7/19/2021</a:t>
             </a:fld>
             <a:endParaRPr lang="en-US"/>
           </a:p>
@@ -1422,7 +1423,7 @@
           <a:p>
             <a:fld id="{3E17C7E1-582E-4AB2-85BF-A0FE62F38CDC}" type="datetimeFigureOut">
               <a:rPr lang="en-US" smtClean="0"/>
-              <a:t>7/17/2021</a:t>
+              <a:t>7/19/2021</a:t>
             </a:fld>
             <a:endParaRPr lang="en-US"/>
           </a:p>
@@ -1834,7 +1835,7 @@
           <a:p>
             <a:fld id="{3E17C7E1-582E-4AB2-85BF-A0FE62F38CDC}" type="datetimeFigureOut">
               <a:rPr lang="en-US" smtClean="0"/>
-              <a:t>7/17/2021</a:t>
+              <a:t>7/19/2021</a:t>
             </a:fld>
             <a:endParaRPr lang="en-US"/>
           </a:p>
@@ -1975,7 +1976,7 @@
           <a:p>
             <a:fld id="{3E17C7E1-582E-4AB2-85BF-A0FE62F38CDC}" type="datetimeFigureOut">
               <a:rPr lang="en-US" smtClean="0"/>
-              <a:t>7/17/2021</a:t>
+              <a:t>7/19/2021</a:t>
             </a:fld>
             <a:endParaRPr lang="en-US"/>
           </a:p>
@@ -2088,7 +2089,7 @@
           <a:p>
             <a:fld id="{3E17C7E1-582E-4AB2-85BF-A0FE62F38CDC}" type="datetimeFigureOut">
               <a:rPr lang="en-US" smtClean="0"/>
-              <a:t>7/17/2021</a:t>
+              <a:t>7/19/2021</a:t>
             </a:fld>
             <a:endParaRPr lang="en-US"/>
           </a:p>
@@ -2399,7 +2400,7 @@
           <a:p>
             <a:fld id="{3E17C7E1-582E-4AB2-85BF-A0FE62F38CDC}" type="datetimeFigureOut">
               <a:rPr lang="en-US" smtClean="0"/>
-              <a:t>7/17/2021</a:t>
+              <a:t>7/19/2021</a:t>
             </a:fld>
             <a:endParaRPr lang="en-US"/>
           </a:p>
@@ -2687,7 +2688,7 @@
           <a:p>
             <a:fld id="{3E17C7E1-582E-4AB2-85BF-A0FE62F38CDC}" type="datetimeFigureOut">
               <a:rPr lang="en-US" smtClean="0"/>
-              <a:t>7/17/2021</a:t>
+              <a:t>7/19/2021</a:t>
             </a:fld>
             <a:endParaRPr lang="en-US"/>
           </a:p>
@@ -2928,7 +2929,7 @@
           <a:p>
             <a:fld id="{3E17C7E1-582E-4AB2-85BF-A0FE62F38CDC}" type="datetimeFigureOut">
               <a:rPr lang="en-US" smtClean="0"/>
-              <a:t>7/17/2021</a:t>
+              <a:t>7/19/2021</a:t>
             </a:fld>
             <a:endParaRPr lang="en-US"/>
           </a:p>
@@ -3464,8 +3465,8 @@
         </p:nvSpPr>
         <p:spPr>
           <a:xfrm>
-            <a:off x="8533150" y="1282316"/>
-            <a:ext cx="2085975" cy="1190625"/>
+            <a:off x="7959572" y="4140539"/>
+            <a:ext cx="2085975" cy="650183"/>
           </a:xfrm>
           <a:prstGeom prst="roundRect">
             <a:avLst/>
@@ -3520,7 +3521,7 @@
         </p:nvSpPr>
         <p:spPr>
           <a:xfrm>
-            <a:off x="6132913" y="5280490"/>
+            <a:off x="6201865" y="5292335"/>
             <a:ext cx="2085975" cy="1190625"/>
           </a:xfrm>
           <a:prstGeom prst="roundRect">
@@ -3614,8 +3615,8 @@
           <p:nvPr/>
         </p:nvSpPr>
         <p:spPr>
-          <a:xfrm>
-            <a:off x="7166019" y="1658785"/>
+          <a:xfrm rot="2225230">
+            <a:off x="7203803" y="1786986"/>
             <a:ext cx="1020933" cy="435006"/>
           </a:xfrm>
           <a:prstGeom prst="rightArrow">
@@ -3649,10 +3650,10 @@
       </p:sp>
       <p:sp>
         <p:nvSpPr>
-          <p:cNvPr id="11" name="Rectangle: Rounded Corners 10">
-            <a:extLst>
-              <a:ext uri="{FF2B5EF4-FFF2-40B4-BE49-F238E27FC236}">
-                <a16:creationId xmlns:a16="http://schemas.microsoft.com/office/drawing/2014/main" id="{D5D15D07-BF9B-4BE6-BE5D-E1A1B0357C9A}"/>
+          <p:cNvPr id="13" name="Arrow: Right 12">
+            <a:extLst>
+              <a:ext uri="{FF2B5EF4-FFF2-40B4-BE49-F238E27FC236}">
+                <a16:creationId xmlns:a16="http://schemas.microsoft.com/office/drawing/2014/main" id="{B4D32617-76A4-4EA0-9D03-57CA9FC50593}"/>
               </a:ext>
             </a:extLst>
           </p:cNvPr>
@@ -3660,104 +3661,9 @@
           <p:nvPr/>
         </p:nvSpPr>
         <p:spPr>
-          <a:xfrm>
-            <a:off x="6060219" y="3526809"/>
-            <a:ext cx="2085975" cy="1190625"/>
-          </a:xfrm>
-          <a:prstGeom prst="roundRect">
-            <a:avLst/>
-          </a:prstGeom>
-        </p:spPr>
-        <p:style>
-          <a:lnRef idx="2">
-            <a:schemeClr val="accent1">
-              <a:shade val="50000"/>
-            </a:schemeClr>
-          </a:lnRef>
-          <a:fillRef idx="1">
-            <a:schemeClr val="accent1"/>
-          </a:fillRef>
-          <a:effectRef idx="0">
-            <a:schemeClr val="accent1"/>
-          </a:effectRef>
-          <a:fontRef idx="minor">
-            <a:schemeClr val="lt1"/>
-          </a:fontRef>
-        </p:style>
-        <p:txBody>
-          <a:bodyPr rtlCol="0" anchor="ctr"/>
-          <a:lstStyle/>
-          <a:p>
-            <a:pPr algn="ctr"/>
-            <a:r>
-              <a:rPr lang="en-US" dirty="0"/>
-              <a:t>Read In Data</a:t>
-            </a:r>
-          </a:p>
-        </p:txBody>
-      </p:sp>
-      <p:sp>
-        <p:nvSpPr>
-          <p:cNvPr id="12" name="Arrow: Right 11">
-            <a:extLst>
-              <a:ext uri="{FF2B5EF4-FFF2-40B4-BE49-F238E27FC236}">
-                <a16:creationId xmlns:a16="http://schemas.microsoft.com/office/drawing/2014/main" id="{E2452017-3BAC-4941-952B-99BFBBE344F7}"/>
-              </a:ext>
-            </a:extLst>
-          </p:cNvPr>
-          <p:cNvSpPr/>
-          <p:nvPr/>
-        </p:nvSpPr>
-        <p:spPr>
-          <a:xfrm rot="5400000">
-            <a:off x="10511637" y="2739597"/>
-            <a:ext cx="490059" cy="435006"/>
-          </a:xfrm>
-          <a:prstGeom prst="rightArrow">
-            <a:avLst/>
-          </a:prstGeom>
-        </p:spPr>
-        <p:style>
-          <a:lnRef idx="2">
-            <a:schemeClr val="accent1">
-              <a:shade val="50000"/>
-            </a:schemeClr>
-          </a:lnRef>
-          <a:fillRef idx="1">
-            <a:schemeClr val="accent1"/>
-          </a:fillRef>
-          <a:effectRef idx="0">
-            <a:schemeClr val="accent1"/>
-          </a:effectRef>
-          <a:fontRef idx="minor">
-            <a:schemeClr val="lt1"/>
-          </a:fontRef>
-        </p:style>
-        <p:txBody>
-          <a:bodyPr rtlCol="0" anchor="ctr"/>
-          <a:lstStyle/>
-          <a:p>
-            <a:pPr algn="ctr"/>
-            <a:endParaRPr lang="en-US"/>
-          </a:p>
-        </p:txBody>
-      </p:sp>
-      <p:sp>
-        <p:nvSpPr>
-          <p:cNvPr id="13" name="Arrow: Right 12">
-            <a:extLst>
-              <a:ext uri="{FF2B5EF4-FFF2-40B4-BE49-F238E27FC236}">
-                <a16:creationId xmlns:a16="http://schemas.microsoft.com/office/drawing/2014/main" id="{B4D32617-76A4-4EA0-9D03-57CA9FC50593}"/>
-              </a:ext>
-            </a:extLst>
-          </p:cNvPr>
-          <p:cNvSpPr/>
-          <p:nvPr/>
-        </p:nvSpPr>
-        <p:spPr>
-          <a:xfrm rot="10159127" flipV="1">
-            <a:off x="3372331" y="2841555"/>
-            <a:ext cx="4874545" cy="415723"/>
+          <a:xfrm rot="10800000" flipV="1">
+            <a:off x="3394478" y="3685564"/>
+            <a:ext cx="2398616" cy="415723"/>
           </a:xfrm>
           <a:prstGeom prst="rightArrow">
             <a:avLst/>
@@ -3854,7 +3760,7 @@
         </p:nvSpPr>
         <p:spPr>
           <a:xfrm rot="5400000">
-            <a:off x="6994227" y="4817682"/>
+            <a:off x="9646370" y="4808940"/>
             <a:ext cx="363348" cy="435006"/>
           </a:xfrm>
           <a:prstGeom prst="rightArrow">
@@ -3899,8 +3805,8 @@
           <p:nvPr/>
         </p:nvSpPr>
         <p:spPr>
-          <a:xfrm rot="1800000">
-            <a:off x="8211413" y="4661241"/>
+          <a:xfrm rot="8470201">
+            <a:off x="7309423" y="4712840"/>
             <a:ext cx="649870" cy="435006"/>
           </a:xfrm>
           <a:prstGeom prst="rightArrow">
@@ -3946,8 +3852,8 @@
         </p:nvSpPr>
         <p:spPr>
           <a:xfrm>
-            <a:off x="1112322" y="3551076"/>
-            <a:ext cx="2085975" cy="1190625"/>
+            <a:off x="5963707" y="3090251"/>
+            <a:ext cx="1292156" cy="1190625"/>
           </a:xfrm>
           <a:prstGeom prst="roundRect">
             <a:avLst/>
@@ -3983,10 +3889,10 @@
       </p:sp>
       <p:sp>
         <p:nvSpPr>
-          <p:cNvPr id="18" name="Arrow: Right 17">
-            <a:extLst>
-              <a:ext uri="{FF2B5EF4-FFF2-40B4-BE49-F238E27FC236}">
-                <a16:creationId xmlns:a16="http://schemas.microsoft.com/office/drawing/2014/main" id="{45A5547B-9956-4567-BFCE-6C6151AE9C1D}"/>
+          <p:cNvPr id="19" name="Rectangle: Rounded Corners 18">
+            <a:extLst>
+              <a:ext uri="{FF2B5EF4-FFF2-40B4-BE49-F238E27FC236}">
+                <a16:creationId xmlns:a16="http://schemas.microsoft.com/office/drawing/2014/main" id="{2F505633-A7D8-41F2-92E1-861C207F0028}"/>
               </a:ext>
             </a:extLst>
           </p:cNvPr>
@@ -3994,54 +3900,8 @@
           <p:nvPr/>
         </p:nvSpPr>
         <p:spPr>
-          <a:xfrm rot="5400000">
-            <a:off x="1947893" y="4833486"/>
-            <a:ext cx="363348" cy="435006"/>
-          </a:xfrm>
-          <a:prstGeom prst="rightArrow">
-            <a:avLst/>
-          </a:prstGeom>
-        </p:spPr>
-        <p:style>
-          <a:lnRef idx="2">
-            <a:schemeClr val="accent1">
-              <a:shade val="50000"/>
-            </a:schemeClr>
-          </a:lnRef>
-          <a:fillRef idx="1">
-            <a:schemeClr val="accent1"/>
-          </a:fillRef>
-          <a:effectRef idx="0">
-            <a:schemeClr val="accent1"/>
-          </a:effectRef>
-          <a:fontRef idx="minor">
-            <a:schemeClr val="lt1"/>
-          </a:fontRef>
-        </p:style>
-        <p:txBody>
-          <a:bodyPr rtlCol="0" anchor="ctr"/>
-          <a:lstStyle/>
-          <a:p>
-            <a:pPr algn="ctr"/>
-            <a:endParaRPr lang="en-US"/>
-          </a:p>
-        </p:txBody>
-      </p:sp>
-      <p:sp>
-        <p:nvSpPr>
-          <p:cNvPr id="19" name="Rectangle: Rounded Corners 18">
-            <a:extLst>
-              <a:ext uri="{FF2B5EF4-FFF2-40B4-BE49-F238E27FC236}">
-                <a16:creationId xmlns:a16="http://schemas.microsoft.com/office/drawing/2014/main" id="{2F505633-A7D8-41F2-92E1-861C207F0028}"/>
-              </a:ext>
-            </a:extLst>
-          </p:cNvPr>
-          <p:cNvSpPr/>
-          <p:nvPr/>
-        </p:nvSpPr>
-        <p:spPr>
           <a:xfrm>
-            <a:off x="1086579" y="5283578"/>
+            <a:off x="1112320" y="3835818"/>
             <a:ext cx="2085975" cy="1190625"/>
           </a:xfrm>
           <a:prstGeom prst="roundRect">
@@ -4200,10 +4060,10 @@
       </p:sp>
       <p:sp>
         <p:nvSpPr>
-          <p:cNvPr id="21" name="Rectangle: Rounded Corners 20">
-            <a:extLst>
-              <a:ext uri="{FF2B5EF4-FFF2-40B4-BE49-F238E27FC236}">
-                <a16:creationId xmlns:a16="http://schemas.microsoft.com/office/drawing/2014/main" id="{D7FDCB00-14A2-4B77-9822-972459B4ECEB}"/>
+          <p:cNvPr id="23" name="Rectangle: Rounded Corners 22">
+            <a:extLst>
+              <a:ext uri="{FF2B5EF4-FFF2-40B4-BE49-F238E27FC236}">
+                <a16:creationId xmlns:a16="http://schemas.microsoft.com/office/drawing/2014/main" id="{115F3080-98DF-4A22-86F5-73AFAEF3FD1C}"/>
               </a:ext>
             </a:extLst>
           </p:cNvPr>
@@ -4212,8 +4072,8 @@
         </p:nvSpPr>
         <p:spPr>
           <a:xfrm>
-            <a:off x="8299392" y="1002902"/>
-            <a:ext cx="2553489" cy="1605794"/>
+            <a:off x="5869189" y="2787881"/>
+            <a:ext cx="5327922" cy="3860897"/>
           </a:xfrm>
           <a:prstGeom prst="roundRect">
             <a:avLst/>
@@ -4252,10 +4112,10 @@
       </p:sp>
       <p:sp>
         <p:nvSpPr>
-          <p:cNvPr id="22" name="TextBox 21">
-            <a:extLst>
-              <a:ext uri="{FF2B5EF4-FFF2-40B4-BE49-F238E27FC236}">
-                <a16:creationId xmlns:a16="http://schemas.microsoft.com/office/drawing/2014/main" id="{DBB7D7DA-1E48-4FE5-98FB-189390A2C1CA}"/>
+          <p:cNvPr id="24" name="TextBox 23">
+            <a:extLst>
+              <a:ext uri="{FF2B5EF4-FFF2-40B4-BE49-F238E27FC236}">
+                <a16:creationId xmlns:a16="http://schemas.microsoft.com/office/drawing/2014/main" id="{1CBB8180-A26F-4684-9E99-2448555FDD80}"/>
               </a:ext>
             </a:extLst>
           </p:cNvPr>
@@ -4264,8 +4124,8 @@
         </p:nvSpPr>
         <p:spPr>
           <a:xfrm>
-            <a:off x="9047048" y="546280"/>
-            <a:ext cx="1058175" cy="369332"/>
+            <a:off x="8331229" y="2349620"/>
+            <a:ext cx="494046" cy="369332"/>
           </a:xfrm>
           <a:prstGeom prst="rect">
             <a:avLst/>
@@ -4278,20 +4138,19 @@
           </a:bodyPr>
           <a:lstStyle/>
           <a:p>
-            <a:pPr algn="ctr"/>
             <a:r>
               <a:rPr lang="en-US" dirty="0"/>
-              <a:t>Database</a:t>
-            </a:r>
-          </a:p>
-        </p:txBody>
-      </p:sp>
-      <p:sp>
-        <p:nvSpPr>
-          <p:cNvPr id="23" name="Rectangle: Rounded Corners 22">
-            <a:extLst>
-              <a:ext uri="{FF2B5EF4-FFF2-40B4-BE49-F238E27FC236}">
-                <a16:creationId xmlns:a16="http://schemas.microsoft.com/office/drawing/2014/main" id="{115F3080-98DF-4A22-86F5-73AFAEF3FD1C}"/>
+              <a:t>API</a:t>
+            </a:r>
+          </a:p>
+        </p:txBody>
+      </p:sp>
+      <p:sp>
+        <p:nvSpPr>
+          <p:cNvPr id="25" name="Rectangle: Rounded Corners 24">
+            <a:extLst>
+              <a:ext uri="{FF2B5EF4-FFF2-40B4-BE49-F238E27FC236}">
+                <a16:creationId xmlns:a16="http://schemas.microsoft.com/office/drawing/2014/main" id="{A9B862EB-614D-473F-A87F-40E3A0759C43}"/>
               </a:ext>
             </a:extLst>
           </p:cNvPr>
@@ -4300,8 +4159,8 @@
         </p:nvSpPr>
         <p:spPr>
           <a:xfrm>
-            <a:off x="5869189" y="3244129"/>
-            <a:ext cx="5327922" cy="3404649"/>
+            <a:off x="941084" y="3173927"/>
+            <a:ext cx="2398617" cy="2034190"/>
           </a:xfrm>
           <a:prstGeom prst="roundRect">
             <a:avLst/>
@@ -4340,45 +4199,10 @@
       </p:sp>
       <p:sp>
         <p:nvSpPr>
-          <p:cNvPr id="24" name="TextBox 23">
-            <a:extLst>
-              <a:ext uri="{FF2B5EF4-FFF2-40B4-BE49-F238E27FC236}">
-                <a16:creationId xmlns:a16="http://schemas.microsoft.com/office/drawing/2014/main" id="{1CBB8180-A26F-4684-9E99-2448555FDD80}"/>
-              </a:ext>
-            </a:extLst>
-          </p:cNvPr>
-          <p:cNvSpPr txBox="1"/>
-          <p:nvPr/>
-        </p:nvSpPr>
-        <p:spPr>
-          <a:xfrm>
-            <a:off x="6957739" y="2874797"/>
-            <a:ext cx="3677417" cy="369332"/>
-          </a:xfrm>
-          <a:prstGeom prst="rect">
-            <a:avLst/>
-          </a:prstGeom>
-          <a:noFill/>
-        </p:spPr>
-        <p:txBody>
-          <a:bodyPr wrap="none" rtlCol="0">
-            <a:spAutoFit/>
-          </a:bodyPr>
-          <a:lstStyle/>
-          <a:p>
-            <a:r>
-              <a:rPr lang="en-US" dirty="0"/>
-              <a:t>Online/Offline Data (User Controlled)</a:t>
-            </a:r>
-          </a:p>
-        </p:txBody>
-      </p:sp>
-      <p:sp>
-        <p:nvSpPr>
-          <p:cNvPr id="25" name="Rectangle: Rounded Corners 24">
-            <a:extLst>
-              <a:ext uri="{FF2B5EF4-FFF2-40B4-BE49-F238E27FC236}">
-                <a16:creationId xmlns:a16="http://schemas.microsoft.com/office/drawing/2014/main" id="{A9B862EB-614D-473F-A87F-40E3A0759C43}"/>
+          <p:cNvPr id="26" name="Arrow: Right 25">
+            <a:extLst>
+              <a:ext uri="{FF2B5EF4-FFF2-40B4-BE49-F238E27FC236}">
+                <a16:creationId xmlns:a16="http://schemas.microsoft.com/office/drawing/2014/main" id="{C4F32022-F11E-47B7-B31B-0ED65B484CCA}"/>
               </a:ext>
             </a:extLst>
           </p:cNvPr>
@@ -4386,61 +4210,9 @@
           <p:nvPr/>
         </p:nvSpPr>
         <p:spPr>
-          <a:xfrm>
-            <a:off x="941084" y="3173927"/>
-            <a:ext cx="2398617" cy="3398324"/>
-          </a:xfrm>
-          <a:prstGeom prst="roundRect">
-            <a:avLst/>
-          </a:prstGeom>
-          <a:noFill/>
-          <a:ln w="44450">
-            <a:solidFill>
-              <a:schemeClr val="tx1"/>
-            </a:solidFill>
-          </a:ln>
-        </p:spPr>
-        <p:style>
-          <a:lnRef idx="2">
-            <a:schemeClr val="accent1">
-              <a:shade val="50000"/>
-            </a:schemeClr>
-          </a:lnRef>
-          <a:fillRef idx="1">
-            <a:schemeClr val="accent1"/>
-          </a:fillRef>
-          <a:effectRef idx="0">
-            <a:schemeClr val="accent1"/>
-          </a:effectRef>
-          <a:fontRef idx="minor">
-            <a:schemeClr val="lt1"/>
-          </a:fontRef>
-        </p:style>
-        <p:txBody>
-          <a:bodyPr rtlCol="0" anchor="ctr"/>
-          <a:lstStyle/>
-          <a:p>
-            <a:pPr algn="ctr"/>
-            <a:endParaRPr lang="en-US"/>
-          </a:p>
-        </p:txBody>
-      </p:sp>
-      <p:sp>
-        <p:nvSpPr>
-          <p:cNvPr id="26" name="Arrow: Right 25">
-            <a:extLst>
-              <a:ext uri="{FF2B5EF4-FFF2-40B4-BE49-F238E27FC236}">
-                <a16:creationId xmlns:a16="http://schemas.microsoft.com/office/drawing/2014/main" id="{C4F32022-F11E-47B7-B31B-0ED65B484CCA}"/>
-              </a:ext>
-            </a:extLst>
-          </p:cNvPr>
-          <p:cNvSpPr/>
-          <p:nvPr/>
-        </p:nvSpPr>
-        <p:spPr>
           <a:xfrm rot="10800000" flipV="1">
-            <a:off x="3446072" y="3794957"/>
-            <a:ext cx="2316747" cy="1107683"/>
+            <a:off x="3400249" y="4290927"/>
+            <a:ext cx="2375416" cy="415725"/>
           </a:xfrm>
           <a:prstGeom prst="rightArrow">
             <a:avLst/>
@@ -4469,14 +4241,7 @@
             <a:pPr algn="ctr"/>
             <a:r>
               <a:rPr lang="en-US" dirty="0"/>
-              <a:t>Manual Control </a:t>
-            </a:r>
-          </a:p>
-          <a:p>
-            <a:pPr algn="ctr"/>
-            <a:r>
-              <a:rPr lang="en-US" dirty="0"/>
-              <a:t>Controller Updates</a:t>
+              <a:t>Manual Command </a:t>
             </a:r>
           </a:p>
         </p:txBody>
@@ -4558,45 +4323,6 @@
       </p:sp>
       <p:sp>
         <p:nvSpPr>
-          <p:cNvPr id="30" name="TextBox 29">
-            <a:extLst>
-              <a:ext uri="{FF2B5EF4-FFF2-40B4-BE49-F238E27FC236}">
-                <a16:creationId xmlns:a16="http://schemas.microsoft.com/office/drawing/2014/main" id="{0C5C9EA4-292A-4250-97B3-CD30B3C9D8C7}"/>
-              </a:ext>
-            </a:extLst>
-          </p:cNvPr>
-          <p:cNvSpPr txBox="1"/>
-          <p:nvPr/>
-        </p:nvSpPr>
-        <p:spPr>
-          <a:xfrm>
-            <a:off x="8930932" y="948803"/>
-            <a:ext cx="1359218" cy="369332"/>
-          </a:xfrm>
-          <a:prstGeom prst="rect">
-            <a:avLst/>
-          </a:prstGeom>
-          <a:noFill/>
-        </p:spPr>
-        <p:txBody>
-          <a:bodyPr wrap="none" rtlCol="0">
-            <a:spAutoFit/>
-          </a:bodyPr>
-          <a:lstStyle/>
-          <a:p>
-            <a:r>
-              <a:rPr lang="en-US" dirty="0">
-                <a:solidFill>
-                  <a:srgbClr val="C00000"/>
-                </a:solidFill>
-              </a:rPr>
-              <a:t>Raspberry Pi</a:t>
-            </a:r>
-          </a:p>
-        </p:txBody>
-      </p:sp>
-      <p:sp>
-        <p:nvSpPr>
           <p:cNvPr id="31" name="TextBox 30">
             <a:extLst>
               <a:ext uri="{FF2B5EF4-FFF2-40B4-BE49-F238E27FC236}">
@@ -4648,8 +4374,8 @@
         </p:nvSpPr>
         <p:spPr>
           <a:xfrm>
-            <a:off x="8186756" y="3244334"/>
-            <a:ext cx="785664" cy="369332"/>
+            <a:off x="8023863" y="2835486"/>
+            <a:ext cx="1466620" cy="369332"/>
           </a:xfrm>
           <a:prstGeom prst="rect">
             <a:avLst/>
@@ -4668,8 +4394,195 @@
                   <a:srgbClr val="C00000"/>
                 </a:solidFill>
               </a:rPr>
-              <a:t>Server</a:t>
-            </a:r>
+              <a:t>Raspberry Pi?</a:t>
+            </a:r>
+          </a:p>
+        </p:txBody>
+      </p:sp>
+      <p:sp>
+        <p:nvSpPr>
+          <p:cNvPr id="33" name="Rectangle: Rounded Corners 32">
+            <a:extLst>
+              <a:ext uri="{FF2B5EF4-FFF2-40B4-BE49-F238E27FC236}">
+                <a16:creationId xmlns:a16="http://schemas.microsoft.com/office/drawing/2014/main" id="{4E1A0999-F2BB-4BDD-A327-2791C8C34C8E}"/>
+              </a:ext>
+            </a:extLst>
+          </p:cNvPr>
+          <p:cNvSpPr/>
+          <p:nvPr/>
+        </p:nvSpPr>
+        <p:spPr>
+          <a:xfrm>
+            <a:off x="7742069" y="3231328"/>
+            <a:ext cx="2085975" cy="403563"/>
+          </a:xfrm>
+          <a:prstGeom prst="roundRect">
+            <a:avLst/>
+          </a:prstGeom>
+        </p:spPr>
+        <p:style>
+          <a:lnRef idx="2">
+            <a:schemeClr val="accent1">
+              <a:shade val="50000"/>
+            </a:schemeClr>
+          </a:lnRef>
+          <a:fillRef idx="1">
+            <a:schemeClr val="accent1"/>
+          </a:fillRef>
+          <a:effectRef idx="0">
+            <a:schemeClr val="accent1"/>
+          </a:effectRef>
+          <a:fontRef idx="minor">
+            <a:schemeClr val="lt1"/>
+          </a:fontRef>
+        </p:style>
+        <p:txBody>
+          <a:bodyPr rtlCol="0" anchor="ctr"/>
+          <a:lstStyle/>
+          <a:p>
+            <a:pPr algn="ctr"/>
+            <a:r>
+              <a:rPr lang="en-US" dirty="0"/>
+              <a:t>HTTP Server</a:t>
+            </a:r>
+          </a:p>
+        </p:txBody>
+      </p:sp>
+      <p:sp>
+        <p:nvSpPr>
+          <p:cNvPr id="34" name="Arrow: Right 33">
+            <a:extLst>
+              <a:ext uri="{FF2B5EF4-FFF2-40B4-BE49-F238E27FC236}">
+                <a16:creationId xmlns:a16="http://schemas.microsoft.com/office/drawing/2014/main" id="{A8C45CD7-7E8E-4D26-ABE2-379690473DE3}"/>
+              </a:ext>
+            </a:extLst>
+          </p:cNvPr>
+          <p:cNvSpPr/>
+          <p:nvPr/>
+        </p:nvSpPr>
+        <p:spPr>
+          <a:xfrm rot="5400000">
+            <a:off x="8820885" y="3715852"/>
+            <a:ext cx="363348" cy="435006"/>
+          </a:xfrm>
+          <a:prstGeom prst="rightArrow">
+            <a:avLst/>
+          </a:prstGeom>
+        </p:spPr>
+        <p:style>
+          <a:lnRef idx="2">
+            <a:schemeClr val="accent1">
+              <a:shade val="50000"/>
+            </a:schemeClr>
+          </a:lnRef>
+          <a:fillRef idx="1">
+            <a:schemeClr val="accent1"/>
+          </a:fillRef>
+          <a:effectRef idx="0">
+            <a:schemeClr val="accent1"/>
+          </a:effectRef>
+          <a:fontRef idx="minor">
+            <a:schemeClr val="lt1"/>
+          </a:fontRef>
+        </p:style>
+        <p:txBody>
+          <a:bodyPr rtlCol="0" anchor="ctr"/>
+          <a:lstStyle/>
+          <a:p>
+            <a:pPr algn="ctr"/>
+            <a:endParaRPr lang="en-US"/>
+          </a:p>
+        </p:txBody>
+      </p:sp>
+      <p:sp>
+        <p:nvSpPr>
+          <p:cNvPr id="35" name="Arrow: Right 34">
+            <a:extLst>
+              <a:ext uri="{FF2B5EF4-FFF2-40B4-BE49-F238E27FC236}">
+                <a16:creationId xmlns:a16="http://schemas.microsoft.com/office/drawing/2014/main" id="{5A3FADAF-8680-40E9-A4E4-283C412DA539}"/>
+              </a:ext>
+            </a:extLst>
+          </p:cNvPr>
+          <p:cNvSpPr/>
+          <p:nvPr/>
+        </p:nvSpPr>
+        <p:spPr>
+          <a:xfrm rot="10800000">
+            <a:off x="7253679" y="3418307"/>
+            <a:ext cx="363348" cy="292560"/>
+          </a:xfrm>
+          <a:prstGeom prst="rightArrow">
+            <a:avLst/>
+          </a:prstGeom>
+        </p:spPr>
+        <p:style>
+          <a:lnRef idx="2">
+            <a:schemeClr val="accent1">
+              <a:shade val="50000"/>
+            </a:schemeClr>
+          </a:lnRef>
+          <a:fillRef idx="1">
+            <a:schemeClr val="accent1"/>
+          </a:fillRef>
+          <a:effectRef idx="0">
+            <a:schemeClr val="accent1"/>
+          </a:effectRef>
+          <a:fontRef idx="minor">
+            <a:schemeClr val="lt1"/>
+          </a:fontRef>
+        </p:style>
+        <p:txBody>
+          <a:bodyPr rtlCol="0" anchor="ctr"/>
+          <a:lstStyle/>
+          <a:p>
+            <a:pPr algn="ctr"/>
+            <a:endParaRPr lang="en-US"/>
+          </a:p>
+        </p:txBody>
+      </p:sp>
+      <p:sp>
+        <p:nvSpPr>
+          <p:cNvPr id="36" name="Arrow: Right 35">
+            <a:extLst>
+              <a:ext uri="{FF2B5EF4-FFF2-40B4-BE49-F238E27FC236}">
+                <a16:creationId xmlns:a16="http://schemas.microsoft.com/office/drawing/2014/main" id="{6A43B6FC-567A-4B12-B87F-DEEB24586E57}"/>
+              </a:ext>
+            </a:extLst>
+          </p:cNvPr>
+          <p:cNvSpPr/>
+          <p:nvPr/>
+        </p:nvSpPr>
+        <p:spPr>
+          <a:xfrm>
+            <a:off x="7316200" y="3140767"/>
+            <a:ext cx="363348" cy="288233"/>
+          </a:xfrm>
+          <a:prstGeom prst="rightArrow">
+            <a:avLst/>
+          </a:prstGeom>
+        </p:spPr>
+        <p:style>
+          <a:lnRef idx="2">
+            <a:schemeClr val="accent1">
+              <a:shade val="50000"/>
+            </a:schemeClr>
+          </a:lnRef>
+          <a:fillRef idx="1">
+            <a:schemeClr val="accent1"/>
+          </a:fillRef>
+          <a:effectRef idx="0">
+            <a:schemeClr val="accent1"/>
+          </a:effectRef>
+          <a:fontRef idx="minor">
+            <a:schemeClr val="lt1"/>
+          </a:fontRef>
+        </p:style>
+        <p:txBody>
+          <a:bodyPr rtlCol="0" anchor="ctr"/>
+          <a:lstStyle/>
+          <a:p>
+            <a:pPr algn="ctr"/>
+            <a:endParaRPr lang="en-US"/>
           </a:p>
         </p:txBody>
       </p:sp>
@@ -4750,12 +4663,21 @@
         </p:nvSpPr>
         <p:spPr/>
         <p:txBody>
-          <a:bodyPr/>
+          <a:bodyPr>
+            <a:normAutofit lnSpcReduction="10000"/>
+          </a:bodyPr>
           <a:lstStyle/>
           <a:p>
             <a:r>
               <a:rPr lang="en-US" dirty="0"/>
               <a:t>SQL</a:t>
+            </a:r>
+          </a:p>
+          <a:p>
+            <a:pPr lvl="1"/>
+            <a:r>
+              <a:rPr lang="en-US" dirty="0"/>
+              <a:t>MySQL Workbench</a:t>
             </a:r>
           </a:p>
           <a:p>
@@ -4962,7 +4884,7 @@
           <p:cNvPr id="2" name="Title 1">
             <a:extLst>
               <a:ext uri="{FF2B5EF4-FFF2-40B4-BE49-F238E27FC236}">
-                <a16:creationId xmlns:a16="http://schemas.microsoft.com/office/drawing/2014/main" id="{6C151666-22D0-41B0-9E54-8DC46A427CED}"/>
+                <a16:creationId xmlns:a16="http://schemas.microsoft.com/office/drawing/2014/main" id="{1EE981C8-D035-407A-9FC3-09D31AD7BC71}"/>
               </a:ext>
             </a:extLst>
           </p:cNvPr>
@@ -4981,7 +4903,7 @@
             <a:pPr algn="ctr"/>
             <a:r>
               <a:rPr lang="en-US" dirty="0"/>
-              <a:t>Outstanding Questions</a:t>
+              <a:t>Device</a:t>
             </a:r>
           </a:p>
         </p:txBody>
@@ -4991,7 +4913,7 @@
           <p:cNvPr id="3" name="Content Placeholder 2">
             <a:extLst>
               <a:ext uri="{FF2B5EF4-FFF2-40B4-BE49-F238E27FC236}">
-                <a16:creationId xmlns:a16="http://schemas.microsoft.com/office/drawing/2014/main" id="{C6749A8F-FF72-4782-B31C-E07B20F9F037}"/>
+                <a16:creationId xmlns:a16="http://schemas.microsoft.com/office/drawing/2014/main" id="{C3D08315-5D2E-439F-A21A-39FD59F08C5B}"/>
               </a:ext>
             </a:extLst>
           </p:cNvPr>
@@ -5009,18 +4931,15 @@
           <a:p>
             <a:r>
               <a:rPr lang="en-US" dirty="0"/>
-              <a:t>GUI – Best/Easiest</a:t>
-            </a:r>
-          </a:p>
-          <a:p>
-            <a:endParaRPr lang="en-US" dirty="0"/>
+              <a:t>Record </a:t>
+            </a:r>
           </a:p>
         </p:txBody>
       </p:sp>
     </p:spTree>
     <p:extLst>
       <p:ext uri="{BB962C8B-B14F-4D97-AF65-F5344CB8AC3E}">
-        <p14:creationId xmlns:p14="http://schemas.microsoft.com/office/powerpoint/2010/main" val="1324135825"/>
+        <p14:creationId xmlns:p14="http://schemas.microsoft.com/office/powerpoint/2010/main" val="932920167"/>
       </p:ext>
     </p:extLst>
   </p:cSld>
@@ -5052,7 +4971,7 @@
           <p:cNvPr id="2" name="Title 1">
             <a:extLst>
               <a:ext uri="{FF2B5EF4-FFF2-40B4-BE49-F238E27FC236}">
-                <a16:creationId xmlns:a16="http://schemas.microsoft.com/office/drawing/2014/main" id="{8B803CA7-3DB4-4B4D-BA16-89F3FA690238}"/>
+                <a16:creationId xmlns:a16="http://schemas.microsoft.com/office/drawing/2014/main" id="{6C151666-22D0-41B0-9E54-8DC46A427CED}"/>
               </a:ext>
             </a:extLst>
           </p:cNvPr>
@@ -5071,7 +4990,7 @@
             <a:pPr algn="ctr"/>
             <a:r>
               <a:rPr lang="en-US" dirty="0"/>
-              <a:t>Testing Methods</a:t>
+              <a:t>Outstanding Questions</a:t>
             </a:r>
           </a:p>
         </p:txBody>
@@ -5081,7 +5000,7 @@
           <p:cNvPr id="3" name="Content Placeholder 2">
             <a:extLst>
               <a:ext uri="{FF2B5EF4-FFF2-40B4-BE49-F238E27FC236}">
-                <a16:creationId xmlns:a16="http://schemas.microsoft.com/office/drawing/2014/main" id="{AF82CA6D-0B14-491F-BBBA-986677496322}"/>
+                <a16:creationId xmlns:a16="http://schemas.microsoft.com/office/drawing/2014/main" id="{C6749A8F-FF72-4782-B31C-E07B20F9F037}"/>
               </a:ext>
             </a:extLst>
           </p:cNvPr>
@@ -5099,15 +5018,18 @@
           <a:p>
             <a:r>
               <a:rPr lang="en-US" dirty="0"/>
-              <a:t>http://www.fao.org/3/ca2796en/CA2796EN.pdf</a:t>
-            </a:r>
+              <a:t>GUI – Best/Easiest</a:t>
+            </a:r>
+          </a:p>
+          <a:p>
+            <a:endParaRPr lang="en-US" dirty="0"/>
           </a:p>
         </p:txBody>
       </p:sp>
     </p:spTree>
     <p:extLst>
       <p:ext uri="{BB962C8B-B14F-4D97-AF65-F5344CB8AC3E}">
-        <p14:creationId xmlns:p14="http://schemas.microsoft.com/office/powerpoint/2010/main" val="1432040007"/>
+        <p14:creationId xmlns:p14="http://schemas.microsoft.com/office/powerpoint/2010/main" val="1324135825"/>
       </p:ext>
     </p:extLst>
   </p:cSld>
@@ -5139,7 +5061,7 @@
           <p:cNvPr id="2" name="Title 1">
             <a:extLst>
               <a:ext uri="{FF2B5EF4-FFF2-40B4-BE49-F238E27FC236}">
-                <a16:creationId xmlns:a16="http://schemas.microsoft.com/office/drawing/2014/main" id="{9EC0DD40-5C84-4AC5-A77E-DE389659DA3B}"/>
+                <a16:creationId xmlns:a16="http://schemas.microsoft.com/office/drawing/2014/main" id="{8B803CA7-3DB4-4B4D-BA16-89F3FA690238}"/>
               </a:ext>
             </a:extLst>
           </p:cNvPr>
@@ -5158,7 +5080,7 @@
             <a:pPr algn="ctr"/>
             <a:r>
               <a:rPr lang="en-US" dirty="0"/>
-              <a:t>Make Fake Data</a:t>
+              <a:t>Testing Methods</a:t>
             </a:r>
           </a:p>
         </p:txBody>
@@ -5168,7 +5090,7 @@
           <p:cNvPr id="3" name="Content Placeholder 2">
             <a:extLst>
               <a:ext uri="{FF2B5EF4-FFF2-40B4-BE49-F238E27FC236}">
-                <a16:creationId xmlns:a16="http://schemas.microsoft.com/office/drawing/2014/main" id="{5397ADCB-A991-4363-A2C6-C23983382340}"/>
+                <a16:creationId xmlns:a16="http://schemas.microsoft.com/office/drawing/2014/main" id="{AF82CA6D-0B14-491F-BBBA-986677496322}"/>
               </a:ext>
             </a:extLst>
           </p:cNvPr>
@@ -5186,61 +5108,15 @@
           <a:p>
             <a:r>
               <a:rPr lang="en-US" dirty="0"/>
-              <a:t>Sensor Class</a:t>
-            </a:r>
-          </a:p>
-          <a:p>
-            <a:pPr lvl="1"/>
-            <a:r>
-              <a:rPr lang="en-US" dirty="0"/>
-              <a:t>Temperature</a:t>
-            </a:r>
-          </a:p>
-          <a:p>
-            <a:pPr lvl="1"/>
-            <a:r>
-              <a:rPr lang="en-US" dirty="0"/>
-              <a:t>Soil Moisture</a:t>
-            </a:r>
-          </a:p>
-          <a:p>
-            <a:pPr lvl="1"/>
-            <a:r>
-              <a:rPr lang="en-US" dirty="0"/>
-              <a:t>Acidity</a:t>
-            </a:r>
-          </a:p>
-          <a:p>
-            <a:pPr lvl="1"/>
-            <a:r>
-              <a:rPr lang="en-US" dirty="0"/>
-              <a:t>Light</a:t>
-            </a:r>
-          </a:p>
-          <a:p>
-            <a:pPr lvl="1"/>
-            <a:r>
-              <a:rPr lang="en-US" dirty="0"/>
-              <a:t>Salinity</a:t>
-            </a:r>
-          </a:p>
-          <a:p>
-            <a:pPr lvl="1"/>
-            <a:r>
-              <a:rPr lang="en-US"/>
-              <a:t>Visual Data</a:t>
-            </a:r>
-          </a:p>
-          <a:p>
-            <a:pPr lvl="1"/>
-            <a:endParaRPr lang="en-US" dirty="0"/>
+              <a:t>http://www.fao.org/3/ca2796en/CA2796EN.pdf</a:t>
+            </a:r>
           </a:p>
         </p:txBody>
       </p:sp>
     </p:spTree>
     <p:extLst>
       <p:ext uri="{BB962C8B-B14F-4D97-AF65-F5344CB8AC3E}">
-        <p14:creationId xmlns:p14="http://schemas.microsoft.com/office/powerpoint/2010/main" val="2630466151"/>
+        <p14:creationId xmlns:p14="http://schemas.microsoft.com/office/powerpoint/2010/main" val="1432040007"/>
       </p:ext>
     </p:extLst>
   </p:cSld>
@@ -5272,6 +5148,139 @@
           <p:cNvPr id="2" name="Title 1">
             <a:extLst>
               <a:ext uri="{FF2B5EF4-FFF2-40B4-BE49-F238E27FC236}">
+                <a16:creationId xmlns:a16="http://schemas.microsoft.com/office/drawing/2014/main" id="{9EC0DD40-5C84-4AC5-A77E-DE389659DA3B}"/>
+              </a:ext>
+            </a:extLst>
+          </p:cNvPr>
+          <p:cNvSpPr>
+            <a:spLocks noGrp="1"/>
+          </p:cNvSpPr>
+          <p:nvPr>
+            <p:ph type="title"/>
+          </p:nvPr>
+        </p:nvSpPr>
+        <p:spPr/>
+        <p:txBody>
+          <a:bodyPr/>
+          <a:lstStyle/>
+          <a:p>
+            <a:pPr algn="ctr"/>
+            <a:r>
+              <a:rPr lang="en-US" dirty="0"/>
+              <a:t>Make Fake Data</a:t>
+            </a:r>
+          </a:p>
+        </p:txBody>
+      </p:sp>
+      <p:sp>
+        <p:nvSpPr>
+          <p:cNvPr id="3" name="Content Placeholder 2">
+            <a:extLst>
+              <a:ext uri="{FF2B5EF4-FFF2-40B4-BE49-F238E27FC236}">
+                <a16:creationId xmlns:a16="http://schemas.microsoft.com/office/drawing/2014/main" id="{5397ADCB-A991-4363-A2C6-C23983382340}"/>
+              </a:ext>
+            </a:extLst>
+          </p:cNvPr>
+          <p:cNvSpPr>
+            <a:spLocks noGrp="1"/>
+          </p:cNvSpPr>
+          <p:nvPr>
+            <p:ph idx="1"/>
+          </p:nvPr>
+        </p:nvSpPr>
+        <p:spPr/>
+        <p:txBody>
+          <a:bodyPr/>
+          <a:lstStyle/>
+          <a:p>
+            <a:r>
+              <a:rPr lang="en-US" dirty="0"/>
+              <a:t>Sensor Class</a:t>
+            </a:r>
+          </a:p>
+          <a:p>
+            <a:pPr lvl="1"/>
+            <a:r>
+              <a:rPr lang="en-US" dirty="0"/>
+              <a:t>Temperature</a:t>
+            </a:r>
+          </a:p>
+          <a:p>
+            <a:pPr lvl="1"/>
+            <a:r>
+              <a:rPr lang="en-US" dirty="0"/>
+              <a:t>Soil Moisture</a:t>
+            </a:r>
+          </a:p>
+          <a:p>
+            <a:pPr lvl="1"/>
+            <a:r>
+              <a:rPr lang="en-US" dirty="0"/>
+              <a:t>Acidity</a:t>
+            </a:r>
+          </a:p>
+          <a:p>
+            <a:pPr lvl="1"/>
+            <a:r>
+              <a:rPr lang="en-US" dirty="0"/>
+              <a:t>Light</a:t>
+            </a:r>
+          </a:p>
+          <a:p>
+            <a:pPr lvl="1"/>
+            <a:r>
+              <a:rPr lang="en-US" dirty="0"/>
+              <a:t>Salinity</a:t>
+            </a:r>
+          </a:p>
+          <a:p>
+            <a:pPr lvl="1"/>
+            <a:r>
+              <a:rPr lang="en-US"/>
+              <a:t>Visual Data</a:t>
+            </a:r>
+          </a:p>
+          <a:p>
+            <a:pPr lvl="1"/>
+            <a:endParaRPr lang="en-US" dirty="0"/>
+          </a:p>
+        </p:txBody>
+      </p:sp>
+    </p:spTree>
+    <p:extLst>
+      <p:ext uri="{BB962C8B-B14F-4D97-AF65-F5344CB8AC3E}">
+        <p14:creationId xmlns:p14="http://schemas.microsoft.com/office/powerpoint/2010/main" val="2630466151"/>
+      </p:ext>
+    </p:extLst>
+  </p:cSld>
+  <p:clrMapOvr>
+    <a:masterClrMapping/>
+  </p:clrMapOvr>
+</p:sld>
+</file>
+
+<file path=ppt/slides/slide8.xml><?xml version="1.0" encoding="utf-8"?>
+<p:sld xmlns:a="http://schemas.openxmlformats.org/drawingml/2006/main" xmlns:r="http://schemas.openxmlformats.org/officeDocument/2006/relationships" xmlns:p="http://schemas.openxmlformats.org/presentationml/2006/main">
+  <p:cSld>
+    <p:spTree>
+      <p:nvGrpSpPr>
+        <p:cNvPr id="1" name=""/>
+        <p:cNvGrpSpPr/>
+        <p:nvPr/>
+      </p:nvGrpSpPr>
+      <p:grpSpPr>
+        <a:xfrm>
+          <a:off x="0" y="0"/>
+          <a:ext cx="0" cy="0"/>
+          <a:chOff x="0" y="0"/>
+          <a:chExt cx="0" cy="0"/>
+        </a:xfrm>
+      </p:grpSpPr>
+      <p:sp>
+        <p:nvSpPr>
+          <p:cNvPr id="2" name="Title 1">
+            <a:extLst>
+              <a:ext uri="{FF2B5EF4-FFF2-40B4-BE49-F238E27FC236}">
                 <a16:creationId xmlns:a16="http://schemas.microsoft.com/office/drawing/2014/main" id="{47E8B3F7-CBC4-4486-9D48-667EB37F18F3}"/>
               </a:ext>
             </a:extLst>
@@ -5383,7 +5392,7 @@
 </p:sld>
 </file>
 
-<file path=ppt/slides/slide8.xml><?xml version="1.0" encoding="utf-8"?>
+<file path=ppt/slides/slide9.xml><?xml version="1.0" encoding="utf-8"?>
 <p:sld xmlns:a="http://schemas.openxmlformats.org/drawingml/2006/main" xmlns:r="http://schemas.openxmlformats.org/officeDocument/2006/relationships" xmlns:p="http://schemas.openxmlformats.org/presentationml/2006/main">
   <p:cSld>
     <p:spTree>

</xml_diff>

<commit_message>
Updated Outline and added a jupyter notebook
</commit_message>
<xml_diff>
--- a/Outline.pptx
+++ b/Outline.pptx
@@ -5,15 +5,19 @@
     <p:sldMasterId id="2147483648" r:id="rId1"/>
   </p:sldMasterIdLst>
   <p:sldIdLst>
-    <p:sldId id="256" r:id="rId2"/>
-    <p:sldId id="263" r:id="rId3"/>
-    <p:sldId id="264" r:id="rId4"/>
-    <p:sldId id="265" r:id="rId5"/>
-    <p:sldId id="260" r:id="rId6"/>
-    <p:sldId id="258" r:id="rId7"/>
-    <p:sldId id="257" r:id="rId8"/>
-    <p:sldId id="261" r:id="rId9"/>
-    <p:sldId id="262" r:id="rId10"/>
+    <p:sldId id="267" r:id="rId2"/>
+    <p:sldId id="269" r:id="rId3"/>
+    <p:sldId id="268" r:id="rId4"/>
+    <p:sldId id="270" r:id="rId5"/>
+    <p:sldId id="263" r:id="rId6"/>
+    <p:sldId id="266" r:id="rId7"/>
+    <p:sldId id="264" r:id="rId8"/>
+    <p:sldId id="265" r:id="rId9"/>
+    <p:sldId id="260" r:id="rId10"/>
+    <p:sldId id="258" r:id="rId11"/>
+    <p:sldId id="257" r:id="rId12"/>
+    <p:sldId id="261" r:id="rId13"/>
+    <p:sldId id="262" r:id="rId14"/>
   </p:sldIdLst>
   <p:sldSz cx="12192000" cy="6858000"/>
   <p:notesSz cx="6858000" cy="9144000"/>
@@ -279,7 +283,7 @@
           <a:p>
             <a:fld id="{3E17C7E1-582E-4AB2-85BF-A0FE62F38CDC}" type="datetimeFigureOut">
               <a:rPr lang="en-US" smtClean="0"/>
-              <a:t>7/23/2021</a:t>
+              <a:t>8/7/2021</a:t>
             </a:fld>
             <a:endParaRPr lang="en-US"/>
           </a:p>
@@ -477,7 +481,7 @@
           <a:p>
             <a:fld id="{3E17C7E1-582E-4AB2-85BF-A0FE62F38CDC}" type="datetimeFigureOut">
               <a:rPr lang="en-US" smtClean="0"/>
-              <a:t>7/23/2021</a:t>
+              <a:t>8/7/2021</a:t>
             </a:fld>
             <a:endParaRPr lang="en-US"/>
           </a:p>
@@ -685,7 +689,7 @@
           <a:p>
             <a:fld id="{3E17C7E1-582E-4AB2-85BF-A0FE62F38CDC}" type="datetimeFigureOut">
               <a:rPr lang="en-US" smtClean="0"/>
-              <a:t>7/23/2021</a:t>
+              <a:t>8/7/2021</a:t>
             </a:fld>
             <a:endParaRPr lang="en-US"/>
           </a:p>
@@ -883,7 +887,7 @@
           <a:p>
             <a:fld id="{3E17C7E1-582E-4AB2-85BF-A0FE62F38CDC}" type="datetimeFigureOut">
               <a:rPr lang="en-US" smtClean="0"/>
-              <a:t>7/23/2021</a:t>
+              <a:t>8/7/2021</a:t>
             </a:fld>
             <a:endParaRPr lang="en-US"/>
           </a:p>
@@ -1158,7 +1162,7 @@
           <a:p>
             <a:fld id="{3E17C7E1-582E-4AB2-85BF-A0FE62F38CDC}" type="datetimeFigureOut">
               <a:rPr lang="en-US" smtClean="0"/>
-              <a:t>7/23/2021</a:t>
+              <a:t>8/7/2021</a:t>
             </a:fld>
             <a:endParaRPr lang="en-US"/>
           </a:p>
@@ -1423,7 +1427,7 @@
           <a:p>
             <a:fld id="{3E17C7E1-582E-4AB2-85BF-A0FE62F38CDC}" type="datetimeFigureOut">
               <a:rPr lang="en-US" smtClean="0"/>
-              <a:t>7/23/2021</a:t>
+              <a:t>8/7/2021</a:t>
             </a:fld>
             <a:endParaRPr lang="en-US"/>
           </a:p>
@@ -1835,7 +1839,7 @@
           <a:p>
             <a:fld id="{3E17C7E1-582E-4AB2-85BF-A0FE62F38CDC}" type="datetimeFigureOut">
               <a:rPr lang="en-US" smtClean="0"/>
-              <a:t>7/23/2021</a:t>
+              <a:t>8/7/2021</a:t>
             </a:fld>
             <a:endParaRPr lang="en-US"/>
           </a:p>
@@ -1976,7 +1980,7 @@
           <a:p>
             <a:fld id="{3E17C7E1-582E-4AB2-85BF-A0FE62F38CDC}" type="datetimeFigureOut">
               <a:rPr lang="en-US" smtClean="0"/>
-              <a:t>7/23/2021</a:t>
+              <a:t>8/7/2021</a:t>
             </a:fld>
             <a:endParaRPr lang="en-US"/>
           </a:p>
@@ -2089,7 +2093,7 @@
           <a:p>
             <a:fld id="{3E17C7E1-582E-4AB2-85BF-A0FE62F38CDC}" type="datetimeFigureOut">
               <a:rPr lang="en-US" smtClean="0"/>
-              <a:t>7/23/2021</a:t>
+              <a:t>8/7/2021</a:t>
             </a:fld>
             <a:endParaRPr lang="en-US"/>
           </a:p>
@@ -2400,7 +2404,7 @@
           <a:p>
             <a:fld id="{3E17C7E1-582E-4AB2-85BF-A0FE62F38CDC}" type="datetimeFigureOut">
               <a:rPr lang="en-US" smtClean="0"/>
-              <a:t>7/23/2021</a:t>
+              <a:t>8/7/2021</a:t>
             </a:fld>
             <a:endParaRPr lang="en-US"/>
           </a:p>
@@ -2688,7 +2692,7 @@
           <a:p>
             <a:fld id="{3E17C7E1-582E-4AB2-85BF-A0FE62F38CDC}" type="datetimeFigureOut">
               <a:rPr lang="en-US" smtClean="0"/>
-              <a:t>7/23/2021</a:t>
+              <a:t>8/7/2021</a:t>
             </a:fld>
             <a:endParaRPr lang="en-US"/>
           </a:p>
@@ -2929,7 +2933,7 @@
           <a:p>
             <a:fld id="{3E17C7E1-582E-4AB2-85BF-A0FE62F38CDC}" type="datetimeFigureOut">
               <a:rPr lang="en-US" smtClean="0"/>
-              <a:t>7/23/2021</a:t>
+              <a:t>8/7/2021</a:t>
             </a:fld>
             <a:endParaRPr lang="en-US"/>
           </a:p>
@@ -3360,7 +3364,7 @@
         </p:nvSpPr>
         <p:spPr>
           <a:xfrm>
-            <a:off x="923838" y="1307949"/>
+            <a:off x="4388200" y="1009145"/>
             <a:ext cx="2085975" cy="1190625"/>
           </a:xfrm>
           <a:prstGeom prst="roundRect">
@@ -3397,10 +3401,10 @@
       </p:sp>
       <p:sp>
         <p:nvSpPr>
-          <p:cNvPr id="6" name="Rectangle: Rounded Corners 5">
-            <a:extLst>
-              <a:ext uri="{FF2B5EF4-FFF2-40B4-BE49-F238E27FC236}">
-                <a16:creationId xmlns:a16="http://schemas.microsoft.com/office/drawing/2014/main" id="{8C351E35-E26B-4971-9A99-1E3FFD30A663}"/>
+          <p:cNvPr id="7" name="Rectangle: Rounded Corners 6">
+            <a:extLst>
+              <a:ext uri="{FF2B5EF4-FFF2-40B4-BE49-F238E27FC236}">
+                <a16:creationId xmlns:a16="http://schemas.microsoft.com/office/drawing/2014/main" id="{07612215-AD8E-4BCD-A428-AE2E99DEE9FF}"/>
               </a:ext>
             </a:extLst>
           </p:cNvPr>
@@ -3409,63 +3413,7 @@
         </p:nvSpPr>
         <p:spPr>
           <a:xfrm>
-            <a:off x="4663483" y="1337130"/>
-            <a:ext cx="2085975" cy="1190625"/>
-          </a:xfrm>
-          <a:prstGeom prst="roundRect">
-            <a:avLst/>
-          </a:prstGeom>
-        </p:spPr>
-        <p:style>
-          <a:lnRef idx="2">
-            <a:schemeClr val="accent1">
-              <a:shade val="50000"/>
-            </a:schemeClr>
-          </a:lnRef>
-          <a:fillRef idx="1">
-            <a:schemeClr val="accent1"/>
-          </a:fillRef>
-          <a:effectRef idx="0">
-            <a:schemeClr val="accent1"/>
-          </a:effectRef>
-          <a:fontRef idx="minor">
-            <a:schemeClr val="lt1"/>
-          </a:fontRef>
-        </p:style>
-        <p:txBody>
-          <a:bodyPr rtlCol="0" anchor="ctr"/>
-          <a:lstStyle/>
-          <a:p>
-            <a:pPr algn="ctr"/>
-            <a:r>
-              <a:rPr lang="en-US" dirty="0"/>
-              <a:t>Read Data</a:t>
-            </a:r>
-          </a:p>
-          <a:p>
-            <a:pPr algn="ctr"/>
-            <a:r>
-              <a:rPr lang="en-US" dirty="0"/>
-              <a:t>Transfer to SQL</a:t>
-            </a:r>
-          </a:p>
-        </p:txBody>
-      </p:sp>
-      <p:sp>
-        <p:nvSpPr>
-          <p:cNvPr id="7" name="Rectangle: Rounded Corners 6">
-            <a:extLst>
-              <a:ext uri="{FF2B5EF4-FFF2-40B4-BE49-F238E27FC236}">
-                <a16:creationId xmlns:a16="http://schemas.microsoft.com/office/drawing/2014/main" id="{07612215-AD8E-4BCD-A428-AE2E99DEE9FF}"/>
-              </a:ext>
-            </a:extLst>
-          </p:cNvPr>
-          <p:cNvSpPr/>
-          <p:nvPr/>
-        </p:nvSpPr>
-        <p:spPr>
-          <a:xfrm>
-            <a:off x="7959572" y="4140539"/>
+            <a:off x="7860875" y="4161447"/>
             <a:ext cx="2085975" cy="650183"/>
           </a:xfrm>
           <a:prstGeom prst="roundRect">
@@ -3502,7 +3450,7 @@
             <a:pPr algn="ctr"/>
             <a:r>
               <a:rPr lang="en-US" dirty="0"/>
-              <a:t>Database</a:t>
+              <a:t>Database Node</a:t>
             </a:r>
           </a:p>
         </p:txBody>
@@ -3558,10 +3506,10 @@
       </p:sp>
       <p:sp>
         <p:nvSpPr>
-          <p:cNvPr id="9" name="Arrow: Right 8">
-            <a:extLst>
-              <a:ext uri="{FF2B5EF4-FFF2-40B4-BE49-F238E27FC236}">
-                <a16:creationId xmlns:a16="http://schemas.microsoft.com/office/drawing/2014/main" id="{69FA73FA-44F4-48A7-B8CD-9EBCEBADBAE3}"/>
+          <p:cNvPr id="10" name="Arrow: Right 9">
+            <a:extLst>
+              <a:ext uri="{FF2B5EF4-FFF2-40B4-BE49-F238E27FC236}">
+                <a16:creationId xmlns:a16="http://schemas.microsoft.com/office/drawing/2014/main" id="{8F41B184-BACA-4444-B9B9-44039A072774}"/>
               </a:ext>
             </a:extLst>
           </p:cNvPr>
@@ -3569,8 +3517,8 @@
           <p:nvPr/>
         </p:nvSpPr>
         <p:spPr>
-          <a:xfrm>
-            <a:off x="3296352" y="1658785"/>
+          <a:xfrm rot="1002740">
+            <a:off x="7272539" y="2034945"/>
             <a:ext cx="1020933" cy="435006"/>
           </a:xfrm>
           <a:prstGeom prst="rightArrow">
@@ -3598,16 +3546,19 @@
           <a:lstStyle/>
           <a:p>
             <a:pPr algn="ctr"/>
-            <a:endParaRPr lang="en-US"/>
-          </a:p>
-        </p:txBody>
-      </p:sp>
-      <p:sp>
-        <p:nvSpPr>
-          <p:cNvPr id="10" name="Arrow: Right 9">
-            <a:extLst>
-              <a:ext uri="{FF2B5EF4-FFF2-40B4-BE49-F238E27FC236}">
-                <a16:creationId xmlns:a16="http://schemas.microsoft.com/office/drawing/2014/main" id="{8F41B184-BACA-4444-B9B9-44039A072774}"/>
+            <a:r>
+              <a:rPr lang="en-US" dirty="0"/>
+              <a:t>DATA!</a:t>
+            </a:r>
+          </a:p>
+        </p:txBody>
+      </p:sp>
+      <p:sp>
+        <p:nvSpPr>
+          <p:cNvPr id="13" name="Arrow: Right 12">
+            <a:extLst>
+              <a:ext uri="{FF2B5EF4-FFF2-40B4-BE49-F238E27FC236}">
+                <a16:creationId xmlns:a16="http://schemas.microsoft.com/office/drawing/2014/main" id="{B4D32617-76A4-4EA0-9D03-57CA9FC50593}"/>
               </a:ext>
             </a:extLst>
           </p:cNvPr>
@@ -3615,54 +3566,8 @@
           <p:nvPr/>
         </p:nvSpPr>
         <p:spPr>
-          <a:xfrm rot="2225230">
-            <a:off x="7203803" y="1786986"/>
-            <a:ext cx="1020933" cy="435006"/>
-          </a:xfrm>
-          <a:prstGeom prst="rightArrow">
-            <a:avLst/>
-          </a:prstGeom>
-        </p:spPr>
-        <p:style>
-          <a:lnRef idx="2">
-            <a:schemeClr val="accent1">
-              <a:shade val="50000"/>
-            </a:schemeClr>
-          </a:lnRef>
-          <a:fillRef idx="1">
-            <a:schemeClr val="accent1"/>
-          </a:fillRef>
-          <a:effectRef idx="0">
-            <a:schemeClr val="accent1"/>
-          </a:effectRef>
-          <a:fontRef idx="minor">
-            <a:schemeClr val="lt1"/>
-          </a:fontRef>
-        </p:style>
-        <p:txBody>
-          <a:bodyPr rtlCol="0" anchor="ctr"/>
-          <a:lstStyle/>
-          <a:p>
-            <a:pPr algn="ctr"/>
-            <a:endParaRPr lang="en-US"/>
-          </a:p>
-        </p:txBody>
-      </p:sp>
-      <p:sp>
-        <p:nvSpPr>
-          <p:cNvPr id="13" name="Arrow: Right 12">
-            <a:extLst>
-              <a:ext uri="{FF2B5EF4-FFF2-40B4-BE49-F238E27FC236}">
-                <a16:creationId xmlns:a16="http://schemas.microsoft.com/office/drawing/2014/main" id="{B4D32617-76A4-4EA0-9D03-57CA9FC50593}"/>
-              </a:ext>
-            </a:extLst>
-          </p:cNvPr>
-          <p:cNvSpPr/>
-          <p:nvPr/>
-        </p:nvSpPr>
-        <p:spPr>
-          <a:xfrm rot="10800000" flipV="1">
-            <a:off x="3394478" y="3685564"/>
+          <a:xfrm rot="12813391" flipV="1">
+            <a:off x="1374719" y="3039873"/>
             <a:ext cx="2398616" cy="415723"/>
           </a:xfrm>
           <a:prstGeom prst="rightArrow">
@@ -3711,7 +3616,7 @@
         </p:nvSpPr>
         <p:spPr>
           <a:xfrm>
-            <a:off x="8825275" y="5280490"/>
+            <a:off x="1206619" y="4681106"/>
             <a:ext cx="2085975" cy="1190625"/>
           </a:xfrm>
           <a:prstGeom prst="roundRect">
@@ -3805,8 +3710,8 @@
           <p:nvPr/>
         </p:nvSpPr>
         <p:spPr>
-          <a:xfrm rot="8470201">
-            <a:off x="7309423" y="4712840"/>
+          <a:xfrm rot="8042186">
+            <a:off x="7187956" y="4746340"/>
             <a:ext cx="649870" cy="435006"/>
           </a:xfrm>
           <a:prstGeom prst="rightArrow">
@@ -3840,10 +3745,10 @@
       </p:sp>
       <p:sp>
         <p:nvSpPr>
-          <p:cNvPr id="17" name="Rectangle: Rounded Corners 16">
-            <a:extLst>
-              <a:ext uri="{FF2B5EF4-FFF2-40B4-BE49-F238E27FC236}">
-                <a16:creationId xmlns:a16="http://schemas.microsoft.com/office/drawing/2014/main" id="{4BD5FFC8-D20A-44D8-9E5E-29566977448D}"/>
+          <p:cNvPr id="19" name="Rectangle: Rounded Corners 18">
+            <a:extLst>
+              <a:ext uri="{FF2B5EF4-FFF2-40B4-BE49-F238E27FC236}">
+                <a16:creationId xmlns:a16="http://schemas.microsoft.com/office/drawing/2014/main" id="{2F505633-A7D8-41F2-92E1-861C207F0028}"/>
               </a:ext>
             </a:extLst>
           </p:cNvPr>
@@ -3852,56 +3757,7 @@
         </p:nvSpPr>
         <p:spPr>
           <a:xfrm>
-            <a:off x="5963707" y="3090251"/>
-            <a:ext cx="1292156" cy="1190625"/>
-          </a:xfrm>
-          <a:prstGeom prst="roundRect">
-            <a:avLst/>
-          </a:prstGeom>
-        </p:spPr>
-        <p:style>
-          <a:lnRef idx="2">
-            <a:schemeClr val="accent1">
-              <a:shade val="50000"/>
-            </a:schemeClr>
-          </a:lnRef>
-          <a:fillRef idx="1">
-            <a:schemeClr val="accent1"/>
-          </a:fillRef>
-          <a:effectRef idx="0">
-            <a:schemeClr val="accent1"/>
-          </a:effectRef>
-          <a:fontRef idx="minor">
-            <a:schemeClr val="lt1"/>
-          </a:fontRef>
-        </p:style>
-        <p:txBody>
-          <a:bodyPr rtlCol="0" anchor="ctr"/>
-          <a:lstStyle/>
-          <a:p>
-            <a:pPr algn="ctr"/>
-            <a:r>
-              <a:rPr lang="en-US" dirty="0"/>
-              <a:t>Controller</a:t>
-            </a:r>
-          </a:p>
-        </p:txBody>
-      </p:sp>
-      <p:sp>
-        <p:nvSpPr>
-          <p:cNvPr id="19" name="Rectangle: Rounded Corners 18">
-            <a:extLst>
-              <a:ext uri="{FF2B5EF4-FFF2-40B4-BE49-F238E27FC236}">
-                <a16:creationId xmlns:a16="http://schemas.microsoft.com/office/drawing/2014/main" id="{2F505633-A7D8-41F2-92E1-861C207F0028}"/>
-              </a:ext>
-            </a:extLst>
-          </p:cNvPr>
-          <p:cNvSpPr/>
-          <p:nvPr/>
-        </p:nvSpPr>
-        <p:spPr>
-          <a:xfrm>
-            <a:off x="1112320" y="3835818"/>
+            <a:off x="828537" y="1035780"/>
             <a:ext cx="2085975" cy="1190625"/>
           </a:xfrm>
           <a:prstGeom prst="roundRect">
@@ -3950,7 +3806,7 @@
         </p:nvSpPr>
         <p:spPr>
           <a:xfrm>
-            <a:off x="802641" y="995217"/>
+            <a:off x="533774" y="674276"/>
             <a:ext cx="6155098" cy="1640451"/>
           </a:xfrm>
           <a:prstGeom prst="roundRect">
@@ -4019,41 +3875,6 @@
             <a:r>
               <a:rPr lang="en-US" dirty="0"/>
               <a:t>Ver. 1 – Data artificially made/read in</a:t>
-            </a:r>
-          </a:p>
-        </p:txBody>
-      </p:sp>
-      <p:sp>
-        <p:nvSpPr>
-          <p:cNvPr id="20" name="TextBox 19">
-            <a:extLst>
-              <a:ext uri="{FF2B5EF4-FFF2-40B4-BE49-F238E27FC236}">
-                <a16:creationId xmlns:a16="http://schemas.microsoft.com/office/drawing/2014/main" id="{93BF0214-1E10-4F9C-A5F5-CCE902BFD4A8}"/>
-              </a:ext>
-            </a:extLst>
-          </p:cNvPr>
-          <p:cNvSpPr txBox="1"/>
-          <p:nvPr/>
-        </p:nvSpPr>
-        <p:spPr>
-          <a:xfrm>
-            <a:off x="3055009" y="608112"/>
-            <a:ext cx="1503617" cy="369332"/>
-          </a:xfrm>
-          <a:prstGeom prst="rect">
-            <a:avLst/>
-          </a:prstGeom>
-          <a:noFill/>
-        </p:spPr>
-        <p:txBody>
-          <a:bodyPr wrap="none" rtlCol="0">
-            <a:spAutoFit/>
-          </a:bodyPr>
-          <a:lstStyle/>
-          <a:p>
-            <a:r>
-              <a:rPr lang="en-US" dirty="0"/>
-              <a:t>DAQ Software</a:t>
             </a:r>
           </a:p>
         </p:txBody>
@@ -4124,8 +3945,8 @@
         </p:nvSpPr>
         <p:spPr>
           <a:xfrm>
-            <a:off x="8331229" y="2349620"/>
-            <a:ext cx="494046" cy="369332"/>
+            <a:off x="8208577" y="2471382"/>
+            <a:ext cx="1126206" cy="369332"/>
           </a:xfrm>
           <a:prstGeom prst="rect">
             <a:avLst/>
@@ -4140,17 +3961,17 @@
           <a:p>
             <a:r>
               <a:rPr lang="en-US" dirty="0"/>
-              <a:t>API</a:t>
-            </a:r>
-          </a:p>
-        </p:txBody>
-      </p:sp>
-      <p:sp>
-        <p:nvSpPr>
-          <p:cNvPr id="25" name="Rectangle: Rounded Corners 24">
-            <a:extLst>
-              <a:ext uri="{FF2B5EF4-FFF2-40B4-BE49-F238E27FC236}">
-                <a16:creationId xmlns:a16="http://schemas.microsoft.com/office/drawing/2014/main" id="{A9B862EB-614D-473F-A87F-40E3A0759C43}"/>
+              <a:t>Controller</a:t>
+            </a:r>
+          </a:p>
+        </p:txBody>
+      </p:sp>
+      <p:sp>
+        <p:nvSpPr>
+          <p:cNvPr id="26" name="Arrow: Right 25">
+            <a:extLst>
+              <a:ext uri="{FF2B5EF4-FFF2-40B4-BE49-F238E27FC236}">
+                <a16:creationId xmlns:a16="http://schemas.microsoft.com/office/drawing/2014/main" id="{C4F32022-F11E-47B7-B31B-0ED65B484CCA}"/>
               </a:ext>
             </a:extLst>
           </p:cNvPr>
@@ -4158,9 +3979,358 @@
           <p:nvPr/>
         </p:nvSpPr>
         <p:spPr>
+          <a:xfrm rot="12810283" flipV="1">
+            <a:off x="1023520" y="3420371"/>
+            <a:ext cx="2375416" cy="415725"/>
+          </a:xfrm>
+          <a:prstGeom prst="rightArrow">
+            <a:avLst/>
+          </a:prstGeom>
+        </p:spPr>
+        <p:style>
+          <a:lnRef idx="2">
+            <a:schemeClr val="accent1">
+              <a:shade val="50000"/>
+            </a:schemeClr>
+          </a:lnRef>
+          <a:fillRef idx="1">
+            <a:schemeClr val="accent1"/>
+          </a:fillRef>
+          <a:effectRef idx="0">
+            <a:schemeClr val="accent1"/>
+          </a:effectRef>
+          <a:fontRef idx="minor">
+            <a:schemeClr val="lt1"/>
+          </a:fontRef>
+        </p:style>
+        <p:txBody>
+          <a:bodyPr rtlCol="0" anchor="ctr"/>
+          <a:lstStyle/>
+          <a:p>
+            <a:pPr algn="ctr"/>
+            <a:r>
+              <a:rPr lang="en-US" dirty="0"/>
+              <a:t>Manual Command </a:t>
+            </a:r>
+          </a:p>
+        </p:txBody>
+      </p:sp>
+      <p:sp>
+        <p:nvSpPr>
+          <p:cNvPr id="29" name="TextBox 28">
+            <a:extLst>
+              <a:ext uri="{FF2B5EF4-FFF2-40B4-BE49-F238E27FC236}">
+                <a16:creationId xmlns:a16="http://schemas.microsoft.com/office/drawing/2014/main" id="{8C16B9CD-94F4-4F16-8CB7-FBA96AC76269}"/>
+              </a:ext>
+            </a:extLst>
+          </p:cNvPr>
+          <p:cNvSpPr txBox="1"/>
+          <p:nvPr/>
+        </p:nvSpPr>
+        <p:spPr>
           <a:xfrm>
-            <a:off x="941084" y="3173927"/>
-            <a:ext cx="2398617" cy="2034190"/>
+            <a:off x="2701169" y="681960"/>
+            <a:ext cx="1820307" cy="369332"/>
+          </a:xfrm>
+          <a:prstGeom prst="rect">
+            <a:avLst/>
+          </a:prstGeom>
+          <a:noFill/>
+        </p:spPr>
+        <p:txBody>
+          <a:bodyPr wrap="none" rtlCol="0">
+            <a:spAutoFit/>
+          </a:bodyPr>
+          <a:lstStyle/>
+          <a:p>
+            <a:r>
+              <a:rPr lang="en-US" dirty="0">
+                <a:solidFill>
+                  <a:srgbClr val="C00000"/>
+                </a:solidFill>
+              </a:rPr>
+              <a:t>Army of Arduinos</a:t>
+            </a:r>
+          </a:p>
+        </p:txBody>
+      </p:sp>
+      <p:sp>
+        <p:nvSpPr>
+          <p:cNvPr id="33" name="Rectangle: Rounded Corners 32">
+            <a:extLst>
+              <a:ext uri="{FF2B5EF4-FFF2-40B4-BE49-F238E27FC236}">
+                <a16:creationId xmlns:a16="http://schemas.microsoft.com/office/drawing/2014/main" id="{4E1A0999-F2BB-4BDD-A327-2791C8C34C8E}"/>
+              </a:ext>
+            </a:extLst>
+          </p:cNvPr>
+          <p:cNvSpPr/>
+          <p:nvPr/>
+        </p:nvSpPr>
+        <p:spPr>
+          <a:xfrm>
+            <a:off x="7742069" y="2883092"/>
+            <a:ext cx="2085975" cy="835450"/>
+          </a:xfrm>
+          <a:prstGeom prst="roundRect">
+            <a:avLst/>
+          </a:prstGeom>
+        </p:spPr>
+        <p:style>
+          <a:lnRef idx="2">
+            <a:schemeClr val="accent1">
+              <a:shade val="50000"/>
+            </a:schemeClr>
+          </a:lnRef>
+          <a:fillRef idx="1">
+            <a:schemeClr val="accent1"/>
+          </a:fillRef>
+          <a:effectRef idx="0">
+            <a:schemeClr val="accent1"/>
+          </a:effectRef>
+          <a:fontRef idx="minor">
+            <a:schemeClr val="lt1"/>
+          </a:fontRef>
+        </p:style>
+        <p:txBody>
+          <a:bodyPr rtlCol="0" anchor="ctr"/>
+          <a:lstStyle/>
+          <a:p>
+            <a:pPr algn="ctr"/>
+            <a:r>
+              <a:rPr lang="en-US" dirty="0" err="1"/>
+              <a:t>Automato</a:t>
+            </a:r>
+            <a:r>
+              <a:rPr lang="en-US" dirty="0"/>
+              <a:t> Server</a:t>
+            </a:r>
+          </a:p>
+          <a:p>
+            <a:pPr algn="ctr"/>
+            <a:r>
+              <a:rPr lang="en-US" dirty="0"/>
+              <a:t>(controller, data grabber)</a:t>
+            </a:r>
+          </a:p>
+        </p:txBody>
+      </p:sp>
+      <p:sp>
+        <p:nvSpPr>
+          <p:cNvPr id="34" name="Arrow: Right 33">
+            <a:extLst>
+              <a:ext uri="{FF2B5EF4-FFF2-40B4-BE49-F238E27FC236}">
+                <a16:creationId xmlns:a16="http://schemas.microsoft.com/office/drawing/2014/main" id="{A8C45CD7-7E8E-4D26-ABE2-379690473DE3}"/>
+              </a:ext>
+            </a:extLst>
+          </p:cNvPr>
+          <p:cNvSpPr/>
+          <p:nvPr/>
+        </p:nvSpPr>
+        <p:spPr>
+          <a:xfrm rot="5400000">
+            <a:off x="8820885" y="3715852"/>
+            <a:ext cx="363348" cy="435006"/>
+          </a:xfrm>
+          <a:prstGeom prst="rightArrow">
+            <a:avLst/>
+          </a:prstGeom>
+        </p:spPr>
+        <p:style>
+          <a:lnRef idx="2">
+            <a:schemeClr val="accent1">
+              <a:shade val="50000"/>
+            </a:schemeClr>
+          </a:lnRef>
+          <a:fillRef idx="1">
+            <a:schemeClr val="accent1"/>
+          </a:fillRef>
+          <a:effectRef idx="0">
+            <a:schemeClr val="accent1"/>
+          </a:effectRef>
+          <a:fontRef idx="minor">
+            <a:schemeClr val="lt1"/>
+          </a:fontRef>
+        </p:style>
+        <p:txBody>
+          <a:bodyPr rtlCol="0" anchor="ctr"/>
+          <a:lstStyle/>
+          <a:p>
+            <a:pPr algn="ctr"/>
+            <a:endParaRPr lang="en-US"/>
+          </a:p>
+        </p:txBody>
+      </p:sp>
+      <p:sp>
+        <p:nvSpPr>
+          <p:cNvPr id="37" name="Arrow: Right 36">
+            <a:extLst>
+              <a:ext uri="{FF2B5EF4-FFF2-40B4-BE49-F238E27FC236}">
+                <a16:creationId xmlns:a16="http://schemas.microsoft.com/office/drawing/2014/main" id="{C773C3CA-DA0B-46EB-8276-F4A39BF13B3C}"/>
+              </a:ext>
+            </a:extLst>
+          </p:cNvPr>
+          <p:cNvSpPr/>
+          <p:nvPr/>
+        </p:nvSpPr>
+        <p:spPr>
+          <a:xfrm rot="11712125" flipV="1">
+            <a:off x="7110444" y="1664528"/>
+            <a:ext cx="2492741" cy="445442"/>
+          </a:xfrm>
+          <a:prstGeom prst="rightArrow">
+            <a:avLst/>
+          </a:prstGeom>
+        </p:spPr>
+        <p:style>
+          <a:lnRef idx="2">
+            <a:schemeClr val="accent1">
+              <a:shade val="50000"/>
+            </a:schemeClr>
+          </a:lnRef>
+          <a:fillRef idx="1">
+            <a:schemeClr val="accent1"/>
+          </a:fillRef>
+          <a:effectRef idx="0">
+            <a:schemeClr val="accent1"/>
+          </a:effectRef>
+          <a:fontRef idx="minor">
+            <a:schemeClr val="lt1"/>
+          </a:fontRef>
+        </p:style>
+        <p:txBody>
+          <a:bodyPr rtlCol="0" anchor="ctr"/>
+          <a:lstStyle/>
+          <a:p>
+            <a:pPr algn="ctr"/>
+            <a:r>
+              <a:rPr lang="en-US" dirty="0"/>
+              <a:t>Give Me Data</a:t>
+            </a:r>
+          </a:p>
+        </p:txBody>
+      </p:sp>
+      <p:sp>
+        <p:nvSpPr>
+          <p:cNvPr id="3" name="TextBox 2">
+            <a:extLst>
+              <a:ext uri="{FF2B5EF4-FFF2-40B4-BE49-F238E27FC236}">
+                <a16:creationId xmlns:a16="http://schemas.microsoft.com/office/drawing/2014/main" id="{E02B46A0-B6CC-4E1F-9A4D-5C191FE1E4B6}"/>
+              </a:ext>
+            </a:extLst>
+          </p:cNvPr>
+          <p:cNvSpPr txBox="1"/>
+          <p:nvPr/>
+        </p:nvSpPr>
+        <p:spPr>
+          <a:xfrm>
+            <a:off x="9226188" y="3751681"/>
+            <a:ext cx="1348959" cy="369332"/>
+          </a:xfrm>
+          <a:prstGeom prst="rect">
+            <a:avLst/>
+          </a:prstGeom>
+          <a:noFill/>
+        </p:spPr>
+        <p:txBody>
+          <a:bodyPr wrap="none" rtlCol="0">
+            <a:spAutoFit/>
+          </a:bodyPr>
+          <a:lstStyle/>
+          <a:p>
+            <a:r>
+              <a:rPr lang="en-US" dirty="0" err="1"/>
+              <a:t>SQLAlchemy</a:t>
+            </a:r>
+            <a:endParaRPr lang="en-US" dirty="0"/>
+          </a:p>
+        </p:txBody>
+      </p:sp>
+      <p:sp>
+        <p:nvSpPr>
+          <p:cNvPr id="39" name="TextBox 38">
+            <a:extLst>
+              <a:ext uri="{FF2B5EF4-FFF2-40B4-BE49-F238E27FC236}">
+                <a16:creationId xmlns:a16="http://schemas.microsoft.com/office/drawing/2014/main" id="{5D53DA62-4C8D-41EC-B066-2A9CC002A686}"/>
+              </a:ext>
+            </a:extLst>
+          </p:cNvPr>
+          <p:cNvSpPr txBox="1"/>
+          <p:nvPr/>
+        </p:nvSpPr>
+        <p:spPr>
+          <a:xfrm>
+            <a:off x="4494859" y="5725381"/>
+            <a:ext cx="1058175" cy="369332"/>
+          </a:xfrm>
+          <a:prstGeom prst="rect">
+            <a:avLst/>
+          </a:prstGeom>
+          <a:noFill/>
+        </p:spPr>
+        <p:txBody>
+          <a:bodyPr wrap="none" rtlCol="0">
+            <a:spAutoFit/>
+          </a:bodyPr>
+          <a:lstStyle/>
+          <a:p>
+            <a:r>
+              <a:rPr lang="en-US" dirty="0"/>
+              <a:t>Database</a:t>
+            </a:r>
+          </a:p>
+        </p:txBody>
+      </p:sp>
+      <p:sp>
+        <p:nvSpPr>
+          <p:cNvPr id="42" name="TextBox 41">
+            <a:extLst>
+              <a:ext uri="{FF2B5EF4-FFF2-40B4-BE49-F238E27FC236}">
+                <a16:creationId xmlns:a16="http://schemas.microsoft.com/office/drawing/2014/main" id="{5C4F01E3-C828-41CC-9FB5-E2AE8B3AD2C5}"/>
+              </a:ext>
+            </a:extLst>
+          </p:cNvPr>
+          <p:cNvSpPr txBox="1"/>
+          <p:nvPr/>
+        </p:nvSpPr>
+        <p:spPr>
+          <a:xfrm>
+            <a:off x="8169182" y="1330086"/>
+            <a:ext cx="615874" cy="369332"/>
+          </a:xfrm>
+          <a:prstGeom prst="rect">
+            <a:avLst/>
+          </a:prstGeom>
+          <a:noFill/>
+        </p:spPr>
+        <p:txBody>
+          <a:bodyPr wrap="none" rtlCol="0">
+            <a:spAutoFit/>
+          </a:bodyPr>
+          <a:lstStyle/>
+          <a:p>
+            <a:r>
+              <a:rPr lang="en-US" dirty="0"/>
+              <a:t>PINS</a:t>
+            </a:r>
+          </a:p>
+        </p:txBody>
+      </p:sp>
+      <p:sp>
+        <p:nvSpPr>
+          <p:cNvPr id="43" name="Rectangle: Rounded Corners 42">
+            <a:extLst>
+              <a:ext uri="{FF2B5EF4-FFF2-40B4-BE49-F238E27FC236}">
+                <a16:creationId xmlns:a16="http://schemas.microsoft.com/office/drawing/2014/main" id="{F5216A70-B86D-4B8B-87F3-57DF1565E59F}"/>
+              </a:ext>
+            </a:extLst>
+          </p:cNvPr>
+          <p:cNvSpPr/>
+          <p:nvPr/>
+        </p:nvSpPr>
+        <p:spPr>
+          <a:xfrm>
+            <a:off x="593890" y="4543273"/>
+            <a:ext cx="3416982" cy="2164609"/>
           </a:xfrm>
           <a:prstGeom prst="roundRect">
             <a:avLst/>
@@ -4199,10 +4369,10 @@
       </p:sp>
       <p:sp>
         <p:nvSpPr>
-          <p:cNvPr id="26" name="Arrow: Right 25">
-            <a:extLst>
-              <a:ext uri="{FF2B5EF4-FFF2-40B4-BE49-F238E27FC236}">
-                <a16:creationId xmlns:a16="http://schemas.microsoft.com/office/drawing/2014/main" id="{C4F32022-F11E-47B7-B31B-0ED65B484CCA}"/>
+          <p:cNvPr id="11" name="Arrow: Left-Right 10">
+            <a:extLst>
+              <a:ext uri="{FF2B5EF4-FFF2-40B4-BE49-F238E27FC236}">
+                <a16:creationId xmlns:a16="http://schemas.microsoft.com/office/drawing/2014/main" id="{5BC6321F-F88A-437F-9788-101F702B92A3}"/>
               </a:ext>
             </a:extLst>
           </p:cNvPr>
@@ -4210,12 +4380,15 @@
           <p:nvPr/>
         </p:nvSpPr>
         <p:spPr>
-          <a:xfrm rot="10800000" flipV="1">
-            <a:off x="3400249" y="4290927"/>
-            <a:ext cx="2375416" cy="415725"/>
+          <a:xfrm>
+            <a:off x="4383464" y="6065222"/>
+            <a:ext cx="1280966" cy="369332"/>
           </a:xfrm>
-          <a:prstGeom prst="rightArrow">
-            <a:avLst/>
+          <a:prstGeom prst="leftRightArrow">
+            <a:avLst>
+              <a:gd name="adj1" fmla="val 60210"/>
+              <a:gd name="adj2" fmla="val 50000"/>
+            </a:avLst>
           </a:prstGeom>
         </p:spPr>
         <p:style>
@@ -4239,182 +4412,26 @@
           <a:lstStyle/>
           <a:p>
             <a:pPr algn="ctr"/>
-            <a:r>
-              <a:rPr lang="en-US" dirty="0"/>
-              <a:t>Manual Command </a:t>
-            </a:r>
-          </a:p>
-        </p:txBody>
-      </p:sp>
-      <p:sp>
-        <p:nvSpPr>
-          <p:cNvPr id="27" name="TextBox 26">
-            <a:extLst>
-              <a:ext uri="{FF2B5EF4-FFF2-40B4-BE49-F238E27FC236}">
-                <a16:creationId xmlns:a16="http://schemas.microsoft.com/office/drawing/2014/main" id="{5671786D-206F-4DDA-87B4-DA2718112434}"/>
-              </a:ext>
-            </a:extLst>
-          </p:cNvPr>
-          <p:cNvSpPr txBox="1"/>
+            <a:endParaRPr lang="en-US"/>
+          </a:p>
+        </p:txBody>
+      </p:sp>
+      <p:sp>
+        <p:nvSpPr>
+          <p:cNvPr id="45" name="Rectangle: Rounded Corners 44">
+            <a:extLst>
+              <a:ext uri="{FF2B5EF4-FFF2-40B4-BE49-F238E27FC236}">
+                <a16:creationId xmlns:a16="http://schemas.microsoft.com/office/drawing/2014/main" id="{3CFAC140-01CE-4893-B413-F6E5A9AB9652}"/>
+              </a:ext>
+            </a:extLst>
+          </p:cNvPr>
+          <p:cNvSpPr/>
           <p:nvPr/>
         </p:nvSpPr>
         <p:spPr>
           <a:xfrm>
-            <a:off x="1269585" y="2804594"/>
-            <a:ext cx="1771447" cy="369332"/>
-          </a:xfrm>
-          <a:prstGeom prst="rect">
-            <a:avLst/>
-          </a:prstGeom>
-          <a:noFill/>
-        </p:spPr>
-        <p:txBody>
-          <a:bodyPr wrap="none" rtlCol="0">
-            <a:spAutoFit/>
-          </a:bodyPr>
-          <a:lstStyle/>
-          <a:p>
-            <a:pPr algn="ctr"/>
-            <a:r>
-              <a:rPr lang="en-US" dirty="0"/>
-              <a:t>Control Software</a:t>
-            </a:r>
-          </a:p>
-        </p:txBody>
-      </p:sp>
-      <p:sp>
-        <p:nvSpPr>
-          <p:cNvPr id="29" name="TextBox 28">
-            <a:extLst>
-              <a:ext uri="{FF2B5EF4-FFF2-40B4-BE49-F238E27FC236}">
-                <a16:creationId xmlns:a16="http://schemas.microsoft.com/office/drawing/2014/main" id="{8C16B9CD-94F4-4F16-8CB7-FBA96AC76269}"/>
-              </a:ext>
-            </a:extLst>
-          </p:cNvPr>
-          <p:cNvSpPr txBox="1"/>
-          <p:nvPr/>
-        </p:nvSpPr>
-        <p:spPr>
-          <a:xfrm>
-            <a:off x="2970036" y="1002901"/>
-            <a:ext cx="1820307" cy="369332"/>
-          </a:xfrm>
-          <a:prstGeom prst="rect">
-            <a:avLst/>
-          </a:prstGeom>
-          <a:noFill/>
-        </p:spPr>
-        <p:txBody>
-          <a:bodyPr wrap="none" rtlCol="0">
-            <a:spAutoFit/>
-          </a:bodyPr>
-          <a:lstStyle/>
-          <a:p>
-            <a:r>
-              <a:rPr lang="en-US" dirty="0">
-                <a:solidFill>
-                  <a:srgbClr val="C00000"/>
-                </a:solidFill>
-              </a:rPr>
-              <a:t>Army of Arduinos</a:t>
-            </a:r>
-          </a:p>
-        </p:txBody>
-      </p:sp>
-      <p:sp>
-        <p:nvSpPr>
-          <p:cNvPr id="31" name="TextBox 30">
-            <a:extLst>
-              <a:ext uri="{FF2B5EF4-FFF2-40B4-BE49-F238E27FC236}">
-                <a16:creationId xmlns:a16="http://schemas.microsoft.com/office/drawing/2014/main" id="{E926519F-0B66-42D4-AD2F-4B6D44BD17B1}"/>
-              </a:ext>
-            </a:extLst>
-          </p:cNvPr>
-          <p:cNvSpPr txBox="1"/>
-          <p:nvPr/>
-        </p:nvSpPr>
-        <p:spPr>
-          <a:xfrm>
-            <a:off x="1304233" y="3173926"/>
-            <a:ext cx="1820307" cy="369332"/>
-          </a:xfrm>
-          <a:prstGeom prst="rect">
-            <a:avLst/>
-          </a:prstGeom>
-          <a:noFill/>
-        </p:spPr>
-        <p:txBody>
-          <a:bodyPr wrap="none" rtlCol="0">
-            <a:spAutoFit/>
-          </a:bodyPr>
-          <a:lstStyle/>
-          <a:p>
-            <a:r>
-              <a:rPr lang="en-US" dirty="0">
-                <a:solidFill>
-                  <a:srgbClr val="C00000"/>
-                </a:solidFill>
-              </a:rPr>
-              <a:t>Army of Arduinos</a:t>
-            </a:r>
-          </a:p>
-        </p:txBody>
-      </p:sp>
-      <p:sp>
-        <p:nvSpPr>
-          <p:cNvPr id="32" name="TextBox 31">
-            <a:extLst>
-              <a:ext uri="{FF2B5EF4-FFF2-40B4-BE49-F238E27FC236}">
-                <a16:creationId xmlns:a16="http://schemas.microsoft.com/office/drawing/2014/main" id="{205FECD7-EB82-4FA8-9FA4-77F975DCDA04}"/>
-              </a:ext>
-            </a:extLst>
-          </p:cNvPr>
-          <p:cNvSpPr txBox="1"/>
-          <p:nvPr/>
-        </p:nvSpPr>
-        <p:spPr>
-          <a:xfrm>
-            <a:off x="8023863" y="2835486"/>
-            <a:ext cx="1466620" cy="369332"/>
-          </a:xfrm>
-          <a:prstGeom prst="rect">
-            <a:avLst/>
-          </a:prstGeom>
-          <a:noFill/>
-        </p:spPr>
-        <p:txBody>
-          <a:bodyPr wrap="none" rtlCol="0">
-            <a:spAutoFit/>
-          </a:bodyPr>
-          <a:lstStyle/>
-          <a:p>
-            <a:r>
-              <a:rPr lang="en-US" dirty="0">
-                <a:solidFill>
-                  <a:srgbClr val="C00000"/>
-                </a:solidFill>
-              </a:rPr>
-              <a:t>Raspberry Pi?</a:t>
-            </a:r>
-          </a:p>
-        </p:txBody>
-      </p:sp>
-      <p:sp>
-        <p:nvSpPr>
-          <p:cNvPr id="33" name="Rectangle: Rounded Corners 32">
-            <a:extLst>
-              <a:ext uri="{FF2B5EF4-FFF2-40B4-BE49-F238E27FC236}">
-                <a16:creationId xmlns:a16="http://schemas.microsoft.com/office/drawing/2014/main" id="{4E1A0999-F2BB-4BDD-A327-2791C8C34C8E}"/>
-              </a:ext>
-            </a:extLst>
-          </p:cNvPr>
-          <p:cNvSpPr/>
-          <p:nvPr/>
-        </p:nvSpPr>
-        <p:spPr>
-          <a:xfrm>
-            <a:off x="7742069" y="3231328"/>
-            <a:ext cx="2085975" cy="403563"/>
+            <a:off x="923839" y="6065222"/>
+            <a:ext cx="2595242" cy="533767"/>
           </a:xfrm>
           <a:prstGeom prst="roundRect">
             <a:avLst/>
@@ -4443,17 +4460,88 @@
             <a:pPr algn="ctr"/>
             <a:r>
               <a:rPr lang="en-US" dirty="0"/>
-              <a:t>HTTP Server</a:t>
-            </a:r>
-          </a:p>
-        </p:txBody>
-      </p:sp>
-      <p:sp>
-        <p:nvSpPr>
-          <p:cNvPr id="34" name="Arrow: Right 33">
-            <a:extLst>
-              <a:ext uri="{FF2B5EF4-FFF2-40B4-BE49-F238E27FC236}">
-                <a16:creationId xmlns:a16="http://schemas.microsoft.com/office/drawing/2014/main" id="{A8C45CD7-7E8E-4D26-ABE2-379690473DE3}"/>
+              <a:t>Administrator or Controller</a:t>
+            </a:r>
+          </a:p>
+        </p:txBody>
+      </p:sp>
+      <p:sp>
+        <p:nvSpPr>
+          <p:cNvPr id="12" name="TextBox 11">
+            <a:extLst>
+              <a:ext uri="{FF2B5EF4-FFF2-40B4-BE49-F238E27FC236}">
+                <a16:creationId xmlns:a16="http://schemas.microsoft.com/office/drawing/2014/main" id="{2E7C6AF1-0725-436B-9F47-22BBEE4B3B25}"/>
+              </a:ext>
+            </a:extLst>
+          </p:cNvPr>
+          <p:cNvSpPr txBox="1"/>
+          <p:nvPr/>
+        </p:nvSpPr>
+        <p:spPr>
+          <a:xfrm>
+            <a:off x="3129912" y="1361244"/>
+            <a:ext cx="976550" cy="369332"/>
+          </a:xfrm>
+          <a:prstGeom prst="rect">
+            <a:avLst/>
+          </a:prstGeom>
+          <a:noFill/>
+        </p:spPr>
+        <p:txBody>
+          <a:bodyPr wrap="none" rtlCol="0">
+            <a:spAutoFit/>
+          </a:bodyPr>
+          <a:lstStyle/>
+          <a:p>
+            <a:pPr algn="r"/>
+            <a:r>
+              <a:rPr lang="en-US" dirty="0"/>
+              <a:t>AND/OR</a:t>
+            </a:r>
+          </a:p>
+        </p:txBody>
+      </p:sp>
+      <p:sp>
+        <p:nvSpPr>
+          <p:cNvPr id="18" name="TextBox 17">
+            <a:extLst>
+              <a:ext uri="{FF2B5EF4-FFF2-40B4-BE49-F238E27FC236}">
+                <a16:creationId xmlns:a16="http://schemas.microsoft.com/office/drawing/2014/main" id="{7100AA71-AB3F-4014-B3FA-0FA5DAC84625}"/>
+              </a:ext>
+            </a:extLst>
+          </p:cNvPr>
+          <p:cNvSpPr txBox="1"/>
+          <p:nvPr/>
+        </p:nvSpPr>
+        <p:spPr>
+          <a:xfrm>
+            <a:off x="6924216" y="6024478"/>
+            <a:ext cx="647934" cy="369332"/>
+          </a:xfrm>
+          <a:prstGeom prst="rect">
+            <a:avLst/>
+          </a:prstGeom>
+          <a:noFill/>
+        </p:spPr>
+        <p:txBody>
+          <a:bodyPr wrap="none" rtlCol="0">
+            <a:spAutoFit/>
+          </a:bodyPr>
+          <a:lstStyle/>
+          <a:p>
+            <a:r>
+              <a:rPr lang="en-US" dirty="0"/>
+              <a:t>Flask</a:t>
+            </a:r>
+          </a:p>
+        </p:txBody>
+      </p:sp>
+      <p:sp>
+        <p:nvSpPr>
+          <p:cNvPr id="46" name="Rectangle: Rounded Corners 45">
+            <a:extLst>
+              <a:ext uri="{FF2B5EF4-FFF2-40B4-BE49-F238E27FC236}">
+                <a16:creationId xmlns:a16="http://schemas.microsoft.com/office/drawing/2014/main" id="{3B066D53-A71E-40CA-9E28-276BAB64BAD3}"/>
               </a:ext>
             </a:extLst>
           </p:cNvPr>
@@ -4461,11 +4549,11 @@
           <p:nvPr/>
         </p:nvSpPr>
         <p:spPr>
-          <a:xfrm rot="5400000">
-            <a:off x="8820885" y="3715852"/>
-            <a:ext cx="363348" cy="435006"/>
+          <a:xfrm>
+            <a:off x="8545240" y="5284784"/>
+            <a:ext cx="2085975" cy="1190625"/>
           </a:xfrm>
-          <a:prstGeom prst="rightArrow">
+          <a:prstGeom prst="roundRect">
             <a:avLst/>
           </a:prstGeom>
         </p:spPr>
@@ -4490,106 +4578,457 @@
           <a:lstStyle/>
           <a:p>
             <a:pPr algn="ctr"/>
-            <a:endParaRPr lang="en-US"/>
-          </a:p>
-        </p:txBody>
-      </p:sp>
-      <p:sp>
-        <p:nvSpPr>
-          <p:cNvPr id="35" name="Arrow: Right 34">
-            <a:extLst>
-              <a:ext uri="{FF2B5EF4-FFF2-40B4-BE49-F238E27FC236}">
-                <a16:creationId xmlns:a16="http://schemas.microsoft.com/office/drawing/2014/main" id="{5A3FADAF-8680-40E9-A4E4-283C412DA539}"/>
-              </a:ext>
-            </a:extLst>
-          </p:cNvPr>
-          <p:cNvSpPr/>
-          <p:nvPr/>
-        </p:nvSpPr>
-        <p:spPr>
-          <a:xfrm rot="10800000">
-            <a:off x="7253679" y="3418307"/>
-            <a:ext cx="363348" cy="292560"/>
-          </a:xfrm>
-          <a:prstGeom prst="rightArrow">
-            <a:avLst/>
-          </a:prstGeom>
-        </p:spPr>
-        <p:style>
-          <a:lnRef idx="2">
-            <a:schemeClr val="accent1">
-              <a:shade val="50000"/>
-            </a:schemeClr>
-          </a:lnRef>
-          <a:fillRef idx="1">
-            <a:schemeClr val="accent1"/>
-          </a:fillRef>
-          <a:effectRef idx="0">
-            <a:schemeClr val="accent1"/>
-          </a:effectRef>
-          <a:fontRef idx="minor">
-            <a:schemeClr val="lt1"/>
-          </a:fontRef>
-        </p:style>
-        <p:txBody>
-          <a:bodyPr rtlCol="0" anchor="ctr"/>
-          <a:lstStyle/>
-          <a:p>
-            <a:pPr algn="ctr"/>
-            <a:endParaRPr lang="en-US"/>
-          </a:p>
-        </p:txBody>
-      </p:sp>
-      <p:sp>
-        <p:nvSpPr>
-          <p:cNvPr id="36" name="Arrow: Right 35">
-            <a:extLst>
-              <a:ext uri="{FF2B5EF4-FFF2-40B4-BE49-F238E27FC236}">
-                <a16:creationId xmlns:a16="http://schemas.microsoft.com/office/drawing/2014/main" id="{6A43B6FC-567A-4B12-B87F-DEEB24586E57}"/>
-              </a:ext>
-            </a:extLst>
-          </p:cNvPr>
-          <p:cNvSpPr/>
-          <p:nvPr/>
-        </p:nvSpPr>
-        <p:spPr>
-          <a:xfrm>
-            <a:off x="7316200" y="3140767"/>
-            <a:ext cx="363348" cy="288233"/>
-          </a:xfrm>
-          <a:prstGeom prst="rightArrow">
-            <a:avLst/>
-          </a:prstGeom>
-        </p:spPr>
-        <p:style>
-          <a:lnRef idx="2">
-            <a:schemeClr val="accent1">
-              <a:shade val="50000"/>
-            </a:schemeClr>
-          </a:lnRef>
-          <a:fillRef idx="1">
-            <a:schemeClr val="accent1"/>
-          </a:fillRef>
-          <a:effectRef idx="0">
-            <a:schemeClr val="accent1"/>
-          </a:effectRef>
-          <a:fontRef idx="minor">
-            <a:schemeClr val="lt1"/>
-          </a:fontRef>
-        </p:style>
-        <p:txBody>
-          <a:bodyPr rtlCol="0" anchor="ctr"/>
-          <a:lstStyle/>
-          <a:p>
-            <a:pPr algn="ctr"/>
-            <a:endParaRPr lang="en-US"/>
+            <a:r>
+              <a:rPr lang="en-US" dirty="0"/>
+              <a:t>Soft Override</a:t>
+            </a:r>
           </a:p>
         </p:txBody>
       </p:sp>
     </p:spTree>
     <p:extLst>
       <p:ext uri="{BB962C8B-B14F-4D97-AF65-F5344CB8AC3E}">
-        <p14:creationId xmlns:p14="http://schemas.microsoft.com/office/powerpoint/2010/main" val="2416031344"/>
+        <p14:creationId xmlns:p14="http://schemas.microsoft.com/office/powerpoint/2010/main" val="4217452776"/>
+      </p:ext>
+    </p:extLst>
+  </p:cSld>
+  <p:clrMapOvr>
+    <a:masterClrMapping/>
+  </p:clrMapOvr>
+</p:sld>
+</file>
+
+<file path=ppt/slides/slide10.xml><?xml version="1.0" encoding="utf-8"?>
+<p:sld xmlns:a="http://schemas.openxmlformats.org/drawingml/2006/main" xmlns:r="http://schemas.openxmlformats.org/officeDocument/2006/relationships" xmlns:p="http://schemas.openxmlformats.org/presentationml/2006/main">
+  <p:cSld>
+    <p:spTree>
+      <p:nvGrpSpPr>
+        <p:cNvPr id="1" name=""/>
+        <p:cNvGrpSpPr/>
+        <p:nvPr/>
+      </p:nvGrpSpPr>
+      <p:grpSpPr>
+        <a:xfrm>
+          <a:off x="0" y="0"/>
+          <a:ext cx="0" cy="0"/>
+          <a:chOff x="0" y="0"/>
+          <a:chExt cx="0" cy="0"/>
+        </a:xfrm>
+      </p:grpSpPr>
+      <p:sp>
+        <p:nvSpPr>
+          <p:cNvPr id="2" name="Title 1">
+            <a:extLst>
+              <a:ext uri="{FF2B5EF4-FFF2-40B4-BE49-F238E27FC236}">
+                <a16:creationId xmlns:a16="http://schemas.microsoft.com/office/drawing/2014/main" id="{8B803CA7-3DB4-4B4D-BA16-89F3FA690238}"/>
+              </a:ext>
+            </a:extLst>
+          </p:cNvPr>
+          <p:cNvSpPr>
+            <a:spLocks noGrp="1"/>
+          </p:cNvSpPr>
+          <p:nvPr>
+            <p:ph type="title"/>
+          </p:nvPr>
+        </p:nvSpPr>
+        <p:spPr/>
+        <p:txBody>
+          <a:bodyPr/>
+          <a:lstStyle/>
+          <a:p>
+            <a:pPr algn="ctr"/>
+            <a:r>
+              <a:rPr lang="en-US" dirty="0"/>
+              <a:t>Testing Methods</a:t>
+            </a:r>
+          </a:p>
+        </p:txBody>
+      </p:sp>
+      <p:sp>
+        <p:nvSpPr>
+          <p:cNvPr id="3" name="Content Placeholder 2">
+            <a:extLst>
+              <a:ext uri="{FF2B5EF4-FFF2-40B4-BE49-F238E27FC236}">
+                <a16:creationId xmlns:a16="http://schemas.microsoft.com/office/drawing/2014/main" id="{AF82CA6D-0B14-491F-BBBA-986677496322}"/>
+              </a:ext>
+            </a:extLst>
+          </p:cNvPr>
+          <p:cNvSpPr>
+            <a:spLocks noGrp="1"/>
+          </p:cNvSpPr>
+          <p:nvPr>
+            <p:ph idx="1"/>
+          </p:nvPr>
+        </p:nvSpPr>
+        <p:spPr/>
+        <p:txBody>
+          <a:bodyPr/>
+          <a:lstStyle/>
+          <a:p>
+            <a:r>
+              <a:rPr lang="en-US" dirty="0"/>
+              <a:t>http://www.fao.org/3/ca2796en/CA2796EN.pdf</a:t>
+            </a:r>
+          </a:p>
+        </p:txBody>
+      </p:sp>
+    </p:spTree>
+    <p:extLst>
+      <p:ext uri="{BB962C8B-B14F-4D97-AF65-F5344CB8AC3E}">
+        <p14:creationId xmlns:p14="http://schemas.microsoft.com/office/powerpoint/2010/main" val="1432040007"/>
+      </p:ext>
+    </p:extLst>
+  </p:cSld>
+  <p:clrMapOvr>
+    <a:masterClrMapping/>
+  </p:clrMapOvr>
+</p:sld>
+</file>
+
+<file path=ppt/slides/slide11.xml><?xml version="1.0" encoding="utf-8"?>
+<p:sld xmlns:a="http://schemas.openxmlformats.org/drawingml/2006/main" xmlns:r="http://schemas.openxmlformats.org/officeDocument/2006/relationships" xmlns:p="http://schemas.openxmlformats.org/presentationml/2006/main">
+  <p:cSld>
+    <p:spTree>
+      <p:nvGrpSpPr>
+        <p:cNvPr id="1" name=""/>
+        <p:cNvGrpSpPr/>
+        <p:nvPr/>
+      </p:nvGrpSpPr>
+      <p:grpSpPr>
+        <a:xfrm>
+          <a:off x="0" y="0"/>
+          <a:ext cx="0" cy="0"/>
+          <a:chOff x="0" y="0"/>
+          <a:chExt cx="0" cy="0"/>
+        </a:xfrm>
+      </p:grpSpPr>
+      <p:sp>
+        <p:nvSpPr>
+          <p:cNvPr id="2" name="Title 1">
+            <a:extLst>
+              <a:ext uri="{FF2B5EF4-FFF2-40B4-BE49-F238E27FC236}">
+                <a16:creationId xmlns:a16="http://schemas.microsoft.com/office/drawing/2014/main" id="{9EC0DD40-5C84-4AC5-A77E-DE389659DA3B}"/>
+              </a:ext>
+            </a:extLst>
+          </p:cNvPr>
+          <p:cNvSpPr>
+            <a:spLocks noGrp="1"/>
+          </p:cNvSpPr>
+          <p:nvPr>
+            <p:ph type="title"/>
+          </p:nvPr>
+        </p:nvSpPr>
+        <p:spPr/>
+        <p:txBody>
+          <a:bodyPr/>
+          <a:lstStyle/>
+          <a:p>
+            <a:pPr algn="ctr"/>
+            <a:r>
+              <a:rPr lang="en-US" dirty="0"/>
+              <a:t>Make Fake Data</a:t>
+            </a:r>
+          </a:p>
+        </p:txBody>
+      </p:sp>
+      <p:sp>
+        <p:nvSpPr>
+          <p:cNvPr id="3" name="Content Placeholder 2">
+            <a:extLst>
+              <a:ext uri="{FF2B5EF4-FFF2-40B4-BE49-F238E27FC236}">
+                <a16:creationId xmlns:a16="http://schemas.microsoft.com/office/drawing/2014/main" id="{5397ADCB-A991-4363-A2C6-C23983382340}"/>
+              </a:ext>
+            </a:extLst>
+          </p:cNvPr>
+          <p:cNvSpPr>
+            <a:spLocks noGrp="1"/>
+          </p:cNvSpPr>
+          <p:nvPr>
+            <p:ph idx="1"/>
+          </p:nvPr>
+        </p:nvSpPr>
+        <p:spPr/>
+        <p:txBody>
+          <a:bodyPr/>
+          <a:lstStyle/>
+          <a:p>
+            <a:r>
+              <a:rPr lang="en-US" dirty="0"/>
+              <a:t>Sensor Class</a:t>
+            </a:r>
+          </a:p>
+          <a:p>
+            <a:pPr lvl="1"/>
+            <a:r>
+              <a:rPr lang="en-US" dirty="0"/>
+              <a:t>Temperature</a:t>
+            </a:r>
+          </a:p>
+          <a:p>
+            <a:pPr lvl="1"/>
+            <a:r>
+              <a:rPr lang="en-US" dirty="0"/>
+              <a:t>Soil Moisture</a:t>
+            </a:r>
+          </a:p>
+          <a:p>
+            <a:pPr lvl="1"/>
+            <a:r>
+              <a:rPr lang="en-US" dirty="0"/>
+              <a:t>Acidity</a:t>
+            </a:r>
+          </a:p>
+          <a:p>
+            <a:pPr lvl="1"/>
+            <a:r>
+              <a:rPr lang="en-US" dirty="0"/>
+              <a:t>Light</a:t>
+            </a:r>
+          </a:p>
+          <a:p>
+            <a:pPr lvl="1"/>
+            <a:r>
+              <a:rPr lang="en-US" dirty="0"/>
+              <a:t>Salinity</a:t>
+            </a:r>
+          </a:p>
+          <a:p>
+            <a:pPr lvl="1"/>
+            <a:r>
+              <a:rPr lang="en-US"/>
+              <a:t>Visual Data</a:t>
+            </a:r>
+          </a:p>
+          <a:p>
+            <a:pPr lvl="1"/>
+            <a:endParaRPr lang="en-US" dirty="0"/>
+          </a:p>
+        </p:txBody>
+      </p:sp>
+    </p:spTree>
+    <p:extLst>
+      <p:ext uri="{BB962C8B-B14F-4D97-AF65-F5344CB8AC3E}">
+        <p14:creationId xmlns:p14="http://schemas.microsoft.com/office/powerpoint/2010/main" val="2630466151"/>
+      </p:ext>
+    </p:extLst>
+  </p:cSld>
+  <p:clrMapOvr>
+    <a:masterClrMapping/>
+  </p:clrMapOvr>
+</p:sld>
+</file>
+
+<file path=ppt/slides/slide12.xml><?xml version="1.0" encoding="utf-8"?>
+<p:sld xmlns:a="http://schemas.openxmlformats.org/drawingml/2006/main" xmlns:r="http://schemas.openxmlformats.org/officeDocument/2006/relationships" xmlns:p="http://schemas.openxmlformats.org/presentationml/2006/main">
+  <p:cSld>
+    <p:spTree>
+      <p:nvGrpSpPr>
+        <p:cNvPr id="1" name=""/>
+        <p:cNvGrpSpPr/>
+        <p:nvPr/>
+      </p:nvGrpSpPr>
+      <p:grpSpPr>
+        <a:xfrm>
+          <a:off x="0" y="0"/>
+          <a:ext cx="0" cy="0"/>
+          <a:chOff x="0" y="0"/>
+          <a:chExt cx="0" cy="0"/>
+        </a:xfrm>
+      </p:grpSpPr>
+      <p:sp>
+        <p:nvSpPr>
+          <p:cNvPr id="2" name="Title 1">
+            <a:extLst>
+              <a:ext uri="{FF2B5EF4-FFF2-40B4-BE49-F238E27FC236}">
+                <a16:creationId xmlns:a16="http://schemas.microsoft.com/office/drawing/2014/main" id="{47E8B3F7-CBC4-4486-9D48-667EB37F18F3}"/>
+              </a:ext>
+            </a:extLst>
+          </p:cNvPr>
+          <p:cNvSpPr>
+            <a:spLocks noGrp="1"/>
+          </p:cNvSpPr>
+          <p:nvPr>
+            <p:ph type="title"/>
+          </p:nvPr>
+        </p:nvSpPr>
+        <p:spPr/>
+        <p:txBody>
+          <a:bodyPr/>
+          <a:lstStyle/>
+          <a:p>
+            <a:pPr algn="ctr"/>
+            <a:r>
+              <a:rPr lang="en-US" dirty="0"/>
+              <a:t>Watching Plants?</a:t>
+            </a:r>
+          </a:p>
+        </p:txBody>
+      </p:sp>
+      <p:sp>
+        <p:nvSpPr>
+          <p:cNvPr id="3" name="Content Placeholder 2">
+            <a:extLst>
+              <a:ext uri="{FF2B5EF4-FFF2-40B4-BE49-F238E27FC236}">
+                <a16:creationId xmlns:a16="http://schemas.microsoft.com/office/drawing/2014/main" id="{20DDF966-A93F-4A9F-8F6E-04E98712FF60}"/>
+              </a:ext>
+            </a:extLst>
+          </p:cNvPr>
+          <p:cNvSpPr>
+            <a:spLocks noGrp="1"/>
+          </p:cNvSpPr>
+          <p:nvPr>
+            <p:ph idx="1"/>
+          </p:nvPr>
+        </p:nvSpPr>
+        <p:spPr/>
+        <p:txBody>
+          <a:bodyPr/>
+          <a:lstStyle/>
+          <a:p>
+            <a:r>
+              <a:rPr lang="en-US" dirty="0"/>
+              <a:t>Plant Class</a:t>
+            </a:r>
+          </a:p>
+          <a:p>
+            <a:pPr lvl="1"/>
+            <a:r>
+              <a:rPr lang="en-US" dirty="0"/>
+              <a:t>Type</a:t>
+            </a:r>
+          </a:p>
+          <a:p>
+            <a:pPr lvl="1"/>
+            <a:r>
+              <a:rPr lang="en-US" dirty="0"/>
+              <a:t>Growing Conditions (ideal range)</a:t>
+            </a:r>
+          </a:p>
+          <a:p>
+            <a:pPr lvl="2"/>
+            <a:r>
+              <a:rPr lang="en-US" dirty="0"/>
+              <a:t>Temperature Range</a:t>
+            </a:r>
+          </a:p>
+          <a:p>
+            <a:pPr lvl="2"/>
+            <a:r>
+              <a:rPr lang="en-US" dirty="0"/>
+              <a:t>Moisture</a:t>
+            </a:r>
+          </a:p>
+          <a:p>
+            <a:pPr lvl="2"/>
+            <a:r>
+              <a:rPr lang="en-US" dirty="0"/>
+              <a:t>ETC</a:t>
+            </a:r>
+          </a:p>
+          <a:p>
+            <a:pPr lvl="1"/>
+            <a:r>
+              <a:rPr lang="en-US" dirty="0"/>
+              <a:t>Age</a:t>
+            </a:r>
+          </a:p>
+          <a:p>
+            <a:pPr lvl="1"/>
+            <a:endParaRPr lang="en-US" dirty="0"/>
+          </a:p>
+        </p:txBody>
+      </p:sp>
+    </p:spTree>
+    <p:extLst>
+      <p:ext uri="{BB962C8B-B14F-4D97-AF65-F5344CB8AC3E}">
+        <p14:creationId xmlns:p14="http://schemas.microsoft.com/office/powerpoint/2010/main" val="513023450"/>
+      </p:ext>
+    </p:extLst>
+  </p:cSld>
+  <p:clrMapOvr>
+    <a:masterClrMapping/>
+  </p:clrMapOvr>
+</p:sld>
+</file>
+
+<file path=ppt/slides/slide13.xml><?xml version="1.0" encoding="utf-8"?>
+<p:sld xmlns:a="http://schemas.openxmlformats.org/drawingml/2006/main" xmlns:r="http://schemas.openxmlformats.org/officeDocument/2006/relationships" xmlns:p="http://schemas.openxmlformats.org/presentationml/2006/main">
+  <p:cSld>
+    <p:spTree>
+      <p:nvGrpSpPr>
+        <p:cNvPr id="1" name=""/>
+        <p:cNvGrpSpPr/>
+        <p:nvPr/>
+      </p:nvGrpSpPr>
+      <p:grpSpPr>
+        <a:xfrm>
+          <a:off x="0" y="0"/>
+          <a:ext cx="0" cy="0"/>
+          <a:chOff x="0" y="0"/>
+          <a:chExt cx="0" cy="0"/>
+        </a:xfrm>
+      </p:grpSpPr>
+      <p:sp>
+        <p:nvSpPr>
+          <p:cNvPr id="2" name="Title 1">
+            <a:extLst>
+              <a:ext uri="{FF2B5EF4-FFF2-40B4-BE49-F238E27FC236}">
+                <a16:creationId xmlns:a16="http://schemas.microsoft.com/office/drawing/2014/main" id="{63859B16-2E2A-4D95-8053-07A87B46C3DA}"/>
+              </a:ext>
+            </a:extLst>
+          </p:cNvPr>
+          <p:cNvSpPr>
+            <a:spLocks noGrp="1"/>
+          </p:cNvSpPr>
+          <p:nvPr>
+            <p:ph type="title"/>
+          </p:nvPr>
+        </p:nvSpPr>
+        <p:spPr/>
+        <p:txBody>
+          <a:bodyPr/>
+          <a:lstStyle/>
+          <a:p>
+            <a:pPr algn="ctr"/>
+            <a:r>
+              <a:rPr lang="en-US" dirty="0"/>
+              <a:t>SQL</a:t>
+            </a:r>
+          </a:p>
+        </p:txBody>
+      </p:sp>
+      <p:sp>
+        <p:nvSpPr>
+          <p:cNvPr id="3" name="Content Placeholder 2">
+            <a:extLst>
+              <a:ext uri="{FF2B5EF4-FFF2-40B4-BE49-F238E27FC236}">
+                <a16:creationId xmlns:a16="http://schemas.microsoft.com/office/drawing/2014/main" id="{CC1ED612-CB2C-49F2-9852-FCA145E183CD}"/>
+              </a:ext>
+            </a:extLst>
+          </p:cNvPr>
+          <p:cNvSpPr>
+            <a:spLocks noGrp="1"/>
+          </p:cNvSpPr>
+          <p:nvPr>
+            <p:ph idx="1"/>
+          </p:nvPr>
+        </p:nvSpPr>
+        <p:spPr/>
+        <p:txBody>
+          <a:bodyPr/>
+          <a:lstStyle/>
+          <a:p>
+            <a:r>
+              <a:rPr lang="en-US" dirty="0"/>
+              <a:t>A Database?</a:t>
+            </a:r>
+          </a:p>
+        </p:txBody>
+      </p:sp>
+    </p:spTree>
+    <p:extLst>
+      <p:ext uri="{BB962C8B-B14F-4D97-AF65-F5344CB8AC3E}">
+        <p14:creationId xmlns:p14="http://schemas.microsoft.com/office/powerpoint/2010/main" val="290243862"/>
       </p:ext>
     </p:extLst>
   </p:cSld>
@@ -4621,7 +5060,7 @@
           <p:cNvPr id="2" name="Title 1">
             <a:extLst>
               <a:ext uri="{FF2B5EF4-FFF2-40B4-BE49-F238E27FC236}">
-                <a16:creationId xmlns:a16="http://schemas.microsoft.com/office/drawing/2014/main" id="{220D089C-7F86-431A-94C0-19F86C0D0C61}"/>
+                <a16:creationId xmlns:a16="http://schemas.microsoft.com/office/drawing/2014/main" id="{E9E5C1FE-4B1B-4F97-891E-8A9D8355B554}"/>
               </a:ext>
             </a:extLst>
           </p:cNvPr>
@@ -4640,78 +5079,235 @@
             <a:pPr algn="ctr"/>
             <a:r>
               <a:rPr lang="en-US" dirty="0"/>
-              <a:t>HTTP Server</a:t>
-            </a:r>
-          </a:p>
-        </p:txBody>
-      </p:sp>
-      <p:sp>
-        <p:nvSpPr>
-          <p:cNvPr id="3" name="Content Placeholder 2">
-            <a:extLst>
-              <a:ext uri="{FF2B5EF4-FFF2-40B4-BE49-F238E27FC236}">
-                <a16:creationId xmlns:a16="http://schemas.microsoft.com/office/drawing/2014/main" id="{453FB404-65B3-4DD7-9F43-9F70B75F6BAE}"/>
-              </a:ext>
-            </a:extLst>
-          </p:cNvPr>
-          <p:cNvSpPr>
-            <a:spLocks noGrp="1"/>
-          </p:cNvSpPr>
-          <p:nvPr>
-            <p:ph idx="1"/>
-          </p:nvPr>
-        </p:nvSpPr>
-        <p:spPr/>
-        <p:txBody>
-          <a:bodyPr>
-            <a:normAutofit/>
+              <a:t>Administrator</a:t>
+            </a:r>
+          </a:p>
+        </p:txBody>
+      </p:sp>
+      <p:sp>
+        <p:nvSpPr>
+          <p:cNvPr id="4" name="TextBox 3">
+            <a:extLst>
+              <a:ext uri="{FF2B5EF4-FFF2-40B4-BE49-F238E27FC236}">
+                <a16:creationId xmlns:a16="http://schemas.microsoft.com/office/drawing/2014/main" id="{12F22C86-F425-4446-8571-63CFFE0A47B8}"/>
+              </a:ext>
+            </a:extLst>
+          </p:cNvPr>
+          <p:cNvSpPr txBox="1"/>
+          <p:nvPr/>
+        </p:nvSpPr>
+        <p:spPr>
+          <a:xfrm>
+            <a:off x="8142589" y="5725381"/>
+            <a:ext cx="1126206" cy="369332"/>
+          </a:xfrm>
+          <a:prstGeom prst="rect">
+            <a:avLst/>
+          </a:prstGeom>
+          <a:noFill/>
+        </p:spPr>
+        <p:txBody>
+          <a:bodyPr wrap="none" rtlCol="0">
+            <a:spAutoFit/>
           </a:bodyPr>
           <a:lstStyle/>
           <a:p>
             <a:r>
               <a:rPr lang="en-US" dirty="0"/>
-              <a:t>SQL</a:t>
-            </a:r>
-          </a:p>
-          <a:p>
-            <a:pPr lvl="1"/>
-            <a:r>
-              <a:rPr lang="en-US" dirty="0"/>
-              <a:t>“Database normalization” 3</a:t>
-            </a:r>
-            <a:r>
-              <a:rPr lang="en-US" baseline="30000" dirty="0"/>
-              <a:t>rd</a:t>
-            </a:r>
-            <a:r>
-              <a:rPr lang="en-US" dirty="0"/>
-              <a:t> normalized form</a:t>
-            </a:r>
-          </a:p>
-          <a:p>
-            <a:pPr lvl="1"/>
-            <a:r>
-              <a:rPr lang="en-US" dirty="0"/>
-              <a:t>Foreign keys???</a:t>
-            </a:r>
-          </a:p>
-          <a:p>
-            <a:pPr lvl="1"/>
-            <a:r>
-              <a:rPr lang="en-US" dirty="0"/>
-              <a:t>Write/Read Data</a:t>
-            </a:r>
-          </a:p>
-          <a:p>
-            <a:pPr lvl="1"/>
-            <a:endParaRPr lang="en-US" dirty="0"/>
+              <a:t>Controller</a:t>
+            </a:r>
+          </a:p>
+        </p:txBody>
+      </p:sp>
+      <p:sp>
+        <p:nvSpPr>
+          <p:cNvPr id="5" name="TextBox 4">
+            <a:extLst>
+              <a:ext uri="{FF2B5EF4-FFF2-40B4-BE49-F238E27FC236}">
+                <a16:creationId xmlns:a16="http://schemas.microsoft.com/office/drawing/2014/main" id="{6AF96D24-EE03-44D3-8DC1-D8E83BF1B928}"/>
+              </a:ext>
+            </a:extLst>
+          </p:cNvPr>
+          <p:cNvSpPr txBox="1"/>
+          <p:nvPr/>
+        </p:nvSpPr>
+        <p:spPr>
+          <a:xfrm>
+            <a:off x="4494859" y="5725381"/>
+            <a:ext cx="1058175" cy="369332"/>
+          </a:xfrm>
+          <a:prstGeom prst="rect">
+            <a:avLst/>
+          </a:prstGeom>
+          <a:noFill/>
+        </p:spPr>
+        <p:txBody>
+          <a:bodyPr wrap="none" rtlCol="0">
+            <a:spAutoFit/>
+          </a:bodyPr>
+          <a:lstStyle/>
+          <a:p>
+            <a:r>
+              <a:rPr lang="en-US" dirty="0"/>
+              <a:t>Database</a:t>
+            </a:r>
+          </a:p>
+        </p:txBody>
+      </p:sp>
+      <p:sp>
+        <p:nvSpPr>
+          <p:cNvPr id="6" name="Arrow: Left-Right 5">
+            <a:extLst>
+              <a:ext uri="{FF2B5EF4-FFF2-40B4-BE49-F238E27FC236}">
+                <a16:creationId xmlns:a16="http://schemas.microsoft.com/office/drawing/2014/main" id="{9E406EC5-B1B4-496D-91EF-76EB10819BDA}"/>
+              </a:ext>
+            </a:extLst>
+          </p:cNvPr>
+          <p:cNvSpPr/>
+          <p:nvPr/>
+        </p:nvSpPr>
+        <p:spPr>
+          <a:xfrm>
+            <a:off x="4383464" y="6065222"/>
+            <a:ext cx="1280966" cy="369332"/>
+          </a:xfrm>
+          <a:prstGeom prst="leftRightArrow">
+            <a:avLst>
+              <a:gd name="adj1" fmla="val 60210"/>
+              <a:gd name="adj2" fmla="val 50000"/>
+            </a:avLst>
+          </a:prstGeom>
+        </p:spPr>
+        <p:style>
+          <a:lnRef idx="2">
+            <a:schemeClr val="accent1">
+              <a:shade val="50000"/>
+            </a:schemeClr>
+          </a:lnRef>
+          <a:fillRef idx="1">
+            <a:schemeClr val="accent1"/>
+          </a:fillRef>
+          <a:effectRef idx="0">
+            <a:schemeClr val="accent1"/>
+          </a:effectRef>
+          <a:fontRef idx="minor">
+            <a:schemeClr val="lt1"/>
+          </a:fontRef>
+        </p:style>
+        <p:txBody>
+          <a:bodyPr rtlCol="0" anchor="ctr"/>
+          <a:lstStyle/>
+          <a:p>
+            <a:pPr algn="ctr"/>
+            <a:endParaRPr lang="en-US"/>
+          </a:p>
+        </p:txBody>
+      </p:sp>
+      <p:sp>
+        <p:nvSpPr>
+          <p:cNvPr id="7" name="Rectangle: Rounded Corners 6">
+            <a:extLst>
+              <a:ext uri="{FF2B5EF4-FFF2-40B4-BE49-F238E27FC236}">
+                <a16:creationId xmlns:a16="http://schemas.microsoft.com/office/drawing/2014/main" id="{61B59956-8B1F-4FBB-A423-FB78F093B54E}"/>
+              </a:ext>
+            </a:extLst>
+          </p:cNvPr>
+          <p:cNvSpPr/>
+          <p:nvPr/>
+        </p:nvSpPr>
+        <p:spPr>
+          <a:xfrm>
+            <a:off x="1480020" y="1690688"/>
+            <a:ext cx="2595242" cy="533767"/>
+          </a:xfrm>
+          <a:prstGeom prst="roundRect">
+            <a:avLst/>
+          </a:prstGeom>
+        </p:spPr>
+        <p:style>
+          <a:lnRef idx="2">
+            <a:schemeClr val="accent1">
+              <a:shade val="50000"/>
+            </a:schemeClr>
+          </a:lnRef>
+          <a:fillRef idx="1">
+            <a:schemeClr val="accent1"/>
+          </a:fillRef>
+          <a:effectRef idx="0">
+            <a:schemeClr val="accent1"/>
+          </a:effectRef>
+          <a:fontRef idx="minor">
+            <a:schemeClr val="lt1"/>
+          </a:fontRef>
+        </p:style>
+        <p:txBody>
+          <a:bodyPr rtlCol="0" anchor="ctr"/>
+          <a:lstStyle/>
+          <a:p>
+            <a:pPr algn="ctr"/>
+            <a:r>
+              <a:rPr lang="en-US" dirty="0"/>
+              <a:t>Administrator or Controller</a:t>
+            </a:r>
+          </a:p>
+        </p:txBody>
+      </p:sp>
+      <p:sp>
+        <p:nvSpPr>
+          <p:cNvPr id="8" name="Rectangle: Rounded Corners 7">
+            <a:extLst>
+              <a:ext uri="{FF2B5EF4-FFF2-40B4-BE49-F238E27FC236}">
+                <a16:creationId xmlns:a16="http://schemas.microsoft.com/office/drawing/2014/main" id="{FAB533AA-5812-400F-883A-1B8470D19B0E}"/>
+              </a:ext>
+            </a:extLst>
+          </p:cNvPr>
+          <p:cNvSpPr/>
+          <p:nvPr/>
+        </p:nvSpPr>
+        <p:spPr>
+          <a:xfrm>
+            <a:off x="768078" y="1524643"/>
+            <a:ext cx="4199848" cy="3860897"/>
+          </a:xfrm>
+          <a:prstGeom prst="roundRect">
+            <a:avLst/>
+          </a:prstGeom>
+          <a:noFill/>
+          <a:ln w="44450">
+            <a:solidFill>
+              <a:schemeClr val="tx1"/>
+            </a:solidFill>
+          </a:ln>
+        </p:spPr>
+        <p:style>
+          <a:lnRef idx="2">
+            <a:schemeClr val="accent1">
+              <a:shade val="50000"/>
+            </a:schemeClr>
+          </a:lnRef>
+          <a:fillRef idx="1">
+            <a:schemeClr val="accent1"/>
+          </a:fillRef>
+          <a:effectRef idx="0">
+            <a:schemeClr val="accent1"/>
+          </a:effectRef>
+          <a:fontRef idx="minor">
+            <a:schemeClr val="lt1"/>
+          </a:fontRef>
+        </p:style>
+        <p:txBody>
+          <a:bodyPr rtlCol="0" anchor="ctr"/>
+          <a:lstStyle/>
+          <a:p>
+            <a:pPr algn="ctr"/>
+            <a:endParaRPr lang="en-US"/>
           </a:p>
         </p:txBody>
       </p:sp>
     </p:spTree>
     <p:extLst>
       <p:ext uri="{BB962C8B-B14F-4D97-AF65-F5344CB8AC3E}">
-        <p14:creationId xmlns:p14="http://schemas.microsoft.com/office/powerpoint/2010/main" val="1205470836"/>
+        <p14:creationId xmlns:p14="http://schemas.microsoft.com/office/powerpoint/2010/main" val="3145869929"/>
       </p:ext>
     </p:extLst>
   </p:cSld>
@@ -4743,7 +5339,7 @@
           <p:cNvPr id="2" name="Title 1">
             <a:extLst>
               <a:ext uri="{FF2B5EF4-FFF2-40B4-BE49-F238E27FC236}">
-                <a16:creationId xmlns:a16="http://schemas.microsoft.com/office/drawing/2014/main" id="{12F03CD1-AA87-4829-B5A9-225CACAEAB08}"/>
+                <a16:creationId xmlns:a16="http://schemas.microsoft.com/office/drawing/2014/main" id="{4D02DEC1-4C73-4F8F-99C1-3F1890AE9A40}"/>
               </a:ext>
             </a:extLst>
           </p:cNvPr>
@@ -4762,7 +5358,7 @@
             <a:pPr algn="ctr"/>
             <a:r>
               <a:rPr lang="en-US" dirty="0"/>
-              <a:t>SQL</a:t>
+              <a:t>TO DO</a:t>
             </a:r>
           </a:p>
         </p:txBody>
@@ -4772,30 +5368,221 @@
           <p:cNvPr id="3" name="Content Placeholder 2">
             <a:extLst>
               <a:ext uri="{FF2B5EF4-FFF2-40B4-BE49-F238E27FC236}">
-                <a16:creationId xmlns:a16="http://schemas.microsoft.com/office/drawing/2014/main" id="{4091D791-BE91-47FA-B2F0-CE71D12E1ED4}"/>
-              </a:ext>
-            </a:extLst>
-          </p:cNvPr>
-          <p:cNvSpPr>
-            <a:spLocks noGrp="1"/>
-          </p:cNvSpPr>
-          <p:nvPr>
-            <p:ph idx="1"/>
+                <a16:creationId xmlns:a16="http://schemas.microsoft.com/office/drawing/2014/main" id="{9FF99B67-8C04-4ADC-BC12-032A21BA7EAD}"/>
+              </a:ext>
+            </a:extLst>
+          </p:cNvPr>
+          <p:cNvSpPr>
+            <a:spLocks noGrp="1"/>
+          </p:cNvSpPr>
+          <p:nvPr>
+            <p:ph sz="half" idx="1"/>
           </p:nvPr>
         </p:nvSpPr>
         <p:spPr/>
         <p:txBody>
-          <a:bodyPr/>
-          <a:lstStyle/>
-          <a:p>
+          <a:bodyPr>
+            <a:normAutofit lnSpcReduction="10000"/>
+          </a:bodyPr>
+          <a:lstStyle/>
+          <a:p>
+            <a:r>
+              <a:rPr lang="en-US" dirty="0"/>
+              <a:t>Devices (Sensors/actuator)</a:t>
+            </a:r>
+          </a:p>
+          <a:p>
+            <a:pPr lvl="1"/>
+            <a:r>
+              <a:rPr lang="en-US" dirty="0"/>
+              <a:t>Node</a:t>
+            </a:r>
+          </a:p>
+          <a:p>
+            <a:pPr lvl="1"/>
+            <a:r>
+              <a:rPr lang="en-US" dirty="0"/>
+              <a:t>Pins</a:t>
+            </a:r>
+          </a:p>
+          <a:p>
+            <a:pPr lvl="1"/>
+            <a:r>
+              <a:rPr lang="en-US" dirty="0"/>
+              <a:t>Remove </a:t>
+            </a:r>
+            <a:r>
+              <a:rPr lang="en-US" dirty="0" err="1"/>
+              <a:t>ip</a:t>
+            </a:r>
             <a:endParaRPr lang="en-US" dirty="0"/>
+          </a:p>
+          <a:p>
+            <a:pPr lvl="1"/>
+            <a:r>
+              <a:rPr lang="en-US" dirty="0"/>
+              <a:t>Pause</a:t>
+            </a:r>
+          </a:p>
+          <a:p>
+            <a:pPr lvl="1"/>
+            <a:r>
+              <a:rPr lang="en-US" dirty="0" err="1"/>
+              <a:t>Is_sensor</a:t>
+            </a:r>
+            <a:endParaRPr lang="en-US" dirty="0"/>
+          </a:p>
+          <a:p>
+            <a:r>
+              <a:rPr lang="en-US" dirty="0"/>
+              <a:t>Node</a:t>
+            </a:r>
+          </a:p>
+          <a:p>
+            <a:pPr lvl="1"/>
+            <a:r>
+              <a:rPr lang="en-US" dirty="0"/>
+              <a:t>Ip</a:t>
+            </a:r>
+          </a:p>
+          <a:p>
+            <a:pPr lvl="1"/>
+            <a:r>
+              <a:rPr lang="en-US" dirty="0"/>
+              <a:t>Greenhouse</a:t>
+            </a:r>
+          </a:p>
+          <a:p>
+            <a:pPr lvl="1"/>
+            <a:r>
+              <a:rPr lang="en-US" dirty="0"/>
+              <a:t>(Notes?)</a:t>
+            </a:r>
+          </a:p>
+          <a:p>
+            <a:pPr lvl="1"/>
+            <a:r>
+              <a:rPr lang="en-US" dirty="0"/>
+              <a:t>Master/Minion</a:t>
+            </a:r>
+          </a:p>
+          <a:p>
+            <a:pPr lvl="1"/>
+            <a:endParaRPr lang="en-US" dirty="0"/>
+          </a:p>
+          <a:p>
+            <a:endParaRPr lang="en-US" dirty="0"/>
+          </a:p>
+          <a:p>
+            <a:endParaRPr lang="en-US" dirty="0"/>
+          </a:p>
+          <a:p>
+            <a:endParaRPr lang="en-US" dirty="0"/>
+          </a:p>
+        </p:txBody>
+      </p:sp>
+      <p:sp>
+        <p:nvSpPr>
+          <p:cNvPr id="4" name="Content Placeholder 3">
+            <a:extLst>
+              <a:ext uri="{FF2B5EF4-FFF2-40B4-BE49-F238E27FC236}">
+                <a16:creationId xmlns:a16="http://schemas.microsoft.com/office/drawing/2014/main" id="{650D9E34-2344-4A00-8A4F-60238BA6BDCA}"/>
+              </a:ext>
+            </a:extLst>
+          </p:cNvPr>
+          <p:cNvSpPr>
+            <a:spLocks noGrp="1"/>
+          </p:cNvSpPr>
+          <p:nvPr>
+            <p:ph sz="half" idx="2"/>
+          </p:nvPr>
+        </p:nvSpPr>
+        <p:spPr/>
+        <p:txBody>
+          <a:bodyPr>
+            <a:normAutofit lnSpcReduction="10000"/>
+          </a:bodyPr>
+          <a:lstStyle/>
+          <a:p>
+            <a:r>
+              <a:rPr lang="en-US" dirty="0"/>
+              <a:t>Live Plotting</a:t>
+            </a:r>
+          </a:p>
+          <a:p>
+            <a:r>
+              <a:rPr lang="en-US" dirty="0"/>
+              <a:t>DB Cluster</a:t>
+            </a:r>
+          </a:p>
+          <a:p>
+            <a:r>
+              <a:rPr lang="en-US" dirty="0"/>
+              <a:t>Class Device</a:t>
+            </a:r>
+          </a:p>
+          <a:p>
+            <a:pPr lvl="1"/>
+            <a:r>
+              <a:rPr lang="en-US" dirty="0"/>
+              <a:t>Read/command</a:t>
+            </a:r>
+          </a:p>
+          <a:p>
+            <a:pPr lvl="1"/>
+            <a:r>
+              <a:rPr lang="en-US" dirty="0"/>
+              <a:t>Read/Write to database</a:t>
+            </a:r>
+          </a:p>
+          <a:p>
+            <a:pPr lvl="1"/>
+            <a:r>
+              <a:rPr lang="en-US" dirty="0"/>
+              <a:t>Getter (read, return, write)</a:t>
+            </a:r>
+          </a:p>
+          <a:p>
+            <a:pPr lvl="1"/>
+            <a:r>
+              <a:rPr lang="en-US" dirty="0"/>
+              <a:t>setter (turn on/off)</a:t>
+            </a:r>
+          </a:p>
+          <a:p>
+            <a:pPr lvl="1"/>
+            <a:r>
+              <a:rPr lang="en-US" dirty="0"/>
+              <a:t>Instantiates from DB</a:t>
+            </a:r>
+          </a:p>
+          <a:p>
+            <a:pPr lvl="1"/>
+            <a:r>
+              <a:rPr lang="en-US" dirty="0"/>
+              <a:t>Subclass Device</a:t>
+            </a:r>
+          </a:p>
+          <a:p>
+            <a:pPr lvl="2"/>
+            <a:r>
+              <a:rPr lang="en-US" dirty="0"/>
+              <a:t>Sensor</a:t>
+            </a:r>
+          </a:p>
+          <a:p>
+            <a:pPr lvl="2"/>
+            <a:r>
+              <a:rPr lang="en-US" dirty="0"/>
+              <a:t>Actuator</a:t>
+            </a:r>
           </a:p>
         </p:txBody>
       </p:sp>
     </p:spTree>
     <p:extLst>
       <p:ext uri="{BB962C8B-B14F-4D97-AF65-F5344CB8AC3E}">
-        <p14:creationId xmlns:p14="http://schemas.microsoft.com/office/powerpoint/2010/main" val="629993587"/>
+        <p14:creationId xmlns:p14="http://schemas.microsoft.com/office/powerpoint/2010/main" val="3897157887"/>
       </p:ext>
     </p:extLst>
   </p:cSld>
@@ -4827,7 +5614,7 @@
           <p:cNvPr id="2" name="Title 1">
             <a:extLst>
               <a:ext uri="{FF2B5EF4-FFF2-40B4-BE49-F238E27FC236}">
-                <a16:creationId xmlns:a16="http://schemas.microsoft.com/office/drawing/2014/main" id="{1EE981C8-D035-407A-9FC3-09D31AD7BC71}"/>
+                <a16:creationId xmlns:a16="http://schemas.microsoft.com/office/drawing/2014/main" id="{28A18962-1E2F-451C-809A-2AACE9A0F78C}"/>
               </a:ext>
             </a:extLst>
           </p:cNvPr>
@@ -4846,7 +5633,7 @@
             <a:pPr algn="ctr"/>
             <a:r>
               <a:rPr lang="en-US" dirty="0"/>
-              <a:t>Device</a:t>
+              <a:t>Program</a:t>
             </a:r>
           </a:p>
         </p:txBody>
@@ -4856,7 +5643,7 @@
           <p:cNvPr id="3" name="Content Placeholder 2">
             <a:extLst>
               <a:ext uri="{FF2B5EF4-FFF2-40B4-BE49-F238E27FC236}">
-                <a16:creationId xmlns:a16="http://schemas.microsoft.com/office/drawing/2014/main" id="{C3D08315-5D2E-439F-A21A-39FD59F08C5B}"/>
+                <a16:creationId xmlns:a16="http://schemas.microsoft.com/office/drawing/2014/main" id="{818E8AC1-96E4-4325-9B87-788E811E9657}"/>
               </a:ext>
             </a:extLst>
           </p:cNvPr>
@@ -4874,7 +5661,21 @@
           <a:p>
             <a:r>
               <a:rPr lang="en-US" dirty="0"/>
-              <a:t>Record </a:t>
+              <a:t>While</a:t>
+            </a:r>
+          </a:p>
+          <a:p>
+            <a:pPr lvl="1"/>
+            <a:r>
+              <a:rPr lang="en-US" dirty="0"/>
+              <a:t>Read data</a:t>
+            </a:r>
+          </a:p>
+          <a:p>
+            <a:pPr lvl="1"/>
+            <a:r>
+              <a:rPr lang="en-US" dirty="0"/>
+              <a:t>Check values</a:t>
             </a:r>
           </a:p>
         </p:txBody>
@@ -4882,7 +5683,7 @@
     </p:spTree>
     <p:extLst>
       <p:ext uri="{BB962C8B-B14F-4D97-AF65-F5344CB8AC3E}">
-        <p14:creationId xmlns:p14="http://schemas.microsoft.com/office/powerpoint/2010/main" val="932920167"/>
+        <p14:creationId xmlns:p14="http://schemas.microsoft.com/office/powerpoint/2010/main" val="2706461660"/>
       </p:ext>
     </p:extLst>
   </p:cSld>
@@ -4914,7 +5715,7 @@
           <p:cNvPr id="2" name="Title 1">
             <a:extLst>
               <a:ext uri="{FF2B5EF4-FFF2-40B4-BE49-F238E27FC236}">
-                <a16:creationId xmlns:a16="http://schemas.microsoft.com/office/drawing/2014/main" id="{6C151666-22D0-41B0-9E54-8DC46A427CED}"/>
+                <a16:creationId xmlns:a16="http://schemas.microsoft.com/office/drawing/2014/main" id="{220D089C-7F86-431A-94C0-19F86C0D0C61}"/>
               </a:ext>
             </a:extLst>
           </p:cNvPr>
@@ -4933,7 +5734,7 @@
             <a:pPr algn="ctr"/>
             <a:r>
               <a:rPr lang="en-US" dirty="0"/>
-              <a:t>Outstanding Questions</a:t>
+              <a:t>HTTP Server</a:t>
             </a:r>
           </a:p>
         </p:txBody>
@@ -4943,7 +5744,7 @@
           <p:cNvPr id="3" name="Content Placeholder 2">
             <a:extLst>
               <a:ext uri="{FF2B5EF4-FFF2-40B4-BE49-F238E27FC236}">
-                <a16:creationId xmlns:a16="http://schemas.microsoft.com/office/drawing/2014/main" id="{C6749A8F-FF72-4782-B31C-E07B20F9F037}"/>
+                <a16:creationId xmlns:a16="http://schemas.microsoft.com/office/drawing/2014/main" id="{453FB404-65B3-4DD7-9F43-9F70B75F6BAE}"/>
               </a:ext>
             </a:extLst>
           </p:cNvPr>
@@ -4956,15 +5757,47 @@
         </p:nvSpPr>
         <p:spPr/>
         <p:txBody>
-          <a:bodyPr/>
-          <a:lstStyle/>
-          <a:p>
-            <a:r>
-              <a:rPr lang="en-US" dirty="0"/>
-              <a:t>GUI – Best/Easiest</a:t>
-            </a:r>
-          </a:p>
-          <a:p>
+          <a:bodyPr>
+            <a:normAutofit/>
+          </a:bodyPr>
+          <a:lstStyle/>
+          <a:p>
+            <a:r>
+              <a:rPr lang="en-US" dirty="0"/>
+              <a:t>SQL</a:t>
+            </a:r>
+          </a:p>
+          <a:p>
+            <a:pPr lvl="1"/>
+            <a:r>
+              <a:rPr lang="en-US" dirty="0"/>
+              <a:t>“Database normalization” 3</a:t>
+            </a:r>
+            <a:r>
+              <a:rPr lang="en-US" baseline="30000" dirty="0"/>
+              <a:t>rd</a:t>
+            </a:r>
+            <a:r>
+              <a:rPr lang="en-US" dirty="0"/>
+              <a:t> normalized form</a:t>
+            </a:r>
+          </a:p>
+          <a:p>
+            <a:pPr lvl="1"/>
+            <a:r>
+              <a:rPr lang="en-US" dirty="0"/>
+              <a:t>Foreign keys???</a:t>
+            </a:r>
+          </a:p>
+          <a:p>
+            <a:pPr lvl="1"/>
+            <a:r>
+              <a:rPr lang="en-US" dirty="0"/>
+              <a:t>Write/Read Data</a:t>
+            </a:r>
+          </a:p>
+          <a:p>
+            <a:pPr lvl="1"/>
             <a:endParaRPr lang="en-US" dirty="0"/>
           </a:p>
         </p:txBody>
@@ -4972,7 +5805,7 @@
     </p:spTree>
     <p:extLst>
       <p:ext uri="{BB962C8B-B14F-4D97-AF65-F5344CB8AC3E}">
-        <p14:creationId xmlns:p14="http://schemas.microsoft.com/office/powerpoint/2010/main" val="1324135825"/>
+        <p14:creationId xmlns:p14="http://schemas.microsoft.com/office/powerpoint/2010/main" val="1205470836"/>
       </p:ext>
     </p:extLst>
   </p:cSld>
@@ -5004,7 +5837,7 @@
           <p:cNvPr id="2" name="Title 1">
             <a:extLst>
               <a:ext uri="{FF2B5EF4-FFF2-40B4-BE49-F238E27FC236}">
-                <a16:creationId xmlns:a16="http://schemas.microsoft.com/office/drawing/2014/main" id="{8B803CA7-3DB4-4B4D-BA16-89F3FA690238}"/>
+                <a16:creationId xmlns:a16="http://schemas.microsoft.com/office/drawing/2014/main" id="{368BD2F5-E2F5-43F1-B226-9E8688BB7F32}"/>
               </a:ext>
             </a:extLst>
           </p:cNvPr>
@@ -5023,7 +5856,7 @@
             <a:pPr algn="ctr"/>
             <a:r>
               <a:rPr lang="en-US" dirty="0"/>
-              <a:t>Testing Methods</a:t>
+              <a:t>Database</a:t>
             </a:r>
           </a:p>
         </p:txBody>
@@ -5033,7 +5866,7 @@
           <p:cNvPr id="3" name="Content Placeholder 2">
             <a:extLst>
               <a:ext uri="{FF2B5EF4-FFF2-40B4-BE49-F238E27FC236}">
-                <a16:creationId xmlns:a16="http://schemas.microsoft.com/office/drawing/2014/main" id="{AF82CA6D-0B14-491F-BBBA-986677496322}"/>
+                <a16:creationId xmlns:a16="http://schemas.microsoft.com/office/drawing/2014/main" id="{6E7D81F8-169C-4D98-86CD-DD9AB17D3CD1}"/>
               </a:ext>
             </a:extLst>
           </p:cNvPr>
@@ -5049,9 +5882,18 @@
           <a:bodyPr/>
           <a:lstStyle/>
           <a:p>
-            <a:r>
-              <a:rPr lang="en-US" dirty="0"/>
-              <a:t>http://www.fao.org/3/ca2796en/CA2796EN.pdf</a:t>
+            <a:pPr marL="0" indent="0">
+              <a:buNone/>
+            </a:pPr>
+            <a:r>
+              <a:rPr lang="en-US" dirty="0"/>
+              <a:t>Maria DB Cluster (Multi-Master?)</a:t>
+            </a:r>
+          </a:p>
+          <a:p>
+            <a:r>
+              <a:rPr lang="en-US" dirty="0"/>
+              <a:t>Cluster of Databases</a:t>
             </a:r>
           </a:p>
         </p:txBody>
@@ -5059,7 +5901,7 @@
     </p:spTree>
     <p:extLst>
       <p:ext uri="{BB962C8B-B14F-4D97-AF65-F5344CB8AC3E}">
-        <p14:creationId xmlns:p14="http://schemas.microsoft.com/office/powerpoint/2010/main" val="1432040007"/>
+        <p14:creationId xmlns:p14="http://schemas.microsoft.com/office/powerpoint/2010/main" val="3024649834"/>
       </p:ext>
     </p:extLst>
   </p:cSld>
@@ -5091,7 +5933,7 @@
           <p:cNvPr id="2" name="Title 1">
             <a:extLst>
               <a:ext uri="{FF2B5EF4-FFF2-40B4-BE49-F238E27FC236}">
-                <a16:creationId xmlns:a16="http://schemas.microsoft.com/office/drawing/2014/main" id="{9EC0DD40-5C84-4AC5-A77E-DE389659DA3B}"/>
+                <a16:creationId xmlns:a16="http://schemas.microsoft.com/office/drawing/2014/main" id="{12F03CD1-AA87-4829-B5A9-225CACAEAB08}"/>
               </a:ext>
             </a:extLst>
           </p:cNvPr>
@@ -5110,8 +5952,13 @@
             <a:pPr algn="ctr"/>
             <a:r>
               <a:rPr lang="en-US" dirty="0"/>
-              <a:t>Make Fake Data</a:t>
-            </a:r>
+              <a:t>Overview of </a:t>
+            </a:r>
+            <a:r>
+              <a:rPr lang="en-US" dirty="0" err="1"/>
+              <a:t>Automato</a:t>
+            </a:r>
+            <a:endParaRPr lang="en-US" dirty="0"/>
           </a:p>
         </p:txBody>
       </p:sp>
@@ -5120,7 +5967,7 @@
           <p:cNvPr id="3" name="Content Placeholder 2">
             <a:extLst>
               <a:ext uri="{FF2B5EF4-FFF2-40B4-BE49-F238E27FC236}">
-                <a16:creationId xmlns:a16="http://schemas.microsoft.com/office/drawing/2014/main" id="{5397ADCB-A991-4363-A2C6-C23983382340}"/>
+                <a16:creationId xmlns:a16="http://schemas.microsoft.com/office/drawing/2014/main" id="{4091D791-BE91-47FA-B2F0-CE71D12E1ED4}"/>
               </a:ext>
             </a:extLst>
           </p:cNvPr>
@@ -5138,53 +5985,10 @@
           <a:p>
             <a:r>
               <a:rPr lang="en-US" dirty="0"/>
-              <a:t>Sensor Class</a:t>
-            </a:r>
-          </a:p>
-          <a:p>
-            <a:pPr lvl="1"/>
-            <a:r>
-              <a:rPr lang="en-US" dirty="0"/>
-              <a:t>Temperature</a:t>
-            </a:r>
-          </a:p>
-          <a:p>
-            <a:pPr lvl="1"/>
-            <a:r>
-              <a:rPr lang="en-US" dirty="0"/>
-              <a:t>Soil Moisture</a:t>
-            </a:r>
-          </a:p>
-          <a:p>
-            <a:pPr lvl="1"/>
-            <a:r>
-              <a:rPr lang="en-US" dirty="0"/>
-              <a:t>Acidity</a:t>
-            </a:r>
-          </a:p>
-          <a:p>
-            <a:pPr lvl="1"/>
-            <a:r>
-              <a:rPr lang="en-US" dirty="0"/>
-              <a:t>Light</a:t>
-            </a:r>
-          </a:p>
-          <a:p>
-            <a:pPr lvl="1"/>
-            <a:r>
-              <a:rPr lang="en-US" dirty="0"/>
-              <a:t>Salinity</a:t>
-            </a:r>
-          </a:p>
-          <a:p>
-            <a:pPr lvl="1"/>
-            <a:r>
-              <a:rPr lang="en-US"/>
-              <a:t>Visual Data</a:t>
-            </a:r>
-          </a:p>
-          <a:p>
-            <a:pPr lvl="1"/>
+              <a:t>CRUD</a:t>
+            </a:r>
+          </a:p>
+          <a:p>
             <a:endParaRPr lang="en-US" dirty="0"/>
           </a:p>
         </p:txBody>
@@ -5192,7 +5996,7 @@
     </p:spTree>
     <p:extLst>
       <p:ext uri="{BB962C8B-B14F-4D97-AF65-F5344CB8AC3E}">
-        <p14:creationId xmlns:p14="http://schemas.microsoft.com/office/powerpoint/2010/main" val="2630466151"/>
+        <p14:creationId xmlns:p14="http://schemas.microsoft.com/office/powerpoint/2010/main" val="629993587"/>
       </p:ext>
     </p:extLst>
   </p:cSld>
@@ -5224,7 +6028,7 @@
           <p:cNvPr id="2" name="Title 1">
             <a:extLst>
               <a:ext uri="{FF2B5EF4-FFF2-40B4-BE49-F238E27FC236}">
-                <a16:creationId xmlns:a16="http://schemas.microsoft.com/office/drawing/2014/main" id="{47E8B3F7-CBC4-4486-9D48-667EB37F18F3}"/>
+                <a16:creationId xmlns:a16="http://schemas.microsoft.com/office/drawing/2014/main" id="{1EE981C8-D035-407A-9FC3-09D31AD7BC71}"/>
               </a:ext>
             </a:extLst>
           </p:cNvPr>
@@ -5243,7 +6047,7 @@
             <a:pPr algn="ctr"/>
             <a:r>
               <a:rPr lang="en-US" dirty="0"/>
-              <a:t>Watching Plants?</a:t>
+              <a:t>Device</a:t>
             </a:r>
           </a:p>
         </p:txBody>
@@ -5253,7 +6057,7 @@
           <p:cNvPr id="3" name="Content Placeholder 2">
             <a:extLst>
               <a:ext uri="{FF2B5EF4-FFF2-40B4-BE49-F238E27FC236}">
-                <a16:creationId xmlns:a16="http://schemas.microsoft.com/office/drawing/2014/main" id="{20DDF966-A93F-4A9F-8F6E-04E98712FF60}"/>
+                <a16:creationId xmlns:a16="http://schemas.microsoft.com/office/drawing/2014/main" id="{C3D08315-5D2E-439F-A21A-39FD59F08C5B}"/>
               </a:ext>
             </a:extLst>
           </p:cNvPr>
@@ -5271,61 +6075,15 @@
           <a:p>
             <a:r>
               <a:rPr lang="en-US" dirty="0"/>
-              <a:t>Plant Class</a:t>
-            </a:r>
-          </a:p>
-          <a:p>
-            <a:pPr lvl="1"/>
-            <a:r>
-              <a:rPr lang="en-US" dirty="0"/>
-              <a:t>Type</a:t>
-            </a:r>
-          </a:p>
-          <a:p>
-            <a:pPr lvl="1"/>
-            <a:r>
-              <a:rPr lang="en-US" dirty="0"/>
-              <a:t>Growing Conditions (ideal range)</a:t>
-            </a:r>
-          </a:p>
-          <a:p>
-            <a:pPr lvl="2"/>
-            <a:r>
-              <a:rPr lang="en-US" dirty="0"/>
-              <a:t>Temperature Range</a:t>
-            </a:r>
-          </a:p>
-          <a:p>
-            <a:pPr lvl="2"/>
-            <a:r>
-              <a:rPr lang="en-US" dirty="0"/>
-              <a:t>Moisture</a:t>
-            </a:r>
-          </a:p>
-          <a:p>
-            <a:pPr lvl="2"/>
-            <a:r>
-              <a:rPr lang="en-US" dirty="0"/>
-              <a:t>ETC</a:t>
-            </a:r>
-          </a:p>
-          <a:p>
-            <a:pPr lvl="1"/>
-            <a:r>
-              <a:rPr lang="en-US" dirty="0"/>
-              <a:t>Age</a:t>
-            </a:r>
-          </a:p>
-          <a:p>
-            <a:pPr lvl="1"/>
-            <a:endParaRPr lang="en-US" dirty="0"/>
+              <a:t>Record </a:t>
+            </a:r>
           </a:p>
         </p:txBody>
       </p:sp>
     </p:spTree>
     <p:extLst>
       <p:ext uri="{BB962C8B-B14F-4D97-AF65-F5344CB8AC3E}">
-        <p14:creationId xmlns:p14="http://schemas.microsoft.com/office/powerpoint/2010/main" val="513023450"/>
+        <p14:creationId xmlns:p14="http://schemas.microsoft.com/office/powerpoint/2010/main" val="932920167"/>
       </p:ext>
     </p:extLst>
   </p:cSld>
@@ -5357,7 +6115,7 @@
           <p:cNvPr id="2" name="Title 1">
             <a:extLst>
               <a:ext uri="{FF2B5EF4-FFF2-40B4-BE49-F238E27FC236}">
-                <a16:creationId xmlns:a16="http://schemas.microsoft.com/office/drawing/2014/main" id="{63859B16-2E2A-4D95-8053-07A87B46C3DA}"/>
+                <a16:creationId xmlns:a16="http://schemas.microsoft.com/office/drawing/2014/main" id="{6C151666-22D0-41B0-9E54-8DC46A427CED}"/>
               </a:ext>
             </a:extLst>
           </p:cNvPr>
@@ -5376,7 +6134,7 @@
             <a:pPr algn="ctr"/>
             <a:r>
               <a:rPr lang="en-US" dirty="0"/>
-              <a:t>SQL</a:t>
+              <a:t>Outstanding Questions</a:t>
             </a:r>
           </a:p>
         </p:txBody>
@@ -5386,7 +6144,7 @@
           <p:cNvPr id="3" name="Content Placeholder 2">
             <a:extLst>
               <a:ext uri="{FF2B5EF4-FFF2-40B4-BE49-F238E27FC236}">
-                <a16:creationId xmlns:a16="http://schemas.microsoft.com/office/drawing/2014/main" id="{CC1ED612-CB2C-49F2-9852-FCA145E183CD}"/>
+                <a16:creationId xmlns:a16="http://schemas.microsoft.com/office/drawing/2014/main" id="{C6749A8F-FF72-4782-B31C-E07B20F9F037}"/>
               </a:ext>
             </a:extLst>
           </p:cNvPr>
@@ -5404,15 +6162,18 @@
           <a:p>
             <a:r>
               <a:rPr lang="en-US" dirty="0"/>
-              <a:t>A Database?</a:t>
-            </a:r>
+              <a:t>GUI – Best/Easiest</a:t>
+            </a:r>
+          </a:p>
+          <a:p>
+            <a:endParaRPr lang="en-US" dirty="0"/>
           </a:p>
         </p:txBody>
       </p:sp>
     </p:spTree>
     <p:extLst>
       <p:ext uri="{BB962C8B-B14F-4D97-AF65-F5344CB8AC3E}">
-        <p14:creationId xmlns:p14="http://schemas.microsoft.com/office/powerpoint/2010/main" val="290243862"/>
+        <p14:creationId xmlns:p14="http://schemas.microsoft.com/office/powerpoint/2010/main" val="1324135825"/>
       </p:ext>
     </p:extLst>
   </p:cSld>

</xml_diff>